<commit_message>
update the design doc with the workflow diagram.
</commit_message>
<xml_diff>
--- a/doc/designDoc.pptx
+++ b/doc/designDoc.pptx
@@ -6,6 +6,7 @@
   </p:sldMasterIdLst>
   <p:sldIdLst>
     <p:sldId id="256" r:id="rId2"/>
+    <p:sldId id="257" r:id="rId3"/>
   </p:sldIdLst>
   <p:sldSz cx="12192000" cy="6858000"/>
   <p:notesSz cx="6858000" cy="9144000"/>
@@ -104,6 +105,11 @@
       </a:defRPr>
     </a:lvl9pPr>
   </p:defaultTextStyle>
+  <p:extLst>
+    <p:ext uri="{EFAFB233-063F-42B5-8137-9DF3F51BA10A}">
+      <p15:sldGuideLst xmlns:p15="http://schemas.microsoft.com/office/powerpoint/2012/main"/>
+    </p:ext>
+  </p:extLst>
 </p:presentation>
 </file>
 
@@ -256,7 +262,7 @@
           <a:p>
             <a:fld id="{F949A3E6-ADCC-4214-836D-B18BFC6F3D6C}" type="datetimeFigureOut">
               <a:rPr lang="en-SG" smtClean="0"/>
-              <a:t>1/6/2023</a:t>
+              <a:t>4/6/2023</a:t>
             </a:fld>
             <a:endParaRPr lang="en-SG"/>
           </a:p>
@@ -456,7 +462,7 @@
           <a:p>
             <a:fld id="{F949A3E6-ADCC-4214-836D-B18BFC6F3D6C}" type="datetimeFigureOut">
               <a:rPr lang="en-SG" smtClean="0"/>
-              <a:t>1/6/2023</a:t>
+              <a:t>4/6/2023</a:t>
             </a:fld>
             <a:endParaRPr lang="en-SG"/>
           </a:p>
@@ -666,7 +672,7 @@
           <a:p>
             <a:fld id="{F949A3E6-ADCC-4214-836D-B18BFC6F3D6C}" type="datetimeFigureOut">
               <a:rPr lang="en-SG" smtClean="0"/>
-              <a:t>1/6/2023</a:t>
+              <a:t>4/6/2023</a:t>
             </a:fld>
             <a:endParaRPr lang="en-SG"/>
           </a:p>
@@ -866,7 +872,7 @@
           <a:p>
             <a:fld id="{F949A3E6-ADCC-4214-836D-B18BFC6F3D6C}" type="datetimeFigureOut">
               <a:rPr lang="en-SG" smtClean="0"/>
-              <a:t>1/6/2023</a:t>
+              <a:t>4/6/2023</a:t>
             </a:fld>
             <a:endParaRPr lang="en-SG"/>
           </a:p>
@@ -1142,7 +1148,7 @@
           <a:p>
             <a:fld id="{F949A3E6-ADCC-4214-836D-B18BFC6F3D6C}" type="datetimeFigureOut">
               <a:rPr lang="en-SG" smtClean="0"/>
-              <a:t>1/6/2023</a:t>
+              <a:t>4/6/2023</a:t>
             </a:fld>
             <a:endParaRPr lang="en-SG"/>
           </a:p>
@@ -1410,7 +1416,7 @@
           <a:p>
             <a:fld id="{F949A3E6-ADCC-4214-836D-B18BFC6F3D6C}" type="datetimeFigureOut">
               <a:rPr lang="en-SG" smtClean="0"/>
-              <a:t>1/6/2023</a:t>
+              <a:t>4/6/2023</a:t>
             </a:fld>
             <a:endParaRPr lang="en-SG"/>
           </a:p>
@@ -1825,7 +1831,7 @@
           <a:p>
             <a:fld id="{F949A3E6-ADCC-4214-836D-B18BFC6F3D6C}" type="datetimeFigureOut">
               <a:rPr lang="en-SG" smtClean="0"/>
-              <a:t>1/6/2023</a:t>
+              <a:t>4/6/2023</a:t>
             </a:fld>
             <a:endParaRPr lang="en-SG"/>
           </a:p>
@@ -1967,7 +1973,7 @@
           <a:p>
             <a:fld id="{F949A3E6-ADCC-4214-836D-B18BFC6F3D6C}" type="datetimeFigureOut">
               <a:rPr lang="en-SG" smtClean="0"/>
-              <a:t>1/6/2023</a:t>
+              <a:t>4/6/2023</a:t>
             </a:fld>
             <a:endParaRPr lang="en-SG"/>
           </a:p>
@@ -2080,7 +2086,7 @@
           <a:p>
             <a:fld id="{F949A3E6-ADCC-4214-836D-B18BFC6F3D6C}" type="datetimeFigureOut">
               <a:rPr lang="en-SG" smtClean="0"/>
-              <a:t>1/6/2023</a:t>
+              <a:t>4/6/2023</a:t>
             </a:fld>
             <a:endParaRPr lang="en-SG"/>
           </a:p>
@@ -2393,7 +2399,7 @@
           <a:p>
             <a:fld id="{F949A3E6-ADCC-4214-836D-B18BFC6F3D6C}" type="datetimeFigureOut">
               <a:rPr lang="en-SG" smtClean="0"/>
-              <a:t>1/6/2023</a:t>
+              <a:t>4/6/2023</a:t>
             </a:fld>
             <a:endParaRPr lang="en-SG"/>
           </a:p>
@@ -2682,7 +2688,7 @@
           <a:p>
             <a:fld id="{F949A3E6-ADCC-4214-836D-B18BFC6F3D6C}" type="datetimeFigureOut">
               <a:rPr lang="en-SG" smtClean="0"/>
-              <a:t>1/6/2023</a:t>
+              <a:t>4/6/2023</a:t>
             </a:fld>
             <a:endParaRPr lang="en-SG"/>
           </a:p>
@@ -2925,7 +2931,7 @@
           <a:p>
             <a:fld id="{F949A3E6-ADCC-4214-836D-B18BFC6F3D6C}" type="datetimeFigureOut">
               <a:rPr lang="en-SG" smtClean="0"/>
-              <a:t>1/6/2023</a:t>
+              <a:t>4/6/2023</a:t>
             </a:fld>
             <a:endParaRPr lang="en-SG"/>
           </a:p>
@@ -3344,10 +3350,10 @@
       </p:grpSpPr>
       <p:sp>
         <p:nvSpPr>
-          <p:cNvPr id="12" name="Rectangle 11">
-            <a:extLst>
-              <a:ext uri="{FF2B5EF4-FFF2-40B4-BE49-F238E27FC236}">
-                <a16:creationId xmlns:a16="http://schemas.microsoft.com/office/drawing/2014/main" id="{7CB495D9-43AC-A3B4-70D7-90585F3818BF}"/>
+          <p:cNvPr id="15" name="Rectangle 14">
+            <a:extLst>
+              <a:ext uri="{FF2B5EF4-FFF2-40B4-BE49-F238E27FC236}">
+                <a16:creationId xmlns:a16="http://schemas.microsoft.com/office/drawing/2014/main" id="{BEA28FB4-C69C-28C8-6F6D-871B07DD0014}"/>
               </a:ext>
             </a:extLst>
           </p:cNvPr>
@@ -3356,8 +3362,8 @@
         </p:nvSpPr>
         <p:spPr>
           <a:xfrm>
-            <a:off x="4006850" y="2571750"/>
-            <a:ext cx="4273550" cy="1416050"/>
+            <a:off x="2569465" y="1300738"/>
+            <a:ext cx="3018790" cy="2240276"/>
           </a:xfrm>
           <a:prstGeom prst="rect">
             <a:avLst/>
@@ -3388,6 +3394,52 @@
           </a:p>
         </p:txBody>
       </p:sp>
+      <p:sp>
+        <p:nvSpPr>
+          <p:cNvPr id="12" name="Rectangle 11">
+            <a:extLst>
+              <a:ext uri="{FF2B5EF4-FFF2-40B4-BE49-F238E27FC236}">
+                <a16:creationId xmlns:a16="http://schemas.microsoft.com/office/drawing/2014/main" id="{7CB495D9-43AC-A3B4-70D7-90585F3818BF}"/>
+              </a:ext>
+            </a:extLst>
+          </p:cNvPr>
+          <p:cNvSpPr/>
+          <p:nvPr/>
+        </p:nvSpPr>
+        <p:spPr>
+          <a:xfrm>
+            <a:off x="6612890" y="3614166"/>
+            <a:ext cx="4273550" cy="1416050"/>
+          </a:xfrm>
+          <a:prstGeom prst="rect">
+            <a:avLst/>
+          </a:prstGeom>
+        </p:spPr>
+        <p:style>
+          <a:lnRef idx="2">
+            <a:schemeClr val="dk1">
+              <a:shade val="50000"/>
+            </a:schemeClr>
+          </a:lnRef>
+          <a:fillRef idx="1">
+            <a:schemeClr val="dk1"/>
+          </a:fillRef>
+          <a:effectRef idx="0">
+            <a:schemeClr val="dk1"/>
+          </a:effectRef>
+          <a:fontRef idx="minor">
+            <a:schemeClr val="lt1"/>
+          </a:fontRef>
+        </p:style>
+        <p:txBody>
+          <a:bodyPr rtlCol="0" anchor="ctr"/>
+          <a:lstStyle/>
+          <a:p>
+            <a:pPr algn="ctr"/>
+            <a:endParaRPr lang="en-SG" dirty="0"/>
+          </a:p>
+        </p:txBody>
+      </p:sp>
       <p:pic>
         <p:nvPicPr>
           <p:cNvPr id="7" name="Picture 6">
@@ -3416,7 +3468,7 @@
         </p:blipFill>
         <p:spPr>
           <a:xfrm>
-            <a:off x="4599561" y="3276619"/>
+            <a:off x="7205601" y="4319035"/>
             <a:ext cx="304762" cy="304762"/>
           </a:xfrm>
           <a:prstGeom prst="rect">
@@ -3457,7 +3509,7 @@
         </p:blipFill>
         <p:spPr>
           <a:xfrm>
-            <a:off x="4599561" y="2888809"/>
+            <a:off x="7205601" y="3931225"/>
             <a:ext cx="304762" cy="304762"/>
           </a:xfrm>
           <a:prstGeom prst="rect">
@@ -3484,7 +3536,7 @@
         </p:nvSpPr>
         <p:spPr>
           <a:xfrm>
-            <a:off x="4904323" y="2856524"/>
+            <a:off x="7510363" y="3898940"/>
             <a:ext cx="2080677" cy="369332"/>
           </a:xfrm>
           <a:prstGeom prst="rect">
@@ -3523,7 +3575,7 @@
         </p:nvSpPr>
         <p:spPr>
           <a:xfrm>
-            <a:off x="4904323" y="3212049"/>
+            <a:off x="7510363" y="4254465"/>
             <a:ext cx="2743200" cy="369332"/>
           </a:xfrm>
           <a:prstGeom prst="rect">
@@ -3548,10 +3600,1230 @@
           </a:p>
         </p:txBody>
       </p:sp>
+      <p:pic>
+        <p:nvPicPr>
+          <p:cNvPr id="3" name="Picture 2">
+            <a:extLst>
+              <a:ext uri="{FF2B5EF4-FFF2-40B4-BE49-F238E27FC236}">
+                <a16:creationId xmlns:a16="http://schemas.microsoft.com/office/drawing/2014/main" id="{19307DB1-B956-6F07-5F6B-06D4F6E08D9F}"/>
+              </a:ext>
+            </a:extLst>
+          </p:cNvPr>
+          <p:cNvPicPr>
+            <a:picLocks noChangeAspect="1"/>
+          </p:cNvPicPr>
+          <p:nvPr/>
+        </p:nvPicPr>
+        <p:blipFill>
+          <a:blip r:embed="rId4"/>
+          <a:stretch>
+            <a:fillRect/>
+          </a:stretch>
+        </p:blipFill>
+        <p:spPr>
+          <a:xfrm>
+            <a:off x="2728571" y="1432773"/>
+            <a:ext cx="868658" cy="490981"/>
+          </a:xfrm>
+          <a:prstGeom prst="rect">
+            <a:avLst/>
+          </a:prstGeom>
+          <a:ln w="12700">
+            <a:solidFill>
+              <a:schemeClr val="bg1"/>
+            </a:solidFill>
+          </a:ln>
+        </p:spPr>
+      </p:pic>
+      <p:pic>
+        <p:nvPicPr>
+          <p:cNvPr id="5" name="Picture 4">
+            <a:extLst>
+              <a:ext uri="{FF2B5EF4-FFF2-40B4-BE49-F238E27FC236}">
+                <a16:creationId xmlns:a16="http://schemas.microsoft.com/office/drawing/2014/main" id="{1CC97FBD-6C8A-09C4-781A-E60B58264C26}"/>
+              </a:ext>
+            </a:extLst>
+          </p:cNvPr>
+          <p:cNvPicPr>
+            <a:picLocks noChangeAspect="1"/>
+          </p:cNvPicPr>
+          <p:nvPr/>
+        </p:nvPicPr>
+        <p:blipFill>
+          <a:blip r:embed="rId5"/>
+          <a:stretch>
+            <a:fillRect/>
+          </a:stretch>
+        </p:blipFill>
+        <p:spPr>
+          <a:xfrm>
+            <a:off x="2704189" y="2106771"/>
+            <a:ext cx="893040" cy="468625"/>
+          </a:xfrm>
+          <a:prstGeom prst="rect">
+            <a:avLst/>
+          </a:prstGeom>
+          <a:ln w="12700">
+            <a:solidFill>
+              <a:schemeClr val="bg1"/>
+            </a:solidFill>
+          </a:ln>
+        </p:spPr>
+      </p:pic>
+      <p:pic>
+        <p:nvPicPr>
+          <p:cNvPr id="8" name="Picture 7">
+            <a:extLst>
+              <a:ext uri="{FF2B5EF4-FFF2-40B4-BE49-F238E27FC236}">
+                <a16:creationId xmlns:a16="http://schemas.microsoft.com/office/drawing/2014/main" id="{7CEA8BBA-4227-C786-41C9-2990E8AF0A96}"/>
+              </a:ext>
+            </a:extLst>
+          </p:cNvPr>
+          <p:cNvPicPr>
+            <a:picLocks noChangeAspect="1"/>
+          </p:cNvPicPr>
+          <p:nvPr/>
+        </p:nvPicPr>
+        <p:blipFill rotWithShape="1">
+          <a:blip r:embed="rId6"/>
+          <a:srcRect l="14667" r="22053"/>
+          <a:stretch/>
+        </p:blipFill>
+        <p:spPr>
+          <a:xfrm>
+            <a:off x="3145224" y="2779498"/>
+            <a:ext cx="452005" cy="552381"/>
+          </a:xfrm>
+          <a:prstGeom prst="rect">
+            <a:avLst/>
+          </a:prstGeom>
+          <a:ln w="12700">
+            <a:solidFill>
+              <a:schemeClr val="bg1"/>
+            </a:solidFill>
+          </a:ln>
+        </p:spPr>
+      </p:pic>
+      <p:pic>
+        <p:nvPicPr>
+          <p:cNvPr id="14" name="Picture 13">
+            <a:extLst>
+              <a:ext uri="{FF2B5EF4-FFF2-40B4-BE49-F238E27FC236}">
+                <a16:creationId xmlns:a16="http://schemas.microsoft.com/office/drawing/2014/main" id="{1C4BA647-57F8-53D0-70DD-3F16D9E5B226}"/>
+              </a:ext>
+            </a:extLst>
+          </p:cNvPr>
+          <p:cNvPicPr>
+            <a:picLocks noChangeAspect="1"/>
+          </p:cNvPicPr>
+          <p:nvPr/>
+        </p:nvPicPr>
+        <p:blipFill rotWithShape="1">
+          <a:blip r:embed="rId7"/>
+          <a:srcRect l="11682" r="19960"/>
+          <a:stretch/>
+        </p:blipFill>
+        <p:spPr>
+          <a:xfrm>
+            <a:off x="2728571" y="2779498"/>
+            <a:ext cx="416653" cy="552381"/>
+          </a:xfrm>
+          <a:prstGeom prst="rect">
+            <a:avLst/>
+          </a:prstGeom>
+          <a:ln w="12700">
+            <a:solidFill>
+              <a:schemeClr val="bg1"/>
+            </a:solidFill>
+          </a:ln>
+        </p:spPr>
+      </p:pic>
+      <p:sp>
+        <p:nvSpPr>
+          <p:cNvPr id="16" name="TextBox 15">
+            <a:extLst>
+              <a:ext uri="{FF2B5EF4-FFF2-40B4-BE49-F238E27FC236}">
+                <a16:creationId xmlns:a16="http://schemas.microsoft.com/office/drawing/2014/main" id="{A7D445A6-233B-2A14-D532-07136E095AA6}"/>
+              </a:ext>
+            </a:extLst>
+          </p:cNvPr>
+          <p:cNvSpPr txBox="1"/>
+          <p:nvPr/>
+        </p:nvSpPr>
+        <p:spPr>
+          <a:xfrm>
+            <a:off x="3756335" y="1493597"/>
+            <a:ext cx="1583761" cy="369332"/>
+          </a:xfrm>
+          <a:prstGeom prst="rect">
+            <a:avLst/>
+          </a:prstGeom>
+          <a:noFill/>
+        </p:spPr>
+        <p:txBody>
+          <a:bodyPr wrap="square" rtlCol="0">
+            <a:spAutoFit/>
+          </a:bodyPr>
+          <a:lstStyle/>
+          <a:p>
+            <a:r>
+              <a:rPr lang="en-SG" b="1" dirty="0">
+                <a:solidFill>
+                  <a:schemeClr val="bg1"/>
+                </a:solidFill>
+              </a:rPr>
+              <a:t>Train Sensor</a:t>
+            </a:r>
+          </a:p>
+        </p:txBody>
+      </p:sp>
+      <p:sp>
+        <p:nvSpPr>
+          <p:cNvPr id="17" name="TextBox 16">
+            <a:extLst>
+              <a:ext uri="{FF2B5EF4-FFF2-40B4-BE49-F238E27FC236}">
+                <a16:creationId xmlns:a16="http://schemas.microsoft.com/office/drawing/2014/main" id="{05C976BB-56CD-3D39-306E-F049C5EC9FEF}"/>
+              </a:ext>
+            </a:extLst>
+          </p:cNvPr>
+          <p:cNvSpPr txBox="1"/>
+          <p:nvPr/>
+        </p:nvSpPr>
+        <p:spPr>
+          <a:xfrm>
+            <a:off x="3756334" y="2147973"/>
+            <a:ext cx="1583761" cy="369332"/>
+          </a:xfrm>
+          <a:prstGeom prst="rect">
+            <a:avLst/>
+          </a:prstGeom>
+          <a:noFill/>
+        </p:spPr>
+        <p:txBody>
+          <a:bodyPr wrap="square" rtlCol="0">
+            <a:spAutoFit/>
+          </a:bodyPr>
+          <a:lstStyle/>
+          <a:p>
+            <a:r>
+              <a:rPr lang="en-SG" b="1" dirty="0">
+                <a:solidFill>
+                  <a:schemeClr val="bg1"/>
+                </a:solidFill>
+              </a:rPr>
+              <a:t>Train Station </a:t>
+            </a:r>
+          </a:p>
+        </p:txBody>
+      </p:sp>
+      <p:sp>
+        <p:nvSpPr>
+          <p:cNvPr id="18" name="TextBox 17">
+            <a:extLst>
+              <a:ext uri="{FF2B5EF4-FFF2-40B4-BE49-F238E27FC236}">
+                <a16:creationId xmlns:a16="http://schemas.microsoft.com/office/drawing/2014/main" id="{BE7D2B1A-90A2-88AE-9A0B-229047ECE4E0}"/>
+              </a:ext>
+            </a:extLst>
+          </p:cNvPr>
+          <p:cNvSpPr txBox="1"/>
+          <p:nvPr/>
+        </p:nvSpPr>
+        <p:spPr>
+          <a:xfrm>
+            <a:off x="3598209" y="2664043"/>
+            <a:ext cx="2006994" cy="830997"/>
+          </a:xfrm>
+          <a:prstGeom prst="rect">
+            <a:avLst/>
+          </a:prstGeom>
+          <a:noFill/>
+        </p:spPr>
+        <p:txBody>
+          <a:bodyPr wrap="square" rtlCol="0">
+            <a:spAutoFit/>
+          </a:bodyPr>
+          <a:lstStyle/>
+          <a:p>
+            <a:r>
+              <a:rPr lang="en-US" sz="1600" b="1" dirty="0">
+                <a:solidFill>
+                  <a:schemeClr val="bg1"/>
+                </a:solidFill>
+              </a:rPr>
+              <a:t>Railway Cross Signal</a:t>
+            </a:r>
+          </a:p>
+          <a:p>
+            <a:pPr marL="285750" indent="-285750">
+              <a:buFont typeface="Arial" panose="020B0604020202020204" pitchFamily="34" charset="0"/>
+              <a:buChar char="•"/>
+            </a:pPr>
+            <a:r>
+              <a:rPr lang="en-US" sz="1600" b="1" dirty="0">
+                <a:solidFill>
+                  <a:schemeClr val="bg1"/>
+                </a:solidFill>
+              </a:rPr>
+              <a:t>Green: Pass [off]</a:t>
+            </a:r>
+          </a:p>
+          <a:p>
+            <a:pPr marL="285750" indent="-285750">
+              <a:buFont typeface="Arial" panose="020B0604020202020204" pitchFamily="34" charset="0"/>
+              <a:buChar char="•"/>
+            </a:pPr>
+            <a:r>
+              <a:rPr lang="en-US" sz="1600" b="1" dirty="0">
+                <a:solidFill>
+                  <a:schemeClr val="bg1"/>
+                </a:solidFill>
+              </a:rPr>
+              <a:t>Red: Block [on]</a:t>
+            </a:r>
+            <a:endParaRPr lang="en-SG" sz="1600" b="1" dirty="0">
+              <a:solidFill>
+                <a:schemeClr val="bg1"/>
+              </a:solidFill>
+            </a:endParaRPr>
+          </a:p>
+        </p:txBody>
+      </p:sp>
     </p:spTree>
     <p:extLst>
       <p:ext uri="{BB962C8B-B14F-4D97-AF65-F5344CB8AC3E}">
         <p14:creationId xmlns:p14="http://schemas.microsoft.com/office/powerpoint/2010/main" val="3593286486"/>
+      </p:ext>
+    </p:extLst>
+  </p:cSld>
+  <p:clrMapOvr>
+    <a:masterClrMapping/>
+  </p:clrMapOvr>
+</p:sld>
+</file>
+
+<file path=ppt/slides/slide2.xml><?xml version="1.0" encoding="utf-8"?>
+<p:sld xmlns:a="http://schemas.openxmlformats.org/drawingml/2006/main" xmlns:r="http://schemas.openxmlformats.org/officeDocument/2006/relationships" xmlns:p="http://schemas.openxmlformats.org/presentationml/2006/main">
+  <p:cSld>
+    <p:spTree>
+      <p:nvGrpSpPr>
+        <p:cNvPr id="1" name=""/>
+        <p:cNvGrpSpPr/>
+        <p:nvPr/>
+      </p:nvGrpSpPr>
+      <p:grpSpPr>
+        <a:xfrm>
+          <a:off x="0" y="0"/>
+          <a:ext cx="0" cy="0"/>
+          <a:chOff x="0" y="0"/>
+          <a:chExt cx="0" cy="0"/>
+        </a:xfrm>
+      </p:grpSpPr>
+      <p:pic>
+        <p:nvPicPr>
+          <p:cNvPr id="56" name="Picture 55" descr="A picture containing text, screenshot, display, diagram&#10;&#10;Description automatically generated">
+            <a:extLst>
+              <a:ext uri="{FF2B5EF4-FFF2-40B4-BE49-F238E27FC236}">
+                <a16:creationId xmlns:a16="http://schemas.microsoft.com/office/drawing/2014/main" id="{69B3AB3C-63E8-E187-AAF7-C36A421DEA4B}"/>
+              </a:ext>
+            </a:extLst>
+          </p:cNvPr>
+          <p:cNvPicPr>
+            <a:picLocks noChangeAspect="1"/>
+          </p:cNvPicPr>
+          <p:nvPr/>
+        </p:nvPicPr>
+        <p:blipFill>
+          <a:blip r:embed="rId2">
+            <a:extLst>
+              <a:ext uri="{28A0092B-C50C-407E-A947-70E740481C1C}">
+                <a14:useLocalDpi xmlns:a14="http://schemas.microsoft.com/office/drawing/2010/main" val="0"/>
+              </a:ext>
+            </a:extLst>
+          </a:blip>
+          <a:stretch>
+            <a:fillRect/>
+          </a:stretch>
+        </p:blipFill>
+        <p:spPr>
+          <a:xfrm>
+            <a:off x="330505" y="330196"/>
+            <a:ext cx="5573477" cy="3098804"/>
+          </a:xfrm>
+          <a:prstGeom prst="rect">
+            <a:avLst/>
+          </a:prstGeom>
+          <a:ln w="12700">
+            <a:solidFill>
+              <a:schemeClr val="tx1"/>
+            </a:solidFill>
+          </a:ln>
+        </p:spPr>
+      </p:pic>
+      <p:cxnSp>
+        <p:nvCxnSpPr>
+          <p:cNvPr id="57" name="Straight Arrow Connector 56">
+            <a:extLst>
+              <a:ext uri="{FF2B5EF4-FFF2-40B4-BE49-F238E27FC236}">
+                <a16:creationId xmlns:a16="http://schemas.microsoft.com/office/drawing/2014/main" id="{199424E6-FF55-85E4-AF84-68016952D7BB}"/>
+              </a:ext>
+            </a:extLst>
+          </p:cNvPr>
+          <p:cNvCxnSpPr>
+            <a:cxnSpLocks/>
+          </p:cNvCxnSpPr>
+          <p:nvPr/>
+        </p:nvCxnSpPr>
+        <p:spPr>
+          <a:xfrm>
+            <a:off x="2296725" y="3429000"/>
+            <a:ext cx="0" cy="614470"/>
+          </a:xfrm>
+          <a:prstGeom prst="straightConnector1">
+            <a:avLst/>
+          </a:prstGeom>
+          <a:ln w="19050">
+            <a:tailEnd type="triangle"/>
+          </a:ln>
+        </p:spPr>
+        <p:style>
+          <a:lnRef idx="1">
+            <a:schemeClr val="dk1"/>
+          </a:lnRef>
+          <a:fillRef idx="0">
+            <a:schemeClr val="dk1"/>
+          </a:fillRef>
+          <a:effectRef idx="0">
+            <a:schemeClr val="dk1"/>
+          </a:effectRef>
+          <a:fontRef idx="minor">
+            <a:schemeClr val="tx1"/>
+          </a:fontRef>
+        </p:style>
+      </p:cxnSp>
+      <p:cxnSp>
+        <p:nvCxnSpPr>
+          <p:cNvPr id="59" name="Straight Arrow Connector 58">
+            <a:extLst>
+              <a:ext uri="{FF2B5EF4-FFF2-40B4-BE49-F238E27FC236}">
+                <a16:creationId xmlns:a16="http://schemas.microsoft.com/office/drawing/2014/main" id="{E8D2E597-476C-D57B-A245-35F881ED336C}"/>
+              </a:ext>
+            </a:extLst>
+          </p:cNvPr>
+          <p:cNvCxnSpPr>
+            <a:cxnSpLocks/>
+          </p:cNvCxnSpPr>
+          <p:nvPr/>
+        </p:nvCxnSpPr>
+        <p:spPr>
+          <a:xfrm flipV="1">
+            <a:off x="3223593" y="3429000"/>
+            <a:ext cx="0" cy="614470"/>
+          </a:xfrm>
+          <a:prstGeom prst="straightConnector1">
+            <a:avLst/>
+          </a:prstGeom>
+          <a:ln w="19050">
+            <a:tailEnd type="triangle"/>
+          </a:ln>
+        </p:spPr>
+        <p:style>
+          <a:lnRef idx="1">
+            <a:schemeClr val="dk1"/>
+          </a:lnRef>
+          <a:fillRef idx="0">
+            <a:schemeClr val="dk1"/>
+          </a:fillRef>
+          <a:effectRef idx="0">
+            <a:schemeClr val="dk1"/>
+          </a:effectRef>
+          <a:fontRef idx="minor">
+            <a:schemeClr val="tx1"/>
+          </a:fontRef>
+        </p:style>
+      </p:cxnSp>
+      <p:sp>
+        <p:nvSpPr>
+          <p:cNvPr id="62" name="TextBox 61">
+            <a:extLst>
+              <a:ext uri="{FF2B5EF4-FFF2-40B4-BE49-F238E27FC236}">
+                <a16:creationId xmlns:a16="http://schemas.microsoft.com/office/drawing/2014/main" id="{08763730-247D-929F-0E49-9D30D954DB13}"/>
+              </a:ext>
+            </a:extLst>
+          </p:cNvPr>
+          <p:cNvSpPr txBox="1"/>
+          <p:nvPr/>
+        </p:nvSpPr>
+        <p:spPr>
+          <a:xfrm>
+            <a:off x="828067" y="3564277"/>
+            <a:ext cx="1497188" cy="261610"/>
+          </a:xfrm>
+          <a:prstGeom prst="rect">
+            <a:avLst/>
+          </a:prstGeom>
+          <a:noFill/>
+        </p:spPr>
+        <p:txBody>
+          <a:bodyPr wrap="square" rtlCol="0">
+            <a:spAutoFit/>
+          </a:bodyPr>
+          <a:lstStyle/>
+          <a:p>
+            <a:r>
+              <a:rPr lang="en-US" sz="1100" dirty="0"/>
+              <a:t>Real work sensor data</a:t>
+            </a:r>
+            <a:endParaRPr lang="en-SG" sz="1100" dirty="0"/>
+          </a:p>
+        </p:txBody>
+      </p:sp>
+      <p:sp>
+        <p:nvSpPr>
+          <p:cNvPr id="63" name="TextBox 62">
+            <a:extLst>
+              <a:ext uri="{FF2B5EF4-FFF2-40B4-BE49-F238E27FC236}">
+                <a16:creationId xmlns:a16="http://schemas.microsoft.com/office/drawing/2014/main" id="{6DDB051B-5517-B535-96D1-BA9DCF2003B5}"/>
+              </a:ext>
+            </a:extLst>
+          </p:cNvPr>
+          <p:cNvSpPr txBox="1"/>
+          <p:nvPr/>
+        </p:nvSpPr>
+        <p:spPr>
+          <a:xfrm>
+            <a:off x="3223593" y="3583676"/>
+            <a:ext cx="1497188" cy="261610"/>
+          </a:xfrm>
+          <a:prstGeom prst="rect">
+            <a:avLst/>
+          </a:prstGeom>
+          <a:noFill/>
+        </p:spPr>
+        <p:txBody>
+          <a:bodyPr wrap="square" rtlCol="0">
+            <a:spAutoFit/>
+          </a:bodyPr>
+          <a:lstStyle/>
+          <a:p>
+            <a:r>
+              <a:rPr lang="en-US" sz="1100" dirty="0"/>
+              <a:t>PCL coil output data</a:t>
+            </a:r>
+            <a:endParaRPr lang="en-SG" sz="1100" dirty="0"/>
+          </a:p>
+        </p:txBody>
+      </p:sp>
+      <p:sp>
+        <p:nvSpPr>
+          <p:cNvPr id="64" name="Cylinder 63">
+            <a:extLst>
+              <a:ext uri="{FF2B5EF4-FFF2-40B4-BE49-F238E27FC236}">
+                <a16:creationId xmlns:a16="http://schemas.microsoft.com/office/drawing/2014/main" id="{513B64FF-E316-7979-D6C1-E2293A255E23}"/>
+              </a:ext>
+            </a:extLst>
+          </p:cNvPr>
+          <p:cNvSpPr/>
+          <p:nvPr/>
+        </p:nvSpPr>
+        <p:spPr>
+          <a:xfrm>
+            <a:off x="2088330" y="4065882"/>
+            <a:ext cx="1200834" cy="418641"/>
+          </a:xfrm>
+          <a:prstGeom prst="can">
+            <a:avLst/>
+          </a:prstGeom>
+        </p:spPr>
+        <p:style>
+          <a:lnRef idx="2">
+            <a:schemeClr val="accent1">
+              <a:shade val="50000"/>
+            </a:schemeClr>
+          </a:lnRef>
+          <a:fillRef idx="1">
+            <a:schemeClr val="accent1"/>
+          </a:fillRef>
+          <a:effectRef idx="0">
+            <a:schemeClr val="accent1"/>
+          </a:effectRef>
+          <a:fontRef idx="minor">
+            <a:schemeClr val="lt1"/>
+          </a:fontRef>
+        </p:style>
+        <p:txBody>
+          <a:bodyPr rtlCol="0" anchor="ctr"/>
+          <a:lstStyle/>
+          <a:p>
+            <a:pPr algn="ctr"/>
+            <a:r>
+              <a:rPr lang="en-US" sz="1400" b="1" dirty="0"/>
+              <a:t>Database</a:t>
+            </a:r>
+            <a:endParaRPr lang="en-SG" sz="1400" b="1" dirty="0"/>
+          </a:p>
+        </p:txBody>
+      </p:sp>
+      <p:cxnSp>
+        <p:nvCxnSpPr>
+          <p:cNvPr id="65" name="Straight Arrow Connector 64">
+            <a:extLst>
+              <a:ext uri="{FF2B5EF4-FFF2-40B4-BE49-F238E27FC236}">
+                <a16:creationId xmlns:a16="http://schemas.microsoft.com/office/drawing/2014/main" id="{2D64263F-18D8-B0E1-F418-E66108A1D784}"/>
+              </a:ext>
+            </a:extLst>
+          </p:cNvPr>
+          <p:cNvCxnSpPr>
+            <a:cxnSpLocks/>
+          </p:cNvCxnSpPr>
+          <p:nvPr/>
+        </p:nvCxnSpPr>
+        <p:spPr>
+          <a:xfrm>
+            <a:off x="3289158" y="4913001"/>
+            <a:ext cx="1282842" cy="0"/>
+          </a:xfrm>
+          <a:prstGeom prst="straightConnector1">
+            <a:avLst/>
+          </a:prstGeom>
+          <a:ln w="19050">
+            <a:tailEnd type="triangle"/>
+          </a:ln>
+        </p:spPr>
+        <p:style>
+          <a:lnRef idx="1">
+            <a:schemeClr val="dk1"/>
+          </a:lnRef>
+          <a:fillRef idx="0">
+            <a:schemeClr val="dk1"/>
+          </a:fillRef>
+          <a:effectRef idx="0">
+            <a:schemeClr val="dk1"/>
+          </a:effectRef>
+          <a:fontRef idx="minor">
+            <a:schemeClr val="tx1"/>
+          </a:fontRef>
+        </p:style>
+      </p:cxnSp>
+      <p:sp>
+        <p:nvSpPr>
+          <p:cNvPr id="66" name="Rectangle 65">
+            <a:extLst>
+              <a:ext uri="{FF2B5EF4-FFF2-40B4-BE49-F238E27FC236}">
+                <a16:creationId xmlns:a16="http://schemas.microsoft.com/office/drawing/2014/main" id="{2B946BE7-3DAB-5E1F-0DED-46C5DAD914EF}"/>
+              </a:ext>
+            </a:extLst>
+          </p:cNvPr>
+          <p:cNvSpPr/>
+          <p:nvPr/>
+        </p:nvSpPr>
+        <p:spPr>
+          <a:xfrm>
+            <a:off x="2088330" y="4804212"/>
+            <a:ext cx="1200828" cy="416285"/>
+          </a:xfrm>
+          <a:prstGeom prst="rect">
+            <a:avLst/>
+          </a:prstGeom>
+        </p:spPr>
+        <p:style>
+          <a:lnRef idx="2">
+            <a:schemeClr val="accent1">
+              <a:shade val="50000"/>
+            </a:schemeClr>
+          </a:lnRef>
+          <a:fillRef idx="1">
+            <a:schemeClr val="accent1"/>
+          </a:fillRef>
+          <a:effectRef idx="0">
+            <a:schemeClr val="accent1"/>
+          </a:effectRef>
+          <a:fontRef idx="minor">
+            <a:schemeClr val="lt1"/>
+          </a:fontRef>
+        </p:style>
+        <p:txBody>
+          <a:bodyPr rtlCol="0" anchor="ctr"/>
+          <a:lstStyle/>
+          <a:p>
+            <a:pPr algn="ctr"/>
+            <a:r>
+              <a:rPr lang="en-US" sz="1200" dirty="0"/>
+              <a:t>Communication manager </a:t>
+            </a:r>
+            <a:endParaRPr lang="en-SG" sz="1200" dirty="0"/>
+          </a:p>
+        </p:txBody>
+      </p:sp>
+      <p:sp>
+        <p:nvSpPr>
+          <p:cNvPr id="67" name="Arrow: Up-Down 66">
+            <a:extLst>
+              <a:ext uri="{FF2B5EF4-FFF2-40B4-BE49-F238E27FC236}">
+                <a16:creationId xmlns:a16="http://schemas.microsoft.com/office/drawing/2014/main" id="{A6B76913-2A02-5219-ABDC-82A825D70420}"/>
+              </a:ext>
+            </a:extLst>
+          </p:cNvPr>
+          <p:cNvSpPr/>
+          <p:nvPr/>
+        </p:nvSpPr>
+        <p:spPr>
+          <a:xfrm>
+            <a:off x="2566930" y="4484523"/>
+            <a:ext cx="198299" cy="319689"/>
+          </a:xfrm>
+          <a:prstGeom prst="upDownArrow">
+            <a:avLst/>
+          </a:prstGeom>
+        </p:spPr>
+        <p:style>
+          <a:lnRef idx="2">
+            <a:schemeClr val="accent1">
+              <a:shade val="50000"/>
+            </a:schemeClr>
+          </a:lnRef>
+          <a:fillRef idx="1">
+            <a:schemeClr val="accent1"/>
+          </a:fillRef>
+          <a:effectRef idx="0">
+            <a:schemeClr val="accent1"/>
+          </a:effectRef>
+          <a:fontRef idx="minor">
+            <a:schemeClr val="lt1"/>
+          </a:fontRef>
+        </p:style>
+        <p:txBody>
+          <a:bodyPr rtlCol="0" anchor="ctr"/>
+          <a:lstStyle/>
+          <a:p>
+            <a:pPr algn="ctr"/>
+            <a:endParaRPr lang="en-SG"/>
+          </a:p>
+        </p:txBody>
+      </p:sp>
+      <p:pic>
+        <p:nvPicPr>
+          <p:cNvPr id="70" name="Picture 69" descr="A computer screen shot of a device&#10;&#10;Description automatically generated with low confidence">
+            <a:extLst>
+              <a:ext uri="{FF2B5EF4-FFF2-40B4-BE49-F238E27FC236}">
+                <a16:creationId xmlns:a16="http://schemas.microsoft.com/office/drawing/2014/main" id="{D71D8DA8-CC22-83DE-F241-F716B529AB92}"/>
+              </a:ext>
+            </a:extLst>
+          </p:cNvPr>
+          <p:cNvPicPr>
+            <a:picLocks noChangeAspect="1"/>
+          </p:cNvPicPr>
+          <p:nvPr/>
+        </p:nvPicPr>
+        <p:blipFill>
+          <a:blip r:embed="rId3">
+            <a:extLst>
+              <a:ext uri="{28A0092B-C50C-407E-A947-70E740481C1C}">
+                <a14:useLocalDpi xmlns:a14="http://schemas.microsoft.com/office/drawing/2010/main" val="0"/>
+              </a:ext>
+            </a:extLst>
+          </a:blip>
+          <a:stretch>
+            <a:fillRect/>
+          </a:stretch>
+        </p:blipFill>
+        <p:spPr>
+          <a:xfrm>
+            <a:off x="4720781" y="4804212"/>
+            <a:ext cx="1593834" cy="828021"/>
+          </a:xfrm>
+          <a:prstGeom prst="rect">
+            <a:avLst/>
+          </a:prstGeom>
+          <a:ln w="12700">
+            <a:solidFill>
+              <a:schemeClr val="tx1"/>
+            </a:solidFill>
+          </a:ln>
+        </p:spPr>
+      </p:pic>
+      <p:sp>
+        <p:nvSpPr>
+          <p:cNvPr id="71" name="TextBox 70">
+            <a:extLst>
+              <a:ext uri="{FF2B5EF4-FFF2-40B4-BE49-F238E27FC236}">
+                <a16:creationId xmlns:a16="http://schemas.microsoft.com/office/drawing/2014/main" id="{809F6423-57B2-ABB8-77D1-9121CD4054F4}"/>
+              </a:ext>
+            </a:extLst>
+          </p:cNvPr>
+          <p:cNvSpPr txBox="1"/>
+          <p:nvPr/>
+        </p:nvSpPr>
+        <p:spPr>
+          <a:xfrm>
+            <a:off x="3426348" y="4639719"/>
+            <a:ext cx="1200828" cy="261610"/>
+          </a:xfrm>
+          <a:prstGeom prst="rect">
+            <a:avLst/>
+          </a:prstGeom>
+          <a:noFill/>
+        </p:spPr>
+        <p:txBody>
+          <a:bodyPr wrap="square" rtlCol="0">
+            <a:spAutoFit/>
+          </a:bodyPr>
+          <a:lstStyle/>
+          <a:p>
+            <a:r>
+              <a:rPr lang="en-US" sz="1100" dirty="0"/>
+              <a:t>PCL input data</a:t>
+            </a:r>
+            <a:endParaRPr lang="en-SG" sz="1100" dirty="0"/>
+          </a:p>
+        </p:txBody>
+      </p:sp>
+      <p:cxnSp>
+        <p:nvCxnSpPr>
+          <p:cNvPr id="72" name="Straight Arrow Connector 71">
+            <a:extLst>
+              <a:ext uri="{FF2B5EF4-FFF2-40B4-BE49-F238E27FC236}">
+                <a16:creationId xmlns:a16="http://schemas.microsoft.com/office/drawing/2014/main" id="{8448E405-2E54-560B-4102-77ACC1FE0BD2}"/>
+              </a:ext>
+            </a:extLst>
+          </p:cNvPr>
+          <p:cNvCxnSpPr>
+            <a:cxnSpLocks/>
+          </p:cNvCxnSpPr>
+          <p:nvPr/>
+        </p:nvCxnSpPr>
+        <p:spPr>
+          <a:xfrm flipH="1">
+            <a:off x="3289158" y="5120182"/>
+            <a:ext cx="1282842" cy="0"/>
+          </a:xfrm>
+          <a:prstGeom prst="straightConnector1">
+            <a:avLst/>
+          </a:prstGeom>
+          <a:ln w="19050">
+            <a:tailEnd type="triangle"/>
+          </a:ln>
+        </p:spPr>
+        <p:style>
+          <a:lnRef idx="1">
+            <a:schemeClr val="dk1"/>
+          </a:lnRef>
+          <a:fillRef idx="0">
+            <a:schemeClr val="dk1"/>
+          </a:fillRef>
+          <a:effectRef idx="0">
+            <a:schemeClr val="dk1"/>
+          </a:effectRef>
+          <a:fontRef idx="minor">
+            <a:schemeClr val="tx1"/>
+          </a:fontRef>
+        </p:style>
+      </p:cxnSp>
+      <p:sp>
+        <p:nvSpPr>
+          <p:cNvPr id="77" name="TextBox 76">
+            <a:extLst>
+              <a:ext uri="{FF2B5EF4-FFF2-40B4-BE49-F238E27FC236}">
+                <a16:creationId xmlns:a16="http://schemas.microsoft.com/office/drawing/2014/main" id="{E62E4869-EE66-D734-D721-76197B998F56}"/>
+              </a:ext>
+            </a:extLst>
+          </p:cNvPr>
+          <p:cNvSpPr txBox="1"/>
+          <p:nvPr/>
+        </p:nvSpPr>
+        <p:spPr>
+          <a:xfrm>
+            <a:off x="3366291" y="4881549"/>
+            <a:ext cx="1497188" cy="261610"/>
+          </a:xfrm>
+          <a:prstGeom prst="rect">
+            <a:avLst/>
+          </a:prstGeom>
+          <a:noFill/>
+        </p:spPr>
+        <p:txBody>
+          <a:bodyPr wrap="square" rtlCol="0">
+            <a:spAutoFit/>
+          </a:bodyPr>
+          <a:lstStyle/>
+          <a:p>
+            <a:r>
+              <a:rPr lang="en-US" sz="1100" dirty="0"/>
+              <a:t>PCL coil output data</a:t>
+            </a:r>
+            <a:endParaRPr lang="en-SG" sz="1100" dirty="0"/>
+          </a:p>
+        </p:txBody>
+      </p:sp>
+      <p:cxnSp>
+        <p:nvCxnSpPr>
+          <p:cNvPr id="78" name="Straight Arrow Connector 77">
+            <a:extLst>
+              <a:ext uri="{FF2B5EF4-FFF2-40B4-BE49-F238E27FC236}">
+                <a16:creationId xmlns:a16="http://schemas.microsoft.com/office/drawing/2014/main" id="{6900A1CA-DFD2-75DD-987D-55B0436B0F0E}"/>
+              </a:ext>
+            </a:extLst>
+          </p:cNvPr>
+          <p:cNvCxnSpPr>
+            <a:cxnSpLocks/>
+          </p:cNvCxnSpPr>
+          <p:nvPr/>
+        </p:nvCxnSpPr>
+        <p:spPr>
+          <a:xfrm>
+            <a:off x="6314615" y="5009621"/>
+            <a:ext cx="1231939" cy="0"/>
+          </a:xfrm>
+          <a:prstGeom prst="straightConnector1">
+            <a:avLst/>
+          </a:prstGeom>
+          <a:ln w="19050">
+            <a:tailEnd type="triangle"/>
+          </a:ln>
+        </p:spPr>
+        <p:style>
+          <a:lnRef idx="1">
+            <a:schemeClr val="dk1"/>
+          </a:lnRef>
+          <a:fillRef idx="0">
+            <a:schemeClr val="dk1"/>
+          </a:fillRef>
+          <a:effectRef idx="0">
+            <a:schemeClr val="dk1"/>
+          </a:effectRef>
+          <a:fontRef idx="minor">
+            <a:schemeClr val="tx1"/>
+          </a:fontRef>
+        </p:style>
+      </p:cxnSp>
+      <p:sp>
+        <p:nvSpPr>
+          <p:cNvPr id="81" name="TextBox 80">
+            <a:extLst>
+              <a:ext uri="{FF2B5EF4-FFF2-40B4-BE49-F238E27FC236}">
+                <a16:creationId xmlns:a16="http://schemas.microsoft.com/office/drawing/2014/main" id="{104AA528-64A0-268B-D60C-CC83F851335A}"/>
+              </a:ext>
+            </a:extLst>
+          </p:cNvPr>
+          <p:cNvSpPr txBox="1"/>
+          <p:nvPr/>
+        </p:nvSpPr>
+        <p:spPr>
+          <a:xfrm>
+            <a:off x="6468277" y="4673407"/>
+            <a:ext cx="1200828" cy="261610"/>
+          </a:xfrm>
+          <a:prstGeom prst="rect">
+            <a:avLst/>
+          </a:prstGeom>
+          <a:noFill/>
+        </p:spPr>
+        <p:txBody>
+          <a:bodyPr wrap="square" rtlCol="0">
+            <a:spAutoFit/>
+          </a:bodyPr>
+          <a:lstStyle/>
+          <a:p>
+            <a:r>
+              <a:rPr lang="en-US" sz="1100" dirty="0" err="1"/>
+              <a:t>ModBus</a:t>
+            </a:r>
+            <a:r>
+              <a:rPr lang="en-US" sz="1100" dirty="0"/>
+              <a:t> TCP</a:t>
+            </a:r>
+            <a:endParaRPr lang="en-SG" sz="1100" dirty="0"/>
+          </a:p>
+        </p:txBody>
+      </p:sp>
+      <p:pic>
+        <p:nvPicPr>
+          <p:cNvPr id="83" name="Picture 82">
+            <a:extLst>
+              <a:ext uri="{FF2B5EF4-FFF2-40B4-BE49-F238E27FC236}">
+                <a16:creationId xmlns:a16="http://schemas.microsoft.com/office/drawing/2014/main" id="{65101916-69F2-D39F-2C46-829C2AE149E8}"/>
+              </a:ext>
+            </a:extLst>
+          </p:cNvPr>
+          <p:cNvPicPr>
+            <a:picLocks noChangeAspect="1"/>
+          </p:cNvPicPr>
+          <p:nvPr/>
+        </p:nvPicPr>
+        <p:blipFill>
+          <a:blip r:embed="rId4"/>
+          <a:stretch>
+            <a:fillRect/>
+          </a:stretch>
+        </p:blipFill>
+        <p:spPr>
+          <a:xfrm>
+            <a:off x="7700216" y="4772050"/>
+            <a:ext cx="2842926" cy="1391379"/>
+          </a:xfrm>
+          <a:prstGeom prst="rect">
+            <a:avLst/>
+          </a:prstGeom>
+        </p:spPr>
+      </p:pic>
+      <p:sp>
+        <p:nvSpPr>
+          <p:cNvPr id="84" name="TextBox 83">
+            <a:extLst>
+              <a:ext uri="{FF2B5EF4-FFF2-40B4-BE49-F238E27FC236}">
+                <a16:creationId xmlns:a16="http://schemas.microsoft.com/office/drawing/2014/main" id="{E3849F7E-DF0B-2B27-D43E-68F559085493}"/>
+              </a:ext>
+            </a:extLst>
+          </p:cNvPr>
+          <p:cNvSpPr txBox="1"/>
+          <p:nvPr/>
+        </p:nvSpPr>
+        <p:spPr>
+          <a:xfrm>
+            <a:off x="4720781" y="4452857"/>
+            <a:ext cx="1911668" cy="307777"/>
+          </a:xfrm>
+          <a:prstGeom prst="rect">
+            <a:avLst/>
+          </a:prstGeom>
+          <a:noFill/>
+        </p:spPr>
+        <p:txBody>
+          <a:bodyPr wrap="square">
+            <a:spAutoFit/>
+          </a:bodyPr>
+          <a:lstStyle/>
+          <a:p>
+            <a:pPr algn="l" fontAlgn="base"/>
+            <a:r>
+              <a:rPr lang="en-SG" sz="1400" b="1" i="0" dirty="0">
+                <a:solidFill>
+                  <a:srgbClr val="000000"/>
+                </a:solidFill>
+                <a:effectLst/>
+              </a:rPr>
+              <a:t>PLC simulator VM</a:t>
+            </a:r>
+          </a:p>
+        </p:txBody>
+      </p:sp>
+      <p:sp>
+        <p:nvSpPr>
+          <p:cNvPr id="85" name="TextBox 84">
+            <a:extLst>
+              <a:ext uri="{FF2B5EF4-FFF2-40B4-BE49-F238E27FC236}">
+                <a16:creationId xmlns:a16="http://schemas.microsoft.com/office/drawing/2014/main" id="{7C79C244-1C46-E2AE-4B8A-F5DA8A8DA990}"/>
+              </a:ext>
+            </a:extLst>
+          </p:cNvPr>
+          <p:cNvSpPr txBox="1"/>
+          <p:nvPr/>
+        </p:nvSpPr>
+        <p:spPr>
+          <a:xfrm>
+            <a:off x="7669105" y="4491024"/>
+            <a:ext cx="2745722" cy="307777"/>
+          </a:xfrm>
+          <a:prstGeom prst="rect">
+            <a:avLst/>
+          </a:prstGeom>
+          <a:noFill/>
+        </p:spPr>
+        <p:txBody>
+          <a:bodyPr wrap="square">
+            <a:spAutoFit/>
+          </a:bodyPr>
+          <a:lstStyle/>
+          <a:p>
+            <a:pPr algn="l" fontAlgn="base"/>
+            <a:r>
+              <a:rPr lang="en-US" sz="1400" b="1" i="0" dirty="0">
+                <a:solidFill>
+                  <a:srgbClr val="000000"/>
+                </a:solidFill>
+                <a:effectLst/>
+              </a:rPr>
+              <a:t>SCADA HMI data Visualization </a:t>
+            </a:r>
+            <a:endParaRPr lang="en-SG" sz="1400" b="1" i="0" dirty="0">
+              <a:solidFill>
+                <a:srgbClr val="000000"/>
+              </a:solidFill>
+              <a:effectLst/>
+            </a:endParaRPr>
+          </a:p>
+        </p:txBody>
+      </p:sp>
+      <p:pic>
+        <p:nvPicPr>
+          <p:cNvPr id="87" name="Picture 86" descr="A computer screen shot of a computer&#10;&#10;Description automatically generated with low confidence">
+            <a:extLst>
+              <a:ext uri="{FF2B5EF4-FFF2-40B4-BE49-F238E27FC236}">
+                <a16:creationId xmlns:a16="http://schemas.microsoft.com/office/drawing/2014/main" id="{42045080-E7EA-9B65-FEBD-11E5B989378F}"/>
+              </a:ext>
+            </a:extLst>
+          </p:cNvPr>
+          <p:cNvPicPr>
+            <a:picLocks noChangeAspect="1"/>
+          </p:cNvPicPr>
+          <p:nvPr/>
+        </p:nvPicPr>
+        <p:blipFill rotWithShape="1">
+          <a:blip r:embed="rId5">
+            <a:extLst>
+              <a:ext uri="{28A0092B-C50C-407E-A947-70E740481C1C}">
+                <a14:useLocalDpi xmlns:a14="http://schemas.microsoft.com/office/drawing/2010/main" val="0"/>
+              </a:ext>
+            </a:extLst>
+          </a:blip>
+          <a:srcRect b="9806"/>
+          <a:stretch/>
+        </p:blipFill>
+        <p:spPr>
+          <a:xfrm>
+            <a:off x="7647081" y="2093206"/>
+            <a:ext cx="3900561" cy="2132647"/>
+          </a:xfrm>
+          <a:prstGeom prst="rect">
+            <a:avLst/>
+          </a:prstGeom>
+        </p:spPr>
+      </p:pic>
+      <p:sp>
+        <p:nvSpPr>
+          <p:cNvPr id="88" name="Rectangle 87">
+            <a:extLst>
+              <a:ext uri="{FF2B5EF4-FFF2-40B4-BE49-F238E27FC236}">
+                <a16:creationId xmlns:a16="http://schemas.microsoft.com/office/drawing/2014/main" id="{23810D1F-BE91-F086-89B1-665193FCB4A6}"/>
+              </a:ext>
+            </a:extLst>
+          </p:cNvPr>
+          <p:cNvSpPr/>
+          <p:nvPr/>
+        </p:nvSpPr>
+        <p:spPr>
+          <a:xfrm>
+            <a:off x="7700216" y="3736235"/>
+            <a:ext cx="1102261" cy="281009"/>
+          </a:xfrm>
+          <a:prstGeom prst="rect">
+            <a:avLst/>
+          </a:prstGeom>
+        </p:spPr>
+        <p:style>
+          <a:lnRef idx="2">
+            <a:schemeClr val="accent1">
+              <a:shade val="50000"/>
+            </a:schemeClr>
+          </a:lnRef>
+          <a:fillRef idx="1">
+            <a:schemeClr val="accent1"/>
+          </a:fillRef>
+          <a:effectRef idx="0">
+            <a:schemeClr val="accent1"/>
+          </a:effectRef>
+          <a:fontRef idx="minor">
+            <a:schemeClr val="lt1"/>
+          </a:fontRef>
+        </p:style>
+        <p:txBody>
+          <a:bodyPr rtlCol="0" anchor="ctr"/>
+          <a:lstStyle/>
+          <a:p>
+            <a:pPr algn="ctr"/>
+            <a:endParaRPr lang="en-SG"/>
+          </a:p>
+        </p:txBody>
+      </p:sp>
+      <p:cxnSp>
+        <p:nvCxnSpPr>
+          <p:cNvPr id="90" name="Straight Arrow Connector 89">
+            <a:extLst>
+              <a:ext uri="{FF2B5EF4-FFF2-40B4-BE49-F238E27FC236}">
+                <a16:creationId xmlns:a16="http://schemas.microsoft.com/office/drawing/2014/main" id="{F02E113B-6431-864F-D7E8-EAEBDBDBC375}"/>
+              </a:ext>
+            </a:extLst>
+          </p:cNvPr>
+          <p:cNvCxnSpPr/>
+          <p:nvPr/>
+        </p:nvCxnSpPr>
+        <p:spPr>
+          <a:xfrm flipV="1">
+            <a:off x="9397388" y="4275202"/>
+            <a:ext cx="0" cy="215822"/>
+          </a:xfrm>
+          <a:prstGeom prst="straightConnector1">
+            <a:avLst/>
+          </a:prstGeom>
+          <a:ln>
+            <a:tailEnd type="triangle"/>
+          </a:ln>
+        </p:spPr>
+        <p:style>
+          <a:lnRef idx="1">
+            <a:schemeClr val="accent1"/>
+          </a:lnRef>
+          <a:fillRef idx="0">
+            <a:schemeClr val="accent1"/>
+          </a:fillRef>
+          <a:effectRef idx="0">
+            <a:schemeClr val="accent1"/>
+          </a:effectRef>
+          <a:fontRef idx="minor">
+            <a:schemeClr val="tx1"/>
+          </a:fontRef>
+        </p:style>
+      </p:cxnSp>
+      <p:sp>
+        <p:nvSpPr>
+          <p:cNvPr id="91" name="TextBox 90">
+            <a:extLst>
+              <a:ext uri="{FF2B5EF4-FFF2-40B4-BE49-F238E27FC236}">
+                <a16:creationId xmlns:a16="http://schemas.microsoft.com/office/drawing/2014/main" id="{7754923C-E493-7A2D-5711-FF23F7CC8452}"/>
+              </a:ext>
+            </a:extLst>
+          </p:cNvPr>
+          <p:cNvSpPr txBox="1"/>
+          <p:nvPr/>
+        </p:nvSpPr>
+        <p:spPr>
+          <a:xfrm>
+            <a:off x="7647081" y="1736080"/>
+            <a:ext cx="2745722" cy="307777"/>
+          </a:xfrm>
+          <a:prstGeom prst="rect">
+            <a:avLst/>
+          </a:prstGeom>
+          <a:noFill/>
+        </p:spPr>
+        <p:txBody>
+          <a:bodyPr wrap="square">
+            <a:spAutoFit/>
+          </a:bodyPr>
+          <a:lstStyle/>
+          <a:p>
+            <a:pPr algn="l" fontAlgn="base"/>
+            <a:r>
+              <a:rPr lang="en-US" sz="1400" b="1" i="0" dirty="0">
+                <a:solidFill>
+                  <a:srgbClr val="000000"/>
+                </a:solidFill>
+                <a:effectLst/>
+              </a:rPr>
+              <a:t>Metro Control HMI</a:t>
+            </a:r>
+            <a:endParaRPr lang="en-SG" sz="1400" b="1" i="0" dirty="0">
+              <a:solidFill>
+                <a:srgbClr val="000000"/>
+              </a:solidFill>
+              <a:effectLst/>
+            </a:endParaRPr>
+          </a:p>
+        </p:txBody>
+      </p:sp>
+    </p:spTree>
+    <p:extLst>
+      <p:ext uri="{BB962C8B-B14F-4D97-AF65-F5344CB8AC3E}">
+        <p14:creationId xmlns:p14="http://schemas.microsoft.com/office/powerpoint/2010/main" val="3461767144"/>
       </p:ext>
     </p:extLst>
   </p:cSld>

</xml_diff>

<commit_message>
Added the label display, circuit logic and updated the document.
</commit_message>
<xml_diff>
--- a/doc/designDoc.pptx
+++ b/doc/designDoc.pptx
@@ -7,6 +7,7 @@
   <p:sldIdLst>
     <p:sldId id="256" r:id="rId2"/>
     <p:sldId id="257" r:id="rId3"/>
+    <p:sldId id="258" r:id="rId4"/>
   </p:sldIdLst>
   <p:sldSz cx="12192000" cy="6858000"/>
   <p:notesSz cx="6858000" cy="9144000"/>
@@ -262,7 +263,7 @@
           <a:p>
             <a:fld id="{F949A3E6-ADCC-4214-836D-B18BFC6F3D6C}" type="datetimeFigureOut">
               <a:rPr lang="en-SG" smtClean="0"/>
-              <a:t>4/6/2023</a:t>
+              <a:t>16/6/2023</a:t>
             </a:fld>
             <a:endParaRPr lang="en-SG"/>
           </a:p>
@@ -462,7 +463,7 @@
           <a:p>
             <a:fld id="{F949A3E6-ADCC-4214-836D-B18BFC6F3D6C}" type="datetimeFigureOut">
               <a:rPr lang="en-SG" smtClean="0"/>
-              <a:t>4/6/2023</a:t>
+              <a:t>16/6/2023</a:t>
             </a:fld>
             <a:endParaRPr lang="en-SG"/>
           </a:p>
@@ -672,7 +673,7 @@
           <a:p>
             <a:fld id="{F949A3E6-ADCC-4214-836D-B18BFC6F3D6C}" type="datetimeFigureOut">
               <a:rPr lang="en-SG" smtClean="0"/>
-              <a:t>4/6/2023</a:t>
+              <a:t>16/6/2023</a:t>
             </a:fld>
             <a:endParaRPr lang="en-SG"/>
           </a:p>
@@ -872,7 +873,7 @@
           <a:p>
             <a:fld id="{F949A3E6-ADCC-4214-836D-B18BFC6F3D6C}" type="datetimeFigureOut">
               <a:rPr lang="en-SG" smtClean="0"/>
-              <a:t>4/6/2023</a:t>
+              <a:t>16/6/2023</a:t>
             </a:fld>
             <a:endParaRPr lang="en-SG"/>
           </a:p>
@@ -1148,7 +1149,7 @@
           <a:p>
             <a:fld id="{F949A3E6-ADCC-4214-836D-B18BFC6F3D6C}" type="datetimeFigureOut">
               <a:rPr lang="en-SG" smtClean="0"/>
-              <a:t>4/6/2023</a:t>
+              <a:t>16/6/2023</a:t>
             </a:fld>
             <a:endParaRPr lang="en-SG"/>
           </a:p>
@@ -1416,7 +1417,7 @@
           <a:p>
             <a:fld id="{F949A3E6-ADCC-4214-836D-B18BFC6F3D6C}" type="datetimeFigureOut">
               <a:rPr lang="en-SG" smtClean="0"/>
-              <a:t>4/6/2023</a:t>
+              <a:t>16/6/2023</a:t>
             </a:fld>
             <a:endParaRPr lang="en-SG"/>
           </a:p>
@@ -1831,7 +1832,7 @@
           <a:p>
             <a:fld id="{F949A3E6-ADCC-4214-836D-B18BFC6F3D6C}" type="datetimeFigureOut">
               <a:rPr lang="en-SG" smtClean="0"/>
-              <a:t>4/6/2023</a:t>
+              <a:t>16/6/2023</a:t>
             </a:fld>
             <a:endParaRPr lang="en-SG"/>
           </a:p>
@@ -1973,7 +1974,7 @@
           <a:p>
             <a:fld id="{F949A3E6-ADCC-4214-836D-B18BFC6F3D6C}" type="datetimeFigureOut">
               <a:rPr lang="en-SG" smtClean="0"/>
-              <a:t>4/6/2023</a:t>
+              <a:t>16/6/2023</a:t>
             </a:fld>
             <a:endParaRPr lang="en-SG"/>
           </a:p>
@@ -2086,7 +2087,7 @@
           <a:p>
             <a:fld id="{F949A3E6-ADCC-4214-836D-B18BFC6F3D6C}" type="datetimeFigureOut">
               <a:rPr lang="en-SG" smtClean="0"/>
-              <a:t>4/6/2023</a:t>
+              <a:t>16/6/2023</a:t>
             </a:fld>
             <a:endParaRPr lang="en-SG"/>
           </a:p>
@@ -2399,7 +2400,7 @@
           <a:p>
             <a:fld id="{F949A3E6-ADCC-4214-836D-B18BFC6F3D6C}" type="datetimeFigureOut">
               <a:rPr lang="en-SG" smtClean="0"/>
-              <a:t>4/6/2023</a:t>
+              <a:t>16/6/2023</a:t>
             </a:fld>
             <a:endParaRPr lang="en-SG"/>
           </a:p>
@@ -2688,7 +2689,7 @@
           <a:p>
             <a:fld id="{F949A3E6-ADCC-4214-836D-B18BFC6F3D6C}" type="datetimeFigureOut">
               <a:rPr lang="en-SG" smtClean="0"/>
-              <a:t>4/6/2023</a:t>
+              <a:t>16/6/2023</a:t>
             </a:fld>
             <a:endParaRPr lang="en-SG"/>
           </a:p>
@@ -2931,7 +2932,7 @@
           <a:p>
             <a:fld id="{F949A3E6-ADCC-4214-836D-B18BFC6F3D6C}" type="datetimeFigureOut">
               <a:rPr lang="en-SG" smtClean="0"/>
-              <a:t>4/6/2023</a:t>
+              <a:t>16/6/2023</a:t>
             </a:fld>
             <a:endParaRPr lang="en-SG"/>
           </a:p>
@@ -4833,6 +4834,212 @@
 </p:sld>
 </file>
 
+<file path=ppt/slides/slide3.xml><?xml version="1.0" encoding="utf-8"?>
+<p:sld xmlns:a="http://schemas.openxmlformats.org/drawingml/2006/main" xmlns:r="http://schemas.openxmlformats.org/officeDocument/2006/relationships" xmlns:p="http://schemas.openxmlformats.org/presentationml/2006/main">
+  <p:cSld>
+    <p:spTree>
+      <p:nvGrpSpPr>
+        <p:cNvPr id="1" name=""/>
+        <p:cNvGrpSpPr/>
+        <p:nvPr/>
+      </p:nvGrpSpPr>
+      <p:grpSpPr>
+        <a:xfrm>
+          <a:off x="0" y="0"/>
+          <a:ext cx="0" cy="0"/>
+          <a:chOff x="0" y="0"/>
+          <a:chExt cx="0" cy="0"/>
+        </a:xfrm>
+      </p:grpSpPr>
+      <p:pic>
+        <p:nvPicPr>
+          <p:cNvPr id="5" name="Picture 4" descr="A picture containing diagram, line, technical drawing, plan&#10;&#10;Description automatically generated">
+            <a:extLst>
+              <a:ext uri="{FF2B5EF4-FFF2-40B4-BE49-F238E27FC236}">
+                <a16:creationId xmlns:a16="http://schemas.microsoft.com/office/drawing/2014/main" id="{B7E1B1BF-E455-7751-7F30-050D23B3A609}"/>
+              </a:ext>
+            </a:extLst>
+          </p:cNvPr>
+          <p:cNvPicPr>
+            <a:picLocks noChangeAspect="1"/>
+          </p:cNvPicPr>
+          <p:nvPr/>
+        </p:nvPicPr>
+        <p:blipFill>
+          <a:blip r:embed="rId2">
+            <a:extLst>
+              <a:ext uri="{28A0092B-C50C-407E-A947-70E740481C1C}">
+                <a14:useLocalDpi xmlns:a14="http://schemas.microsoft.com/office/drawing/2010/main" val="0"/>
+              </a:ext>
+            </a:extLst>
+          </a:blip>
+          <a:stretch>
+            <a:fillRect/>
+          </a:stretch>
+        </p:blipFill>
+        <p:spPr>
+          <a:xfrm>
+            <a:off x="839387" y="915041"/>
+            <a:ext cx="10171483" cy="4384072"/>
+          </a:xfrm>
+          <a:prstGeom prst="rect">
+            <a:avLst/>
+          </a:prstGeom>
+        </p:spPr>
+      </p:pic>
+      <p:sp>
+        <p:nvSpPr>
+          <p:cNvPr id="6" name="TextBox 5">
+            <a:extLst>
+              <a:ext uri="{FF2B5EF4-FFF2-40B4-BE49-F238E27FC236}">
+                <a16:creationId xmlns:a16="http://schemas.microsoft.com/office/drawing/2014/main" id="{D0C3E977-5B9D-CE12-A2B4-61E872D0B14E}"/>
+              </a:ext>
+            </a:extLst>
+          </p:cNvPr>
+          <p:cNvSpPr txBox="1"/>
+          <p:nvPr/>
+        </p:nvSpPr>
+        <p:spPr>
+          <a:xfrm>
+            <a:off x="1070961" y="1707869"/>
+            <a:ext cx="1044277" cy="461665"/>
+          </a:xfrm>
+          <a:prstGeom prst="rect">
+            <a:avLst/>
+          </a:prstGeom>
+          <a:noFill/>
+        </p:spPr>
+        <p:txBody>
+          <a:bodyPr wrap="square" rtlCol="0">
+            <a:spAutoFit/>
+          </a:bodyPr>
+          <a:lstStyle/>
+          <a:p>
+            <a:r>
+              <a:rPr lang="en-SG" sz="1200" dirty="0"/>
+              <a:t>Signal Trigger on sensor</a:t>
+            </a:r>
+          </a:p>
+        </p:txBody>
+      </p:sp>
+      <p:sp>
+        <p:nvSpPr>
+          <p:cNvPr id="7" name="TextBox 6">
+            <a:extLst>
+              <a:ext uri="{FF2B5EF4-FFF2-40B4-BE49-F238E27FC236}">
+                <a16:creationId xmlns:a16="http://schemas.microsoft.com/office/drawing/2014/main" id="{32DFEA97-1577-BF20-CB93-22DD764ACE6C}"/>
+              </a:ext>
+            </a:extLst>
+          </p:cNvPr>
+          <p:cNvSpPr txBox="1"/>
+          <p:nvPr/>
+        </p:nvSpPr>
+        <p:spPr>
+          <a:xfrm>
+            <a:off x="1070960" y="2967335"/>
+            <a:ext cx="1044277" cy="461665"/>
+          </a:xfrm>
+          <a:prstGeom prst="rect">
+            <a:avLst/>
+          </a:prstGeom>
+          <a:noFill/>
+        </p:spPr>
+        <p:txBody>
+          <a:bodyPr wrap="square" rtlCol="0">
+            <a:spAutoFit/>
+          </a:bodyPr>
+          <a:lstStyle/>
+          <a:p>
+            <a:r>
+              <a:rPr lang="en-SG" sz="1200" dirty="0"/>
+              <a:t>Signal Trigger off sensor</a:t>
+            </a:r>
+          </a:p>
+        </p:txBody>
+      </p:sp>
+      <p:sp>
+        <p:nvSpPr>
+          <p:cNvPr id="8" name="TextBox 7">
+            <a:extLst>
+              <a:ext uri="{FF2B5EF4-FFF2-40B4-BE49-F238E27FC236}">
+                <a16:creationId xmlns:a16="http://schemas.microsoft.com/office/drawing/2014/main" id="{4E497FAA-BF2C-463B-6D69-4AD90A0989F9}"/>
+              </a:ext>
+            </a:extLst>
+          </p:cNvPr>
+          <p:cNvSpPr txBox="1"/>
+          <p:nvPr/>
+        </p:nvSpPr>
+        <p:spPr>
+          <a:xfrm>
+            <a:off x="8836016" y="1762686"/>
+            <a:ext cx="1044277" cy="461665"/>
+          </a:xfrm>
+          <a:prstGeom prst="rect">
+            <a:avLst/>
+          </a:prstGeom>
+          <a:noFill/>
+        </p:spPr>
+        <p:txBody>
+          <a:bodyPr wrap="square" rtlCol="0">
+            <a:spAutoFit/>
+          </a:bodyPr>
+          <a:lstStyle/>
+          <a:p>
+            <a:r>
+              <a:rPr lang="en-SG" sz="1200" dirty="0"/>
+              <a:t>Railway control signal</a:t>
+            </a:r>
+          </a:p>
+        </p:txBody>
+      </p:sp>
+      <p:sp>
+        <p:nvSpPr>
+          <p:cNvPr id="9" name="TextBox 8">
+            <a:extLst>
+              <a:ext uri="{FF2B5EF4-FFF2-40B4-BE49-F238E27FC236}">
+                <a16:creationId xmlns:a16="http://schemas.microsoft.com/office/drawing/2014/main" id="{9CE0E749-3747-25AE-9562-2C94CF0C8BE0}"/>
+              </a:ext>
+            </a:extLst>
+          </p:cNvPr>
+          <p:cNvSpPr txBox="1"/>
+          <p:nvPr/>
+        </p:nvSpPr>
+        <p:spPr>
+          <a:xfrm>
+            <a:off x="2370840" y="915041"/>
+            <a:ext cx="5197748" cy="707886"/>
+          </a:xfrm>
+          <a:prstGeom prst="rect">
+            <a:avLst/>
+          </a:prstGeom>
+          <a:noFill/>
+        </p:spPr>
+        <p:txBody>
+          <a:bodyPr wrap="square" rtlCol="0">
+            <a:spAutoFit/>
+          </a:bodyPr>
+          <a:lstStyle/>
+          <a:p>
+            <a:r>
+              <a:rPr lang="en-SG" sz="2000" b="1" dirty="0"/>
+              <a:t>Use PLC to create a T Flip – Flop latching relay with signal trigger on has high priority  </a:t>
+            </a:r>
+          </a:p>
+        </p:txBody>
+      </p:sp>
+    </p:spTree>
+    <p:extLst>
+      <p:ext uri="{BB962C8B-B14F-4D97-AF65-F5344CB8AC3E}">
+        <p14:creationId xmlns:p14="http://schemas.microsoft.com/office/powerpoint/2010/main" val="880892208"/>
+      </p:ext>
+    </p:extLst>
+  </p:cSld>
+  <p:clrMapOvr>
+    <a:masterClrMapping/>
+  </p:clrMapOvr>
+</p:sld>
+</file>
+
 <file path=ppt/theme/theme1.xml><?xml version="1.0" encoding="utf-8"?>
 <a:theme xmlns:a="http://schemas.openxmlformats.org/drawingml/2006/main" name="Office Theme">
   <a:themeElements>

</xml_diff>

<commit_message>
Finished 2D Railway[Metro] System Real-world Emulator read me file and update the design document.
</commit_message>
<xml_diff>
--- a/doc/designDoc.pptx
+++ b/doc/designDoc.pptx
@@ -10521,7 +10521,7 @@
         </p:blipFill>
         <p:spPr>
           <a:xfrm>
-            <a:off x="666944" y="3522727"/>
+            <a:off x="666944" y="4365534"/>
             <a:ext cx="1552381" cy="1580952"/>
           </a:xfrm>
           <a:prstGeom prst="rect">
@@ -10550,7 +10550,7 @@
         </p:nvCxnSpPr>
         <p:spPr>
           <a:xfrm flipV="1">
-            <a:off x="857250" y="4955847"/>
+            <a:off x="857250" y="5798654"/>
             <a:ext cx="0" cy="409575"/>
           </a:xfrm>
           <a:prstGeom prst="straightConnector1">
@@ -10592,7 +10592,7 @@
         </p:nvSpPr>
         <p:spPr>
           <a:xfrm>
-            <a:off x="666944" y="5320606"/>
+            <a:off x="666944" y="6163413"/>
             <a:ext cx="1765252" cy="461665"/>
           </a:xfrm>
           <a:prstGeom prst="rect">
@@ -10636,7 +10636,7 @@
         </p:blipFill>
         <p:spPr>
           <a:xfrm>
-            <a:off x="2981176" y="4689232"/>
+            <a:off x="2981176" y="5532039"/>
             <a:ext cx="2380952" cy="676190"/>
           </a:xfrm>
           <a:prstGeom prst="rect">
@@ -10658,7 +10658,7 @@
         </p:nvSpPr>
         <p:spPr>
           <a:xfrm>
-            <a:off x="6525110" y="3522727"/>
+            <a:off x="6401285" y="4354486"/>
             <a:ext cx="3086250" cy="1200329"/>
           </a:xfrm>
           <a:prstGeom prst="rect">
@@ -10727,7 +10727,7 @@
         </p:blipFill>
         <p:spPr>
           <a:xfrm>
-            <a:off x="6525110" y="4682534"/>
+            <a:off x="6525110" y="5525341"/>
             <a:ext cx="2685714" cy="682887"/>
           </a:xfrm>
           <a:prstGeom prst="rect">
@@ -10749,7 +10749,7 @@
         </p:nvSpPr>
         <p:spPr>
           <a:xfrm>
-            <a:off x="2981176" y="3522727"/>
+            <a:off x="2857369" y="4365534"/>
             <a:ext cx="3086250" cy="1200329"/>
           </a:xfrm>
           <a:prstGeom prst="rect">
@@ -10796,6 +10796,282 @@
               <a:rPr lang="en-SG" sz="1200" dirty="0"/>
               <a:t>UI scenario : </a:t>
             </a:r>
+          </a:p>
+        </p:txBody>
+      </p:sp>
+      <p:pic>
+        <p:nvPicPr>
+          <p:cNvPr id="29" name="Picture 28">
+            <a:extLst>
+              <a:ext uri="{FF2B5EF4-FFF2-40B4-BE49-F238E27FC236}">
+                <a16:creationId xmlns:a16="http://schemas.microsoft.com/office/drawing/2014/main" id="{10E088EF-9559-1FF0-DFAA-06C556598D68}"/>
+              </a:ext>
+            </a:extLst>
+          </p:cNvPr>
+          <p:cNvPicPr>
+            <a:picLocks noChangeAspect="1"/>
+          </p:cNvPicPr>
+          <p:nvPr/>
+        </p:nvPicPr>
+        <p:blipFill>
+          <a:blip r:embed="rId6"/>
+          <a:stretch>
+            <a:fillRect/>
+          </a:stretch>
+        </p:blipFill>
+        <p:spPr>
+          <a:xfrm>
+            <a:off x="4038857" y="809621"/>
+            <a:ext cx="4114286" cy="3057143"/>
+          </a:xfrm>
+          <a:prstGeom prst="rect">
+            <a:avLst/>
+          </a:prstGeom>
+        </p:spPr>
+      </p:pic>
+      <p:cxnSp>
+        <p:nvCxnSpPr>
+          <p:cNvPr id="30" name="Straight Arrow Connector 29">
+            <a:extLst>
+              <a:ext uri="{FF2B5EF4-FFF2-40B4-BE49-F238E27FC236}">
+                <a16:creationId xmlns:a16="http://schemas.microsoft.com/office/drawing/2014/main" id="{CBDD4261-A65C-DE81-47F1-AB87A860D9F5}"/>
+              </a:ext>
+            </a:extLst>
+          </p:cNvPr>
+          <p:cNvCxnSpPr>
+            <a:cxnSpLocks/>
+          </p:cNvCxnSpPr>
+          <p:nvPr/>
+        </p:nvCxnSpPr>
+        <p:spPr>
+          <a:xfrm flipH="1">
+            <a:off x="4504136" y="1171575"/>
+            <a:ext cx="3794298" cy="0"/>
+          </a:xfrm>
+          <a:prstGeom prst="straightConnector1">
+            <a:avLst/>
+          </a:prstGeom>
+          <a:ln w="19050">
+            <a:solidFill>
+              <a:srgbClr val="FF0000"/>
+            </a:solidFill>
+            <a:tailEnd type="triangle"/>
+          </a:ln>
+        </p:spPr>
+        <p:style>
+          <a:lnRef idx="1">
+            <a:schemeClr val="accent1"/>
+          </a:lnRef>
+          <a:fillRef idx="0">
+            <a:schemeClr val="accent1"/>
+          </a:fillRef>
+          <a:effectRef idx="0">
+            <a:schemeClr val="accent1"/>
+          </a:effectRef>
+          <a:fontRef idx="minor">
+            <a:schemeClr val="tx1"/>
+          </a:fontRef>
+        </p:style>
+      </p:cxnSp>
+      <p:sp>
+        <p:nvSpPr>
+          <p:cNvPr id="32" name="TextBox 31">
+            <a:extLst>
+              <a:ext uri="{FF2B5EF4-FFF2-40B4-BE49-F238E27FC236}">
+                <a16:creationId xmlns:a16="http://schemas.microsoft.com/office/drawing/2014/main" id="{05CE139F-60B1-9102-6771-B945DE24C9EC}"/>
+              </a:ext>
+            </a:extLst>
+          </p:cNvPr>
+          <p:cNvSpPr txBox="1"/>
+          <p:nvPr/>
+        </p:nvSpPr>
+        <p:spPr>
+          <a:xfrm>
+            <a:off x="8328198" y="848409"/>
+            <a:ext cx="1644477" cy="646331"/>
+          </a:xfrm>
+          <a:prstGeom prst="rect">
+            <a:avLst/>
+          </a:prstGeom>
+          <a:noFill/>
+        </p:spPr>
+        <p:txBody>
+          <a:bodyPr wrap="square" rtlCol="0">
+            <a:spAutoFit/>
+          </a:bodyPr>
+          <a:lstStyle/>
+          <a:p>
+            <a:r>
+              <a:rPr lang="en-US" sz="1200" b="1" dirty="0"/>
+              <a:t>Step 1: click config dropdown menu and select “load scenario”</a:t>
+            </a:r>
+            <a:endParaRPr lang="en-SG" sz="1200" b="1" dirty="0"/>
+          </a:p>
+        </p:txBody>
+      </p:sp>
+      <p:cxnSp>
+        <p:nvCxnSpPr>
+          <p:cNvPr id="35" name="Straight Arrow Connector 34">
+            <a:extLst>
+              <a:ext uri="{FF2B5EF4-FFF2-40B4-BE49-F238E27FC236}">
+                <a16:creationId xmlns:a16="http://schemas.microsoft.com/office/drawing/2014/main" id="{0BF435BF-8698-C9B0-CFAB-0FA1FBD72E66}"/>
+              </a:ext>
+            </a:extLst>
+          </p:cNvPr>
+          <p:cNvCxnSpPr>
+            <a:cxnSpLocks/>
+          </p:cNvCxnSpPr>
+          <p:nvPr/>
+        </p:nvCxnSpPr>
+        <p:spPr>
+          <a:xfrm flipH="1">
+            <a:off x="7294704" y="2338193"/>
+            <a:ext cx="1033494" cy="383761"/>
+          </a:xfrm>
+          <a:prstGeom prst="straightConnector1">
+            <a:avLst/>
+          </a:prstGeom>
+          <a:ln w="19050">
+            <a:solidFill>
+              <a:srgbClr val="FF0000"/>
+            </a:solidFill>
+            <a:tailEnd type="triangle"/>
+          </a:ln>
+        </p:spPr>
+        <p:style>
+          <a:lnRef idx="1">
+            <a:schemeClr val="accent1"/>
+          </a:lnRef>
+          <a:fillRef idx="0">
+            <a:schemeClr val="accent1"/>
+          </a:fillRef>
+          <a:effectRef idx="0">
+            <a:schemeClr val="accent1"/>
+          </a:effectRef>
+          <a:fontRef idx="minor">
+            <a:schemeClr val="tx1"/>
+          </a:fontRef>
+        </p:style>
+      </p:cxnSp>
+      <p:sp>
+        <p:nvSpPr>
+          <p:cNvPr id="38" name="TextBox 37">
+            <a:extLst>
+              <a:ext uri="{FF2B5EF4-FFF2-40B4-BE49-F238E27FC236}">
+                <a16:creationId xmlns:a16="http://schemas.microsoft.com/office/drawing/2014/main" id="{FCC2338C-EF8D-A162-E347-F0452CDD99F0}"/>
+              </a:ext>
+            </a:extLst>
+          </p:cNvPr>
+          <p:cNvSpPr txBox="1"/>
+          <p:nvPr/>
+        </p:nvSpPr>
+        <p:spPr>
+          <a:xfrm>
+            <a:off x="8406236" y="1706291"/>
+            <a:ext cx="1488840" cy="1015663"/>
+          </a:xfrm>
+          <a:prstGeom prst="rect">
+            <a:avLst/>
+          </a:prstGeom>
+          <a:noFill/>
+        </p:spPr>
+        <p:txBody>
+          <a:bodyPr wrap="square" rtlCol="0">
+            <a:spAutoFit/>
+          </a:bodyPr>
+          <a:lstStyle/>
+          <a:p>
+            <a:r>
+              <a:rPr lang="en-US" sz="1200" b="1" dirty="0"/>
+              <a:t>Step 2:When the Scenario selection window pop-up,</a:t>
+            </a:r>
+          </a:p>
+          <a:p>
+            <a:r>
+              <a:rPr lang="en-US" sz="1200" b="1" dirty="0"/>
+              <a:t>Click the Scenario you want to load </a:t>
+            </a:r>
+            <a:endParaRPr lang="en-SG" sz="1200" b="1" dirty="0"/>
+          </a:p>
+        </p:txBody>
+      </p:sp>
+      <p:cxnSp>
+        <p:nvCxnSpPr>
+          <p:cNvPr id="39" name="Straight Arrow Connector 38">
+            <a:extLst>
+              <a:ext uri="{FF2B5EF4-FFF2-40B4-BE49-F238E27FC236}">
+                <a16:creationId xmlns:a16="http://schemas.microsoft.com/office/drawing/2014/main" id="{AEE0849A-80B4-1070-0AC4-BB7EF448A592}"/>
+              </a:ext>
+            </a:extLst>
+          </p:cNvPr>
+          <p:cNvCxnSpPr>
+            <a:cxnSpLocks/>
+          </p:cNvCxnSpPr>
+          <p:nvPr/>
+        </p:nvCxnSpPr>
+        <p:spPr>
+          <a:xfrm flipH="1">
+            <a:off x="6910916" y="3558504"/>
+            <a:ext cx="1387518" cy="0"/>
+          </a:xfrm>
+          <a:prstGeom prst="straightConnector1">
+            <a:avLst/>
+          </a:prstGeom>
+          <a:ln w="19050">
+            <a:solidFill>
+              <a:srgbClr val="FF0000"/>
+            </a:solidFill>
+            <a:tailEnd type="triangle"/>
+          </a:ln>
+        </p:spPr>
+        <p:style>
+          <a:lnRef idx="1">
+            <a:schemeClr val="accent1"/>
+          </a:lnRef>
+          <a:fillRef idx="0">
+            <a:schemeClr val="accent1"/>
+          </a:fillRef>
+          <a:effectRef idx="0">
+            <a:schemeClr val="accent1"/>
+          </a:effectRef>
+          <a:fontRef idx="minor">
+            <a:schemeClr val="tx1"/>
+          </a:fontRef>
+        </p:style>
+      </p:cxnSp>
+      <p:sp>
+        <p:nvSpPr>
+          <p:cNvPr id="41" name="TextBox 40">
+            <a:extLst>
+              <a:ext uri="{FF2B5EF4-FFF2-40B4-BE49-F238E27FC236}">
+                <a16:creationId xmlns:a16="http://schemas.microsoft.com/office/drawing/2014/main" id="{B3336306-03A6-E676-317A-B53B4721AF95}"/>
+              </a:ext>
+            </a:extLst>
+          </p:cNvPr>
+          <p:cNvSpPr txBox="1"/>
+          <p:nvPr/>
+        </p:nvSpPr>
+        <p:spPr>
+          <a:xfrm>
+            <a:off x="8388585" y="3220433"/>
+            <a:ext cx="1488840" cy="646331"/>
+          </a:xfrm>
+          <a:prstGeom prst="rect">
+            <a:avLst/>
+          </a:prstGeom>
+          <a:noFill/>
+        </p:spPr>
+        <p:txBody>
+          <a:bodyPr wrap="square" rtlCol="0">
+            <a:spAutoFit/>
+          </a:bodyPr>
+          <a:lstStyle/>
+          <a:p>
+            <a:r>
+              <a:rPr lang="en-US" sz="1200" b="1" dirty="0"/>
+              <a:t>Step 3: Click “OK” to load to the real-world simulator</a:t>
+            </a:r>
+            <a:endParaRPr lang="en-SG" sz="1200" b="1" dirty="0"/>
           </a:p>
         </p:txBody>
       </p:sp>

</xml_diff>

<commit_message>
Added the config loader to sensors-signal PLC module
</commit_message>
<xml_diff>
--- a/doc/designDoc.pptx
+++ b/doc/designDoc.pptx
@@ -17841,41 +17841,6 @@
           </a:p>
         </p:txBody>
       </p:sp>
-      <p:pic>
-        <p:nvPicPr>
-          <p:cNvPr id="141" name="Picture 140">
-            <a:extLst>
-              <a:ext uri="{FF2B5EF4-FFF2-40B4-BE49-F238E27FC236}">
-                <a16:creationId xmlns:a16="http://schemas.microsoft.com/office/drawing/2014/main" id="{F10407DC-81A7-EFA4-AB9C-6ED1B2231B8A}"/>
-              </a:ext>
-            </a:extLst>
-          </p:cNvPr>
-          <p:cNvPicPr>
-            <a:picLocks noChangeAspect="1"/>
-          </p:cNvPicPr>
-          <p:nvPr/>
-        </p:nvPicPr>
-        <p:blipFill>
-          <a:blip r:embed="rId8"/>
-          <a:stretch>
-            <a:fillRect/>
-          </a:stretch>
-        </p:blipFill>
-        <p:spPr>
-          <a:xfrm>
-            <a:off x="9905993" y="4976367"/>
-            <a:ext cx="1550062" cy="1078304"/>
-          </a:xfrm>
-          <a:prstGeom prst="rect">
-            <a:avLst/>
-          </a:prstGeom>
-          <a:ln w="12700">
-            <a:solidFill>
-              <a:schemeClr val="tx1"/>
-            </a:solidFill>
-          </a:ln>
-        </p:spPr>
-      </p:pic>
       <p:cxnSp>
         <p:nvCxnSpPr>
           <p:cNvPr id="143" name="Straight Arrow Connector 142">
@@ -17981,7 +17946,7 @@
         <p:spPr>
           <a:xfrm>
             <a:off x="9610885" y="4526894"/>
-            <a:ext cx="2392975" cy="523220"/>
+            <a:ext cx="2392975" cy="307777"/>
           </a:xfrm>
           <a:prstGeom prst="rect">
             <a:avLst/>
@@ -17996,7 +17961,7 @@
           <a:p>
             <a:r>
               <a:rPr lang="en-US" sz="1400" b="1" dirty="0"/>
-              <a:t>Train Control panel [under progress]</a:t>
+              <a:t>Train Control panel</a:t>
             </a:r>
             <a:endParaRPr lang="en-SG" sz="1400" b="1" dirty="0"/>
           </a:p>
@@ -18244,6 +18209,42 @@
           </a:fontRef>
         </p:style>
       </p:cxnSp>
+      <p:pic>
+        <p:nvPicPr>
+          <p:cNvPr id="3" name="Picture 2" descr="A screenshot of a computer&#10;&#10;Description automatically generated">
+            <a:extLst>
+              <a:ext uri="{FF2B5EF4-FFF2-40B4-BE49-F238E27FC236}">
+                <a16:creationId xmlns:a16="http://schemas.microsoft.com/office/drawing/2014/main" id="{8B691F79-4986-D6D9-352A-1596A47D56D3}"/>
+              </a:ext>
+            </a:extLst>
+          </p:cNvPr>
+          <p:cNvPicPr>
+            <a:picLocks noChangeAspect="1"/>
+          </p:cNvPicPr>
+          <p:nvPr/>
+        </p:nvPicPr>
+        <p:blipFill>
+          <a:blip r:embed="rId8">
+            <a:extLst>
+              <a:ext uri="{28A0092B-C50C-407E-A947-70E740481C1C}">
+                <a14:useLocalDpi xmlns:a14="http://schemas.microsoft.com/office/drawing/2010/main" val="0"/>
+              </a:ext>
+            </a:extLst>
+          </a:blip>
+          <a:stretch>
+            <a:fillRect/>
+          </a:stretch>
+        </p:blipFill>
+        <p:spPr>
+          <a:xfrm>
+            <a:off x="9956853" y="4817567"/>
+            <a:ext cx="1940674" cy="1052153"/>
+          </a:xfrm>
+          <a:prstGeom prst="rect">
+            <a:avLst/>
+          </a:prstGeom>
+        </p:spPr>
+      </p:pic>
     </p:spTree>
     <p:extLst>
       <p:ext uri="{BB962C8B-B14F-4D97-AF65-F5344CB8AC3E}">

</xml_diff>

<commit_message>
Created the scada-hmi read me and update the main read me file.
</commit_message>
<xml_diff>
--- a/doc/designDoc.pptx
+++ b/doc/designDoc.pptx
@@ -216,7 +216,7 @@
           <a:p>
             <a:fld id="{C0790970-3005-464C-B0F1-2C170134C482}" type="datetimeFigureOut">
               <a:rPr lang="en-SG" smtClean="0"/>
-              <a:t>27/7/2023</a:t>
+              <a:t>28/7/2023</a:t>
             </a:fld>
             <a:endParaRPr lang="en-SG"/>
           </a:p>
@@ -885,7 +885,7 @@
           <a:p>
             <a:fld id="{F949A3E6-ADCC-4214-836D-B18BFC6F3D6C}" type="datetimeFigureOut">
               <a:rPr lang="en-SG" smtClean="0"/>
-              <a:t>27/7/2023</a:t>
+              <a:t>28/7/2023</a:t>
             </a:fld>
             <a:endParaRPr lang="en-SG"/>
           </a:p>
@@ -1085,7 +1085,7 @@
           <a:p>
             <a:fld id="{F949A3E6-ADCC-4214-836D-B18BFC6F3D6C}" type="datetimeFigureOut">
               <a:rPr lang="en-SG" smtClean="0"/>
-              <a:t>27/7/2023</a:t>
+              <a:t>28/7/2023</a:t>
             </a:fld>
             <a:endParaRPr lang="en-SG"/>
           </a:p>
@@ -1295,7 +1295,7 @@
           <a:p>
             <a:fld id="{F949A3E6-ADCC-4214-836D-B18BFC6F3D6C}" type="datetimeFigureOut">
               <a:rPr lang="en-SG" smtClean="0"/>
-              <a:t>27/7/2023</a:t>
+              <a:t>28/7/2023</a:t>
             </a:fld>
             <a:endParaRPr lang="en-SG"/>
           </a:p>
@@ -1495,7 +1495,7 @@
           <a:p>
             <a:fld id="{F949A3E6-ADCC-4214-836D-B18BFC6F3D6C}" type="datetimeFigureOut">
               <a:rPr lang="en-SG" smtClean="0"/>
-              <a:t>27/7/2023</a:t>
+              <a:t>28/7/2023</a:t>
             </a:fld>
             <a:endParaRPr lang="en-SG"/>
           </a:p>
@@ -1771,7 +1771,7 @@
           <a:p>
             <a:fld id="{F949A3E6-ADCC-4214-836D-B18BFC6F3D6C}" type="datetimeFigureOut">
               <a:rPr lang="en-SG" smtClean="0"/>
-              <a:t>27/7/2023</a:t>
+              <a:t>28/7/2023</a:t>
             </a:fld>
             <a:endParaRPr lang="en-SG"/>
           </a:p>
@@ -2039,7 +2039,7 @@
           <a:p>
             <a:fld id="{F949A3E6-ADCC-4214-836D-B18BFC6F3D6C}" type="datetimeFigureOut">
               <a:rPr lang="en-SG" smtClean="0"/>
-              <a:t>27/7/2023</a:t>
+              <a:t>28/7/2023</a:t>
             </a:fld>
             <a:endParaRPr lang="en-SG"/>
           </a:p>
@@ -2454,7 +2454,7 @@
           <a:p>
             <a:fld id="{F949A3E6-ADCC-4214-836D-B18BFC6F3D6C}" type="datetimeFigureOut">
               <a:rPr lang="en-SG" smtClean="0"/>
-              <a:t>27/7/2023</a:t>
+              <a:t>28/7/2023</a:t>
             </a:fld>
             <a:endParaRPr lang="en-SG"/>
           </a:p>
@@ -2596,7 +2596,7 @@
           <a:p>
             <a:fld id="{F949A3E6-ADCC-4214-836D-B18BFC6F3D6C}" type="datetimeFigureOut">
               <a:rPr lang="en-SG" smtClean="0"/>
-              <a:t>27/7/2023</a:t>
+              <a:t>28/7/2023</a:t>
             </a:fld>
             <a:endParaRPr lang="en-SG"/>
           </a:p>
@@ -2709,7 +2709,7 @@
           <a:p>
             <a:fld id="{F949A3E6-ADCC-4214-836D-B18BFC6F3D6C}" type="datetimeFigureOut">
               <a:rPr lang="en-SG" smtClean="0"/>
-              <a:t>27/7/2023</a:t>
+              <a:t>28/7/2023</a:t>
             </a:fld>
             <a:endParaRPr lang="en-SG"/>
           </a:p>
@@ -3022,7 +3022,7 @@
           <a:p>
             <a:fld id="{F949A3E6-ADCC-4214-836D-B18BFC6F3D6C}" type="datetimeFigureOut">
               <a:rPr lang="en-SG" smtClean="0"/>
-              <a:t>27/7/2023</a:t>
+              <a:t>28/7/2023</a:t>
             </a:fld>
             <a:endParaRPr lang="en-SG"/>
           </a:p>
@@ -3311,7 +3311,7 @@
           <a:p>
             <a:fld id="{F949A3E6-ADCC-4214-836D-B18BFC6F3D6C}" type="datetimeFigureOut">
               <a:rPr lang="en-SG" smtClean="0"/>
-              <a:t>27/7/2023</a:t>
+              <a:t>28/7/2023</a:t>
             </a:fld>
             <a:endParaRPr lang="en-SG"/>
           </a:p>
@@ -3554,7 +3554,7 @@
           <a:p>
             <a:fld id="{F949A3E6-ADCC-4214-836D-B18BFC6F3D6C}" type="datetimeFigureOut">
               <a:rPr lang="en-SG" smtClean="0"/>
-              <a:t>27/7/2023</a:t>
+              <a:t>28/7/2023</a:t>
             </a:fld>
             <a:endParaRPr lang="en-SG"/>
           </a:p>
@@ -11165,13 +11165,8 @@
           <a:p>
             <a:r>
               <a:rPr lang="en-US" sz="1400" b="1" dirty="0"/>
-              <a:t>Emergency Stop </a:t>
-            </a:r>
-            <a:r>
-              <a:rPr lang="en-US" sz="1400" b="1"/>
-              <a:t>button pressed (Mode-B) :</a:t>
-            </a:r>
-            <a:endParaRPr lang="en-US" sz="1400" b="1" dirty="0"/>
+              <a:t>Emergency Stop button pressed (Mode-B) :</a:t>
+            </a:r>
           </a:p>
           <a:p>
             <a:pPr marL="285750" indent="-285750">
@@ -11566,10 +11561,10 @@
       </p:grpSpPr>
       <p:sp>
         <p:nvSpPr>
-          <p:cNvPr id="119" name="Rectangle 118">
-            <a:extLst>
-              <a:ext uri="{FF2B5EF4-FFF2-40B4-BE49-F238E27FC236}">
-                <a16:creationId xmlns:a16="http://schemas.microsoft.com/office/drawing/2014/main" id="{03F3736B-1922-F568-D223-82D2F118AA8F}"/>
+          <p:cNvPr id="78" name="Rectangle 77">
+            <a:extLst>
+              <a:ext uri="{FF2B5EF4-FFF2-40B4-BE49-F238E27FC236}">
+                <a16:creationId xmlns:a16="http://schemas.microsoft.com/office/drawing/2014/main" id="{D3C53F0D-B84B-E4A7-56B0-1901919DC730}"/>
               </a:ext>
             </a:extLst>
           </p:cNvPr>
@@ -11578,8 +11573,8 @@
         </p:nvSpPr>
         <p:spPr>
           <a:xfrm>
-            <a:off x="9541673" y="4237630"/>
-            <a:ext cx="2364283" cy="1321827"/>
+            <a:off x="8943355" y="490106"/>
+            <a:ext cx="3016073" cy="2116573"/>
           </a:xfrm>
           <a:prstGeom prst="rect">
             <a:avLst/>
@@ -11612,10 +11607,10 @@
       </p:sp>
       <p:pic>
         <p:nvPicPr>
-          <p:cNvPr id="120" name="Picture 119">
-            <a:extLst>
-              <a:ext uri="{FF2B5EF4-FFF2-40B4-BE49-F238E27FC236}">
-                <a16:creationId xmlns:a16="http://schemas.microsoft.com/office/drawing/2014/main" id="{F7573D67-03E4-C237-E959-6E6986166C99}"/>
+          <p:cNvPr id="25" name="Picture 24" descr="A screenshot of a computer&#10;&#10;Description automatically generated">
+            <a:extLst>
+              <a:ext uri="{FF2B5EF4-FFF2-40B4-BE49-F238E27FC236}">
+                <a16:creationId xmlns:a16="http://schemas.microsoft.com/office/drawing/2014/main" id="{AD9A7D63-412C-FC19-A2D2-0B55C22CA078}"/>
               </a:ext>
             </a:extLst>
           </p:cNvPr>
@@ -11625,15 +11620,21 @@
           <p:nvPr/>
         </p:nvPicPr>
         <p:blipFill>
-          <a:blip r:embed="rId2"/>
+          <a:blip r:embed="rId2">
+            <a:extLst>
+              <a:ext uri="{28A0092B-C50C-407E-A947-70E740481C1C}">
+                <a14:useLocalDpi xmlns:a14="http://schemas.microsoft.com/office/drawing/2010/main" val="0"/>
+              </a:ext>
+            </a:extLst>
+          </a:blip>
           <a:stretch>
             <a:fillRect/>
           </a:stretch>
         </p:blipFill>
         <p:spPr>
           <a:xfrm>
-            <a:off x="9620136" y="4065096"/>
-            <a:ext cx="327214" cy="318603"/>
+            <a:off x="8965833" y="780068"/>
+            <a:ext cx="2944693" cy="1686686"/>
           </a:xfrm>
           <a:prstGeom prst="rect">
             <a:avLst/>
@@ -11642,10 +11643,10 @@
       </p:pic>
       <p:sp>
         <p:nvSpPr>
-          <p:cNvPr id="5" name="Rectangle 4">
-            <a:extLst>
-              <a:ext uri="{FF2B5EF4-FFF2-40B4-BE49-F238E27FC236}">
-                <a16:creationId xmlns:a16="http://schemas.microsoft.com/office/drawing/2014/main" id="{CA27E920-3741-D55F-DF77-C548D6EDD033}"/>
+          <p:cNvPr id="74" name="Rectangle 73">
+            <a:extLst>
+              <a:ext uri="{FF2B5EF4-FFF2-40B4-BE49-F238E27FC236}">
+                <a16:creationId xmlns:a16="http://schemas.microsoft.com/office/drawing/2014/main" id="{4CBC52BC-E17E-1A9F-5D1E-C28D20AAB999}"/>
               </a:ext>
             </a:extLst>
           </p:cNvPr>
@@ -11654,8 +11655,8 @@
         </p:nvSpPr>
         <p:spPr>
           <a:xfrm>
-            <a:off x="194316" y="637948"/>
-            <a:ext cx="4738872" cy="2928212"/>
+            <a:off x="5612820" y="521261"/>
+            <a:ext cx="3016073" cy="2116573"/>
           </a:xfrm>
           <a:prstGeom prst="rect">
             <a:avLst/>
@@ -11688,10 +11689,10 @@
       </p:sp>
       <p:pic>
         <p:nvPicPr>
-          <p:cNvPr id="4" name="Picture 3" descr="A picture containing text, screenshot, display, diagram&#10;&#10;Description automatically generated">
-            <a:extLst>
-              <a:ext uri="{FF2B5EF4-FFF2-40B4-BE49-F238E27FC236}">
-                <a16:creationId xmlns:a16="http://schemas.microsoft.com/office/drawing/2014/main" id="{8CB88704-3F40-506B-68C8-74A83386D909}"/>
+          <p:cNvPr id="15" name="Picture 14" descr="A screenshot of a computer&#10;&#10;Description automatically generated">
+            <a:extLst>
+              <a:ext uri="{FF2B5EF4-FFF2-40B4-BE49-F238E27FC236}">
+                <a16:creationId xmlns:a16="http://schemas.microsoft.com/office/drawing/2014/main" id="{34AB4435-843D-8B4B-2C08-555AD72A6898}"/>
               </a:ext>
             </a:extLst>
           </p:cNvPr>
@@ -11701,7 +11702,7 @@
           <p:nvPr/>
         </p:nvPicPr>
         <p:blipFill>
-          <a:blip r:embed="rId3">
+          <a:blip r:embed="rId2">
             <a:extLst>
               <a:ext uri="{28A0092B-C50C-407E-A947-70E740481C1C}">
                 <a14:useLocalDpi xmlns:a14="http://schemas.microsoft.com/office/drawing/2010/main" val="0"/>
@@ -11714,17 +11715,170 @@
         </p:blipFill>
         <p:spPr>
           <a:xfrm>
-            <a:off x="409200" y="1087160"/>
-            <a:ext cx="3998208" cy="2222968"/>
+            <a:off x="5673846" y="788999"/>
+            <a:ext cx="2944693" cy="1686686"/>
+          </a:xfrm>
+          <a:prstGeom prst="rect">
+            <a:avLst/>
+          </a:prstGeom>
+        </p:spPr>
+      </p:pic>
+      <p:sp>
+        <p:nvSpPr>
+          <p:cNvPr id="5" name="Rectangle 4">
+            <a:extLst>
+              <a:ext uri="{FF2B5EF4-FFF2-40B4-BE49-F238E27FC236}">
+                <a16:creationId xmlns:a16="http://schemas.microsoft.com/office/drawing/2014/main" id="{CA27E920-3741-D55F-DF77-C548D6EDD033}"/>
+              </a:ext>
+            </a:extLst>
+          </p:cNvPr>
+          <p:cNvSpPr/>
+          <p:nvPr/>
+        </p:nvSpPr>
+        <p:spPr>
+          <a:xfrm>
+            <a:off x="194316" y="637948"/>
+            <a:ext cx="4738872" cy="2928212"/>
           </a:xfrm>
           <a:prstGeom prst="rect">
             <a:avLst/>
           </a:prstGeom>
           <a:ln w="9525">
-            <a:solidFill>
-              <a:schemeClr val="tx1"/>
-            </a:solidFill>
+            <a:prstDash val="sysDash"/>
           </a:ln>
+        </p:spPr>
+        <p:style>
+          <a:lnRef idx="2">
+            <a:schemeClr val="accent1"/>
+          </a:lnRef>
+          <a:fillRef idx="1">
+            <a:schemeClr val="lt1"/>
+          </a:fillRef>
+          <a:effectRef idx="0">
+            <a:schemeClr val="accent1"/>
+          </a:effectRef>
+          <a:fontRef idx="minor">
+            <a:schemeClr val="dk1"/>
+          </a:fontRef>
+        </p:style>
+        <p:txBody>
+          <a:bodyPr rtlCol="0" anchor="ctr"/>
+          <a:lstStyle/>
+          <a:p>
+            <a:endParaRPr lang="en-SG" sz="1400" b="1" dirty="0"/>
+          </a:p>
+        </p:txBody>
+      </p:sp>
+      <p:pic>
+        <p:nvPicPr>
+          <p:cNvPr id="6" name="Picture 5" descr="A computer screen shot of a computer scheme&#10;&#10;Description automatically generated">
+            <a:extLst>
+              <a:ext uri="{FF2B5EF4-FFF2-40B4-BE49-F238E27FC236}">
+                <a16:creationId xmlns:a16="http://schemas.microsoft.com/office/drawing/2014/main" id="{91C44405-9AE7-F560-2C3A-EC66C96DD077}"/>
+              </a:ext>
+            </a:extLst>
+          </p:cNvPr>
+          <p:cNvPicPr>
+            <a:picLocks noChangeAspect="1"/>
+          </p:cNvPicPr>
+          <p:nvPr/>
+        </p:nvPicPr>
+        <p:blipFill>
+          <a:blip r:embed="rId3">
+            <a:extLst>
+              <a:ext uri="{28A0092B-C50C-407E-A947-70E740481C1C}">
+                <a14:useLocalDpi xmlns:a14="http://schemas.microsoft.com/office/drawing/2010/main" val="0"/>
+              </a:ext>
+            </a:extLst>
+          </a:blip>
+          <a:stretch>
+            <a:fillRect/>
+          </a:stretch>
+        </p:blipFill>
+        <p:spPr>
+          <a:xfrm>
+            <a:off x="400645" y="845014"/>
+            <a:ext cx="4392290" cy="2515853"/>
+          </a:xfrm>
+          <a:prstGeom prst="rect">
+            <a:avLst/>
+          </a:prstGeom>
+        </p:spPr>
+      </p:pic>
+      <p:sp>
+        <p:nvSpPr>
+          <p:cNvPr id="119" name="Rectangle 118">
+            <a:extLst>
+              <a:ext uri="{FF2B5EF4-FFF2-40B4-BE49-F238E27FC236}">
+                <a16:creationId xmlns:a16="http://schemas.microsoft.com/office/drawing/2014/main" id="{03F3736B-1922-F568-D223-82D2F118AA8F}"/>
+              </a:ext>
+            </a:extLst>
+          </p:cNvPr>
+          <p:cNvSpPr/>
+          <p:nvPr/>
+        </p:nvSpPr>
+        <p:spPr>
+          <a:xfrm>
+            <a:off x="9564788" y="4279461"/>
+            <a:ext cx="2364283" cy="1321827"/>
+          </a:xfrm>
+          <a:prstGeom prst="rect">
+            <a:avLst/>
+          </a:prstGeom>
+          <a:ln w="9525">
+            <a:prstDash val="sysDash"/>
+          </a:ln>
+        </p:spPr>
+        <p:style>
+          <a:lnRef idx="2">
+            <a:schemeClr val="accent1"/>
+          </a:lnRef>
+          <a:fillRef idx="1">
+            <a:schemeClr val="lt1"/>
+          </a:fillRef>
+          <a:effectRef idx="0">
+            <a:schemeClr val="accent1"/>
+          </a:effectRef>
+          <a:fontRef idx="minor">
+            <a:schemeClr val="dk1"/>
+          </a:fontRef>
+        </p:style>
+        <p:txBody>
+          <a:bodyPr rtlCol="0" anchor="ctr"/>
+          <a:lstStyle/>
+          <a:p>
+            <a:endParaRPr lang="en-SG" sz="1400" b="1" dirty="0"/>
+          </a:p>
+        </p:txBody>
+      </p:sp>
+      <p:pic>
+        <p:nvPicPr>
+          <p:cNvPr id="120" name="Picture 119">
+            <a:extLst>
+              <a:ext uri="{FF2B5EF4-FFF2-40B4-BE49-F238E27FC236}">
+                <a16:creationId xmlns:a16="http://schemas.microsoft.com/office/drawing/2014/main" id="{F7573D67-03E4-C237-E959-6E6986166C99}"/>
+              </a:ext>
+            </a:extLst>
+          </p:cNvPr>
+          <p:cNvPicPr>
+            <a:picLocks noChangeAspect="1"/>
+          </p:cNvPicPr>
+          <p:nvPr/>
+        </p:nvPicPr>
+        <p:blipFill>
+          <a:blip r:embed="rId4"/>
+          <a:stretch>
+            <a:fillRect/>
+          </a:stretch>
+        </p:blipFill>
+        <p:spPr>
+          <a:xfrm>
+            <a:off x="9620618" y="4027582"/>
+            <a:ext cx="327214" cy="318603"/>
+          </a:xfrm>
+          <a:prstGeom prst="rect">
+            <a:avLst/>
+          </a:prstGeom>
         </p:spPr>
       </p:pic>
       <p:pic>
@@ -11742,7 +11896,7 @@
           <p:nvPr/>
         </p:nvPicPr>
         <p:blipFill>
-          <a:blip r:embed="rId2"/>
+          <a:blip r:embed="rId4"/>
           <a:stretch>
             <a:fillRect/>
           </a:stretch>
@@ -11808,7 +11962,7 @@
           <p:nvPr/>
         </p:nvPicPr>
         <p:blipFill>
-          <a:blip r:embed="rId4">
+          <a:blip r:embed="rId5">
             <a:extLst>
               <a:ext uri="{28A0092B-C50C-407E-A947-70E740481C1C}">
                 <a14:useLocalDpi xmlns:a14="http://schemas.microsoft.com/office/drawing/2010/main" val="0"/>
@@ -11895,7 +12049,7 @@
           <p:nvPr/>
         </p:nvPicPr>
         <p:blipFill>
-          <a:blip r:embed="rId5">
+          <a:blip r:embed="rId6">
             <a:extLst>
               <a:ext uri="{28A0092B-C50C-407E-A947-70E740481C1C}">
                 <a14:useLocalDpi xmlns:a14="http://schemas.microsoft.com/office/drawing/2010/main" val="0"/>
@@ -12028,7 +12182,7 @@
           <p:nvPr/>
         </p:nvPicPr>
         <p:blipFill>
-          <a:blip r:embed="rId2"/>
+          <a:blip r:embed="rId4"/>
           <a:stretch>
             <a:fillRect/>
           </a:stretch>
@@ -12058,7 +12212,7 @@
           <p:nvPr/>
         </p:nvPicPr>
         <p:blipFill>
-          <a:blip r:embed="rId6">
+          <a:blip r:embed="rId7">
             <a:extLst>
               <a:ext uri="{28A0092B-C50C-407E-A947-70E740481C1C}">
                 <a14:useLocalDpi xmlns:a14="http://schemas.microsoft.com/office/drawing/2010/main" val="0"/>
@@ -12145,7 +12299,7 @@
           <p:nvPr/>
         </p:nvPicPr>
         <p:blipFill>
-          <a:blip r:embed="rId2"/>
+          <a:blip r:embed="rId4"/>
           <a:stretch>
             <a:fillRect/>
           </a:stretch>
@@ -12175,7 +12329,7 @@
           <p:nvPr/>
         </p:nvPicPr>
         <p:blipFill>
-          <a:blip r:embed="rId6">
+          <a:blip r:embed="rId7">
             <a:extLst>
               <a:ext uri="{28A0092B-C50C-407E-A947-70E740481C1C}">
                 <a14:useLocalDpi xmlns:a14="http://schemas.microsoft.com/office/drawing/2010/main" val="0"/>
@@ -12262,7 +12416,7 @@
           <p:nvPr/>
         </p:nvPicPr>
         <p:blipFill>
-          <a:blip r:embed="rId2"/>
+          <a:blip r:embed="rId4"/>
           <a:stretch>
             <a:fillRect/>
           </a:stretch>
@@ -12292,7 +12446,7 @@
           <p:nvPr/>
         </p:nvPicPr>
         <p:blipFill>
-          <a:blip r:embed="rId6">
+          <a:blip r:embed="rId7">
             <a:extLst>
               <a:ext uri="{28A0092B-C50C-407E-A947-70E740481C1C}">
                 <a14:useLocalDpi xmlns:a14="http://schemas.microsoft.com/office/drawing/2010/main" val="0"/>
@@ -12333,7 +12487,7 @@
           <p:nvPr/>
         </p:nvPicPr>
         <p:blipFill>
-          <a:blip r:embed="rId2"/>
+          <a:blip r:embed="rId4"/>
           <a:stretch>
             <a:fillRect/>
           </a:stretch>
@@ -12363,7 +12517,7 @@
           <p:nvPr/>
         </p:nvPicPr>
         <p:blipFill>
-          <a:blip r:embed="rId2"/>
+          <a:blip r:embed="rId4"/>
           <a:stretch>
             <a:fillRect/>
           </a:stretch>
@@ -12393,7 +12547,7 @@
           <p:nvPr/>
         </p:nvPicPr>
         <p:blipFill>
-          <a:blip r:embed="rId2"/>
+          <a:blip r:embed="rId4"/>
           <a:stretch>
             <a:fillRect/>
           </a:stretch>
@@ -12459,7 +12613,7 @@
           <p:nvPr/>
         </p:nvPicPr>
         <p:blipFill>
-          <a:blip r:embed="rId4">
+          <a:blip r:embed="rId5">
             <a:extLst>
               <a:ext uri="{28A0092B-C50C-407E-A947-70E740481C1C}">
                 <a14:useLocalDpi xmlns:a14="http://schemas.microsoft.com/office/drawing/2010/main" val="0"/>
@@ -12564,7 +12718,7 @@
           <a:p>
             <a:r>
               <a:rPr lang="en-US" sz="1200" dirty="0"/>
-              <a:t>10.0.10.13.10</a:t>
+              <a:t>10.0.10.13</a:t>
             </a:r>
             <a:r>
               <a:rPr lang="en-US" sz="1800" b="1" dirty="0"/>
@@ -12589,7 +12743,7 @@
           <p:nvPr/>
         </p:nvPicPr>
         <p:blipFill>
-          <a:blip r:embed="rId4">
+          <a:blip r:embed="rId5">
             <a:extLst>
               <a:ext uri="{28A0092B-C50C-407E-A947-70E740481C1C}">
                 <a14:useLocalDpi xmlns:a14="http://schemas.microsoft.com/office/drawing/2010/main" val="0"/>
@@ -12715,7 +12869,7 @@
           <p:nvPr/>
         </p:nvPicPr>
         <p:blipFill>
-          <a:blip r:embed="rId4">
+          <a:blip r:embed="rId5">
             <a:extLst>
               <a:ext uri="{28A0092B-C50C-407E-A947-70E740481C1C}">
                 <a14:useLocalDpi xmlns:a14="http://schemas.microsoft.com/office/drawing/2010/main" val="0"/>
@@ -12854,7 +13008,7 @@
           <a:p>
             <a:r>
               <a:rPr lang="en-US" sz="1200" dirty="0"/>
-              <a:t>10.0.10.12.10</a:t>
+              <a:t>10.0.10.12</a:t>
             </a:r>
             <a:r>
               <a:rPr lang="en-US" sz="1800" b="1" dirty="0"/>
@@ -12894,7 +13048,7 @@
           <a:p>
             <a:r>
               <a:rPr lang="en-US" sz="1200" dirty="0"/>
-              <a:t>10.0.10.12.11</a:t>
+              <a:t>10.0.10.11</a:t>
             </a:r>
             <a:r>
               <a:rPr lang="en-US" sz="1800" b="1" dirty="0"/>
@@ -12963,7 +13117,7 @@
           <p:nvPr/>
         </p:nvPicPr>
         <p:blipFill>
-          <a:blip r:embed="rId5">
+          <a:blip r:embed="rId6">
             <a:extLst>
               <a:ext uri="{28A0092B-C50C-407E-A947-70E740481C1C}">
                 <a14:useLocalDpi xmlns:a14="http://schemas.microsoft.com/office/drawing/2010/main" val="0"/>
@@ -13010,7 +13164,7 @@
           <p:nvPr/>
         </p:nvPicPr>
         <p:blipFill>
-          <a:blip r:embed="rId5">
+          <a:blip r:embed="rId6">
             <a:extLst>
               <a:ext uri="{28A0092B-C50C-407E-A947-70E740481C1C}">
                 <a14:useLocalDpi xmlns:a14="http://schemas.microsoft.com/office/drawing/2010/main" val="0"/>
@@ -13100,7 +13254,7 @@
           <p:nvPr/>
         </p:nvPicPr>
         <p:blipFill>
-          <a:blip r:embed="rId4">
+          <a:blip r:embed="rId5">
             <a:extLst>
               <a:ext uri="{28A0092B-C50C-407E-A947-70E740481C1C}">
                 <a14:useLocalDpi xmlns:a14="http://schemas.microsoft.com/office/drawing/2010/main" val="0"/>
@@ -13147,7 +13301,7 @@
           <p:nvPr/>
         </p:nvPicPr>
         <p:blipFill>
-          <a:blip r:embed="rId4">
+          <a:blip r:embed="rId5">
             <a:extLst>
               <a:ext uri="{28A0092B-C50C-407E-A947-70E740481C1C}">
                 <a14:useLocalDpi xmlns:a14="http://schemas.microsoft.com/office/drawing/2010/main" val="0"/>
@@ -13194,7 +13348,7 @@
           <p:nvPr/>
         </p:nvPicPr>
         <p:blipFill>
-          <a:blip r:embed="rId4">
+          <a:blip r:embed="rId5">
             <a:extLst>
               <a:ext uri="{28A0092B-C50C-407E-A947-70E740481C1C}">
                 <a14:useLocalDpi xmlns:a14="http://schemas.microsoft.com/office/drawing/2010/main" val="0"/>
@@ -13240,7 +13394,7 @@
         </p:nvSpPr>
         <p:spPr>
           <a:xfrm>
-            <a:off x="999164" y="804961"/>
+            <a:off x="1033770" y="692730"/>
             <a:ext cx="2586267" cy="276999"/>
           </a:xfrm>
           <a:prstGeom prst="rect">
@@ -13382,52 +13536,6 @@
           </a:p>
         </p:txBody>
       </p:sp>
-      <p:sp>
-        <p:nvSpPr>
-          <p:cNvPr id="74" name="Rectangle 73">
-            <a:extLst>
-              <a:ext uri="{FF2B5EF4-FFF2-40B4-BE49-F238E27FC236}">
-                <a16:creationId xmlns:a16="http://schemas.microsoft.com/office/drawing/2014/main" id="{4CBC52BC-E17E-1A9F-5D1E-C28D20AAB999}"/>
-              </a:ext>
-            </a:extLst>
-          </p:cNvPr>
-          <p:cNvSpPr/>
-          <p:nvPr/>
-        </p:nvSpPr>
-        <p:spPr>
-          <a:xfrm>
-            <a:off x="5612820" y="521261"/>
-            <a:ext cx="3016073" cy="2116573"/>
-          </a:xfrm>
-          <a:prstGeom prst="rect">
-            <a:avLst/>
-          </a:prstGeom>
-          <a:ln w="9525">
-            <a:prstDash val="sysDash"/>
-          </a:ln>
-        </p:spPr>
-        <p:style>
-          <a:lnRef idx="2">
-            <a:schemeClr val="accent1"/>
-          </a:lnRef>
-          <a:fillRef idx="1">
-            <a:schemeClr val="lt1"/>
-          </a:fillRef>
-          <a:effectRef idx="0">
-            <a:schemeClr val="accent1"/>
-          </a:effectRef>
-          <a:fontRef idx="minor">
-            <a:schemeClr val="dk1"/>
-          </a:fontRef>
-        </p:style>
-        <p:txBody>
-          <a:bodyPr rtlCol="0" anchor="ctr"/>
-          <a:lstStyle/>
-          <a:p>
-            <a:endParaRPr lang="en-SG" sz="1400" b="1" dirty="0"/>
-          </a:p>
-        </p:txBody>
-      </p:sp>
       <p:pic>
         <p:nvPicPr>
           <p:cNvPr id="75" name="Picture 74">
@@ -13443,7 +13551,7 @@
           <p:nvPr/>
         </p:nvPicPr>
         <p:blipFill>
-          <a:blip r:embed="rId2"/>
+          <a:blip r:embed="rId4"/>
           <a:stretch>
             <a:fillRect/>
           </a:stretch>
@@ -13452,36 +13560,6 @@
           <a:xfrm>
             <a:off x="5741279" y="340073"/>
             <a:ext cx="372169" cy="362375"/>
-          </a:xfrm>
-          <a:prstGeom prst="rect">
-            <a:avLst/>
-          </a:prstGeom>
-        </p:spPr>
-      </p:pic>
-      <p:pic>
-        <p:nvPicPr>
-          <p:cNvPr id="71" name="Picture 70">
-            <a:extLst>
-              <a:ext uri="{FF2B5EF4-FFF2-40B4-BE49-F238E27FC236}">
-                <a16:creationId xmlns:a16="http://schemas.microsoft.com/office/drawing/2014/main" id="{5EB3E525-71BF-EFA6-C4A5-D241BE25812F}"/>
-              </a:ext>
-            </a:extLst>
-          </p:cNvPr>
-          <p:cNvPicPr>
-            <a:picLocks noChangeAspect="1"/>
-          </p:cNvPicPr>
-          <p:nvPr/>
-        </p:nvPicPr>
-        <p:blipFill>
-          <a:blip r:embed="rId7"/>
-          <a:stretch>
-            <a:fillRect/>
-          </a:stretch>
-        </p:blipFill>
-        <p:spPr>
-          <a:xfrm>
-            <a:off x="5806031" y="878422"/>
-            <a:ext cx="2695885" cy="1624638"/>
           </a:xfrm>
           <a:prstGeom prst="rect">
             <a:avLst/>
@@ -13563,52 +13641,6 @@
           </a:p>
         </p:txBody>
       </p:sp>
-      <p:sp>
-        <p:nvSpPr>
-          <p:cNvPr id="78" name="Rectangle 77">
-            <a:extLst>
-              <a:ext uri="{FF2B5EF4-FFF2-40B4-BE49-F238E27FC236}">
-                <a16:creationId xmlns:a16="http://schemas.microsoft.com/office/drawing/2014/main" id="{D3C53F0D-B84B-E4A7-56B0-1901919DC730}"/>
-              </a:ext>
-            </a:extLst>
-          </p:cNvPr>
-          <p:cNvSpPr/>
-          <p:nvPr/>
-        </p:nvSpPr>
-        <p:spPr>
-          <a:xfrm>
-            <a:off x="8943355" y="490106"/>
-            <a:ext cx="3016073" cy="2116573"/>
-          </a:xfrm>
-          <a:prstGeom prst="rect">
-            <a:avLst/>
-          </a:prstGeom>
-          <a:ln w="9525">
-            <a:prstDash val="sysDash"/>
-          </a:ln>
-        </p:spPr>
-        <p:style>
-          <a:lnRef idx="2">
-            <a:schemeClr val="accent1"/>
-          </a:lnRef>
-          <a:fillRef idx="1">
-            <a:schemeClr val="lt1"/>
-          </a:fillRef>
-          <a:effectRef idx="0">
-            <a:schemeClr val="accent1"/>
-          </a:effectRef>
-          <a:fontRef idx="minor">
-            <a:schemeClr val="dk1"/>
-          </a:fontRef>
-        </p:style>
-        <p:txBody>
-          <a:bodyPr rtlCol="0" anchor="ctr"/>
-          <a:lstStyle/>
-          <a:p>
-            <a:endParaRPr lang="en-SG" sz="1400" b="1" dirty="0"/>
-          </a:p>
-        </p:txBody>
-      </p:sp>
       <p:pic>
         <p:nvPicPr>
           <p:cNvPr id="79" name="Picture 78">
@@ -13624,7 +13656,7 @@
           <p:nvPr/>
         </p:nvPicPr>
         <p:blipFill>
-          <a:blip r:embed="rId2"/>
+          <a:blip r:embed="rId4"/>
           <a:stretch>
             <a:fillRect/>
           </a:stretch>
@@ -13633,36 +13665,6 @@
           <a:xfrm>
             <a:off x="9071814" y="308918"/>
             <a:ext cx="372169" cy="362375"/>
-          </a:xfrm>
-          <a:prstGeom prst="rect">
-            <a:avLst/>
-          </a:prstGeom>
-        </p:spPr>
-      </p:pic>
-      <p:pic>
-        <p:nvPicPr>
-          <p:cNvPr id="80" name="Picture 79">
-            <a:extLst>
-              <a:ext uri="{FF2B5EF4-FFF2-40B4-BE49-F238E27FC236}">
-                <a16:creationId xmlns:a16="http://schemas.microsoft.com/office/drawing/2014/main" id="{8D4A32AE-E483-6B5E-7E4D-09AB976DA413}"/>
-              </a:ext>
-            </a:extLst>
-          </p:cNvPr>
-          <p:cNvPicPr>
-            <a:picLocks noChangeAspect="1"/>
-          </p:cNvPicPr>
-          <p:nvPr/>
-        </p:nvPicPr>
-        <p:blipFill>
-          <a:blip r:embed="rId7"/>
-          <a:stretch>
-            <a:fillRect/>
-          </a:stretch>
-        </p:blipFill>
-        <p:spPr>
-          <a:xfrm>
-            <a:off x="9136566" y="847267"/>
-            <a:ext cx="2695885" cy="1624638"/>
           </a:xfrm>
           <a:prstGeom prst="rect">
             <a:avLst/>
@@ -13759,7 +13761,7 @@
           <p:nvPr/>
         </p:nvPicPr>
         <p:blipFill>
-          <a:blip r:embed="rId4">
+          <a:blip r:embed="rId5">
             <a:extLst>
               <a:ext uri="{28A0092B-C50C-407E-A947-70E740481C1C}">
                 <a14:useLocalDpi xmlns:a14="http://schemas.microsoft.com/office/drawing/2010/main" val="0"/>
@@ -13806,7 +13808,7 @@
           <p:nvPr/>
         </p:nvPicPr>
         <p:blipFill>
-          <a:blip r:embed="rId4">
+          <a:blip r:embed="rId5">
             <a:extLst>
               <a:ext uri="{28A0092B-C50C-407E-A947-70E740481C1C}">
                 <a14:useLocalDpi xmlns:a14="http://schemas.microsoft.com/office/drawing/2010/main" val="0"/>
@@ -13937,7 +13939,7 @@
           <p:nvPr/>
         </p:nvPicPr>
         <p:blipFill>
-          <a:blip r:embed="rId4">
+          <a:blip r:embed="rId5">
             <a:extLst>
               <a:ext uri="{28A0092B-C50C-407E-A947-70E740481C1C}">
                 <a14:useLocalDpi xmlns:a14="http://schemas.microsoft.com/office/drawing/2010/main" val="0"/>
@@ -13984,7 +13986,7 @@
           <p:nvPr/>
         </p:nvPicPr>
         <p:blipFill>
-          <a:blip r:embed="rId4">
+          <a:blip r:embed="rId5">
             <a:extLst>
               <a:ext uri="{28A0092B-C50C-407E-A947-70E740481C1C}">
                 <a14:useLocalDpi xmlns:a14="http://schemas.microsoft.com/office/drawing/2010/main" val="0"/>
@@ -14360,7 +14362,7 @@
           <p:nvPr/>
         </p:nvPicPr>
         <p:blipFill>
-          <a:blip r:embed="rId5">
+          <a:blip r:embed="rId6">
             <a:extLst>
               <a:ext uri="{28A0092B-C50C-407E-A947-70E740481C1C}">
                 <a14:useLocalDpi xmlns:a14="http://schemas.microsoft.com/office/drawing/2010/main" val="0"/>
@@ -14437,10 +14439,10 @@
       </p:cxnSp>
       <p:pic>
         <p:nvPicPr>
-          <p:cNvPr id="118" name="Picture 117">
-            <a:extLst>
-              <a:ext uri="{FF2B5EF4-FFF2-40B4-BE49-F238E27FC236}">
-                <a16:creationId xmlns:a16="http://schemas.microsoft.com/office/drawing/2014/main" id="{4735696D-2B8B-BDDD-A206-F266411C15BE}"/>
+          <p:cNvPr id="121" name="Picture 120">
+            <a:extLst>
+              <a:ext uri="{FF2B5EF4-FFF2-40B4-BE49-F238E27FC236}">
+                <a16:creationId xmlns:a16="http://schemas.microsoft.com/office/drawing/2014/main" id="{E4F4ED8A-7914-E496-5C12-E48AFE00FE34}"/>
               </a:ext>
             </a:extLst>
           </p:cNvPr>
@@ -14450,32 +14452,27 @@
           <p:nvPr/>
         </p:nvPicPr>
         <p:blipFill>
-          <a:blip r:embed="rId8"/>
+          <a:blip r:embed="rId4"/>
           <a:stretch>
             <a:fillRect/>
           </a:stretch>
         </p:blipFill>
         <p:spPr>
           <a:xfrm>
-            <a:off x="10133094" y="4393723"/>
-            <a:ext cx="1550062" cy="1078304"/>
-          </a:xfrm>
-          <a:prstGeom prst="rect">
-            <a:avLst/>
-          </a:prstGeom>
-          <a:ln w="12700">
-            <a:solidFill>
-              <a:schemeClr val="tx1"/>
-            </a:solidFill>
-          </a:ln>
+            <a:off x="9521928" y="322974"/>
+            <a:ext cx="350593" cy="341367"/>
+          </a:xfrm>
+          <a:prstGeom prst="rect">
+            <a:avLst/>
+          </a:prstGeom>
         </p:spPr>
       </p:pic>
       <p:pic>
         <p:nvPicPr>
-          <p:cNvPr id="121" name="Picture 120">
-            <a:extLst>
-              <a:ext uri="{FF2B5EF4-FFF2-40B4-BE49-F238E27FC236}">
-                <a16:creationId xmlns:a16="http://schemas.microsoft.com/office/drawing/2014/main" id="{E4F4ED8A-7914-E496-5C12-E48AFE00FE34}"/>
+          <p:cNvPr id="122" name="Picture 121">
+            <a:extLst>
+              <a:ext uri="{FF2B5EF4-FFF2-40B4-BE49-F238E27FC236}">
+                <a16:creationId xmlns:a16="http://schemas.microsoft.com/office/drawing/2014/main" id="{C9C89D7F-CDBE-B0CE-6A7C-53ADF129C960}"/>
               </a:ext>
             </a:extLst>
           </p:cNvPr>
@@ -14485,43 +14482,13 @@
           <p:nvPr/>
         </p:nvPicPr>
         <p:blipFill>
-          <a:blip r:embed="rId2"/>
+          <a:blip r:embed="rId4"/>
           <a:stretch>
             <a:fillRect/>
           </a:stretch>
         </p:blipFill>
         <p:spPr>
           <a:xfrm>
-            <a:off x="9521928" y="322974"/>
-            <a:ext cx="350593" cy="341367"/>
-          </a:xfrm>
-          <a:prstGeom prst="rect">
-            <a:avLst/>
-          </a:prstGeom>
-        </p:spPr>
-      </p:pic>
-      <p:pic>
-        <p:nvPicPr>
-          <p:cNvPr id="122" name="Picture 121">
-            <a:extLst>
-              <a:ext uri="{FF2B5EF4-FFF2-40B4-BE49-F238E27FC236}">
-                <a16:creationId xmlns:a16="http://schemas.microsoft.com/office/drawing/2014/main" id="{C9C89D7F-CDBE-B0CE-6A7C-53ADF129C960}"/>
-              </a:ext>
-            </a:extLst>
-          </p:cNvPr>
-          <p:cNvPicPr>
-            <a:picLocks noChangeAspect="1"/>
-          </p:cNvPicPr>
-          <p:nvPr/>
-        </p:nvPicPr>
-        <p:blipFill>
-          <a:blip r:embed="rId2"/>
-          <a:stretch>
-            <a:fillRect/>
-          </a:stretch>
-        </p:blipFill>
-        <p:spPr>
-          <a:xfrm>
             <a:off x="10011649" y="4036914"/>
             <a:ext cx="327215" cy="318604"/>
           </a:xfrm>
@@ -14545,7 +14512,7 @@
           <p:nvPr/>
         </p:nvPicPr>
         <p:blipFill>
-          <a:blip r:embed="rId4">
+          <a:blip r:embed="rId5">
             <a:extLst>
               <a:ext uri="{28A0092B-C50C-407E-A947-70E740481C1C}">
                 <a14:useLocalDpi xmlns:a14="http://schemas.microsoft.com/office/drawing/2010/main" val="0"/>
@@ -15094,6 +15061,42 @@
           </a:p>
         </p:txBody>
       </p:sp>
+      <p:pic>
+        <p:nvPicPr>
+          <p:cNvPr id="2" name="Picture 1" descr="A screenshot of a computer&#10;&#10;Description automatically generated">
+            <a:extLst>
+              <a:ext uri="{FF2B5EF4-FFF2-40B4-BE49-F238E27FC236}">
+                <a16:creationId xmlns:a16="http://schemas.microsoft.com/office/drawing/2014/main" id="{3FD25AB5-01C4-FB88-EEAB-9ED4E85B69A8}"/>
+              </a:ext>
+            </a:extLst>
+          </p:cNvPr>
+          <p:cNvPicPr>
+            <a:picLocks noChangeAspect="1"/>
+          </p:cNvPicPr>
+          <p:nvPr/>
+        </p:nvPicPr>
+        <p:blipFill>
+          <a:blip r:embed="rId8">
+            <a:extLst>
+              <a:ext uri="{28A0092B-C50C-407E-A947-70E740481C1C}">
+                <a14:useLocalDpi xmlns:a14="http://schemas.microsoft.com/office/drawing/2010/main" val="0"/>
+              </a:ext>
+            </a:extLst>
+          </a:blip>
+          <a:stretch>
+            <a:fillRect/>
+          </a:stretch>
+        </p:blipFill>
+        <p:spPr>
+          <a:xfrm>
+            <a:off x="9686227" y="4400210"/>
+            <a:ext cx="2108653" cy="1143224"/>
+          </a:xfrm>
+          <a:prstGeom prst="rect">
+            <a:avLst/>
+          </a:prstGeom>
+        </p:spPr>
+      </p:pic>
     </p:spTree>
     <p:extLst>
       <p:ext uri="{BB962C8B-B14F-4D97-AF65-F5344CB8AC3E}">
@@ -15126,6 +15129,124 @@
       </p:grpSpPr>
       <p:sp>
         <p:nvSpPr>
+          <p:cNvPr id="77" name="Rectangle 76">
+            <a:extLst>
+              <a:ext uri="{FF2B5EF4-FFF2-40B4-BE49-F238E27FC236}">
+                <a16:creationId xmlns:a16="http://schemas.microsoft.com/office/drawing/2014/main" id="{3D4EBB44-9B88-AB21-55D4-B9D1A8451A92}"/>
+              </a:ext>
+            </a:extLst>
+          </p:cNvPr>
+          <p:cNvSpPr/>
+          <p:nvPr/>
+        </p:nvSpPr>
+        <p:spPr>
+          <a:xfrm>
+            <a:off x="6637205" y="602451"/>
+            <a:ext cx="4872807" cy="2513875"/>
+          </a:xfrm>
+          <a:prstGeom prst="rect">
+            <a:avLst/>
+          </a:prstGeom>
+        </p:spPr>
+        <p:style>
+          <a:lnRef idx="2">
+            <a:schemeClr val="accent1">
+              <a:shade val="15000"/>
+            </a:schemeClr>
+          </a:lnRef>
+          <a:fillRef idx="1">
+            <a:schemeClr val="accent1"/>
+          </a:fillRef>
+          <a:effectRef idx="0">
+            <a:schemeClr val="accent1"/>
+          </a:effectRef>
+          <a:fontRef idx="minor">
+            <a:schemeClr val="lt1"/>
+          </a:fontRef>
+        </p:style>
+        <p:txBody>
+          <a:bodyPr rtlCol="0" anchor="ctr"/>
+          <a:lstStyle/>
+          <a:p>
+            <a:pPr algn="ctr"/>
+            <a:endParaRPr lang="en-SG"/>
+          </a:p>
+        </p:txBody>
+      </p:sp>
+      <p:pic>
+        <p:nvPicPr>
+          <p:cNvPr id="8" name="Picture 7" descr="A screenshot of a computer&#10;&#10;Description automatically generated">
+            <a:extLst>
+              <a:ext uri="{FF2B5EF4-FFF2-40B4-BE49-F238E27FC236}">
+                <a16:creationId xmlns:a16="http://schemas.microsoft.com/office/drawing/2014/main" id="{D32D1E9E-C2B8-AC78-CAA2-3FCBF10EC88F}"/>
+              </a:ext>
+            </a:extLst>
+          </p:cNvPr>
+          <p:cNvPicPr>
+            <a:picLocks noChangeAspect="1"/>
+          </p:cNvPicPr>
+          <p:nvPr/>
+        </p:nvPicPr>
+        <p:blipFill>
+          <a:blip r:embed="rId3">
+            <a:extLst>
+              <a:ext uri="{28A0092B-C50C-407E-A947-70E740481C1C}">
+                <a14:useLocalDpi xmlns:a14="http://schemas.microsoft.com/office/drawing/2010/main" val="0"/>
+              </a:ext>
+            </a:extLst>
+          </a:blip>
+          <a:stretch>
+            <a:fillRect/>
+          </a:stretch>
+        </p:blipFill>
+        <p:spPr>
+          <a:xfrm>
+            <a:off x="6386226" y="735714"/>
+            <a:ext cx="4599192" cy="2634364"/>
+          </a:xfrm>
+          <a:prstGeom prst="rect">
+            <a:avLst/>
+          </a:prstGeom>
+        </p:spPr>
+      </p:pic>
+      <p:pic>
+        <p:nvPicPr>
+          <p:cNvPr id="2" name="Picture 1" descr="A computer screen shot of a computer scheme&#10;&#10;Description automatically generated">
+            <a:extLst>
+              <a:ext uri="{FF2B5EF4-FFF2-40B4-BE49-F238E27FC236}">
+                <a16:creationId xmlns:a16="http://schemas.microsoft.com/office/drawing/2014/main" id="{B192FA1B-C2D0-0894-808E-D9A3251B9234}"/>
+              </a:ext>
+            </a:extLst>
+          </p:cNvPr>
+          <p:cNvPicPr>
+            <a:picLocks noChangeAspect="1"/>
+          </p:cNvPicPr>
+          <p:nvPr/>
+        </p:nvPicPr>
+        <p:blipFill>
+          <a:blip r:embed="rId4">
+            <a:extLst>
+              <a:ext uri="{28A0092B-C50C-407E-A947-70E740481C1C}">
+                <a14:useLocalDpi xmlns:a14="http://schemas.microsoft.com/office/drawing/2010/main" val="0"/>
+              </a:ext>
+            </a:extLst>
+          </a:blip>
+          <a:stretch>
+            <a:fillRect/>
+          </a:stretch>
+        </p:blipFill>
+        <p:spPr>
+          <a:xfrm>
+            <a:off x="324088" y="583139"/>
+            <a:ext cx="5325165" cy="3050192"/>
+          </a:xfrm>
+          <a:prstGeom prst="rect">
+            <a:avLst/>
+          </a:prstGeom>
+        </p:spPr>
+      </p:pic>
+      <p:sp>
+        <p:nvSpPr>
           <p:cNvPr id="56" name="Rectangle 55">
             <a:extLst>
               <a:ext uri="{FF2B5EF4-FFF2-40B4-BE49-F238E27FC236}">
@@ -15216,47 +15337,6 @@
           </a:p>
         </p:txBody>
       </p:sp>
-      <p:pic>
-        <p:nvPicPr>
-          <p:cNvPr id="5" name="Picture 4" descr="A picture containing text, screenshot, display, diagram&#10;&#10;Description automatically generated">
-            <a:extLst>
-              <a:ext uri="{FF2B5EF4-FFF2-40B4-BE49-F238E27FC236}">
-                <a16:creationId xmlns:a16="http://schemas.microsoft.com/office/drawing/2014/main" id="{3222D6FD-9EB3-6B14-46AE-7A2BCE74AA32}"/>
-              </a:ext>
-            </a:extLst>
-          </p:cNvPr>
-          <p:cNvPicPr>
-            <a:picLocks noChangeAspect="1"/>
-          </p:cNvPicPr>
-          <p:nvPr/>
-        </p:nvPicPr>
-        <p:blipFill>
-          <a:blip r:embed="rId3">
-            <a:extLst>
-              <a:ext uri="{28A0092B-C50C-407E-A947-70E740481C1C}">
-                <a14:useLocalDpi xmlns:a14="http://schemas.microsoft.com/office/drawing/2010/main" val="0"/>
-              </a:ext>
-            </a:extLst>
-          </a:blip>
-          <a:stretch>
-            <a:fillRect/>
-          </a:stretch>
-        </p:blipFill>
-        <p:spPr>
-          <a:xfrm>
-            <a:off x="326904" y="619859"/>
-            <a:ext cx="5360064" cy="2980148"/>
-          </a:xfrm>
-          <a:prstGeom prst="rect">
-            <a:avLst/>
-          </a:prstGeom>
-          <a:ln w="9525">
-            <a:solidFill>
-              <a:schemeClr val="tx1"/>
-            </a:solidFill>
-          </a:ln>
-        </p:spPr>
-      </p:pic>
       <p:sp>
         <p:nvSpPr>
           <p:cNvPr id="6" name="TextBox 5">
@@ -15357,7 +15437,7 @@
           <p:nvPr/>
         </p:nvPicPr>
         <p:blipFill>
-          <a:blip r:embed="rId4"/>
+          <a:blip r:embed="rId5"/>
           <a:stretch>
             <a:fillRect/>
           </a:stretch>
@@ -15871,484 +15951,6 @@
             <a:extLst>
               <a:ext uri="{FF2B5EF4-FFF2-40B4-BE49-F238E27FC236}">
                 <a16:creationId xmlns:a16="http://schemas.microsoft.com/office/drawing/2014/main" id="{79FD07E4-4E32-82C1-D89C-923ABB0FB0C7}"/>
-              </a:ext>
-            </a:extLst>
-          </p:cNvPr>
-          <p:cNvPicPr>
-            <a:picLocks noChangeAspect="1"/>
-          </p:cNvPicPr>
-          <p:nvPr/>
-        </p:nvPicPr>
-        <p:blipFill>
-          <a:blip r:embed="rId4"/>
-          <a:stretch>
-            <a:fillRect/>
-          </a:stretch>
-        </p:blipFill>
-        <p:spPr>
-          <a:xfrm>
-            <a:off x="2278797" y="4706908"/>
-            <a:ext cx="2527544" cy="1198685"/>
-          </a:xfrm>
-          <a:prstGeom prst="rect">
-            <a:avLst/>
-          </a:prstGeom>
-        </p:spPr>
-      </p:pic>
-      <p:sp>
-        <p:nvSpPr>
-          <p:cNvPr id="32" name="TextBox 31">
-            <a:extLst>
-              <a:ext uri="{FF2B5EF4-FFF2-40B4-BE49-F238E27FC236}">
-                <a16:creationId xmlns:a16="http://schemas.microsoft.com/office/drawing/2014/main" id="{362ECBEF-9804-2CE8-E55A-AB299EC94262}"/>
-              </a:ext>
-            </a:extLst>
-          </p:cNvPr>
-          <p:cNvSpPr txBox="1"/>
-          <p:nvPr/>
-        </p:nvSpPr>
-        <p:spPr>
-          <a:xfrm>
-            <a:off x="3909767" y="4753231"/>
-            <a:ext cx="1191495" cy="430887"/>
-          </a:xfrm>
-          <a:prstGeom prst="rect">
-            <a:avLst/>
-          </a:prstGeom>
-          <a:noFill/>
-        </p:spPr>
-        <p:txBody>
-          <a:bodyPr wrap="square" rtlCol="0">
-            <a:spAutoFit/>
-          </a:bodyPr>
-          <a:lstStyle/>
-          <a:p>
-            <a:r>
-              <a:rPr lang="en-US" sz="1100" b="1" dirty="0"/>
-              <a:t>[Master, Slot-0]</a:t>
-            </a:r>
-          </a:p>
-          <a:p>
-            <a:r>
-              <a:rPr lang="en-US" sz="1100" b="1" dirty="0"/>
-              <a:t>I/O: 8/8</a:t>
-            </a:r>
-            <a:endParaRPr lang="en-SG" sz="1100" b="1" dirty="0"/>
-          </a:p>
-        </p:txBody>
-      </p:sp>
-      <p:sp>
-        <p:nvSpPr>
-          <p:cNvPr id="33" name="TextBox 32">
-            <a:extLst>
-              <a:ext uri="{FF2B5EF4-FFF2-40B4-BE49-F238E27FC236}">
-                <a16:creationId xmlns:a16="http://schemas.microsoft.com/office/drawing/2014/main" id="{79B34D95-B1E5-7344-46A2-7A0CDB3ED049}"/>
-              </a:ext>
-            </a:extLst>
-          </p:cNvPr>
-          <p:cNvSpPr txBox="1"/>
-          <p:nvPr/>
-        </p:nvSpPr>
-        <p:spPr>
-          <a:xfrm>
-            <a:off x="2152423" y="5836454"/>
-            <a:ext cx="1534524" cy="261610"/>
-          </a:xfrm>
-          <a:prstGeom prst="rect">
-            <a:avLst/>
-          </a:prstGeom>
-          <a:noFill/>
-        </p:spPr>
-        <p:txBody>
-          <a:bodyPr wrap="square" rtlCol="0">
-            <a:spAutoFit/>
-          </a:bodyPr>
-          <a:lstStyle/>
-          <a:p>
-            <a:r>
-              <a:rPr lang="en-US" sz="1100" b="1" dirty="0"/>
-              <a:t>[Slave, Slot-1] </a:t>
-            </a:r>
-            <a:r>
-              <a:rPr lang="en-SG" sz="1100" b="1" dirty="0"/>
-              <a:t>I/O: 8/8</a:t>
-            </a:r>
-          </a:p>
-        </p:txBody>
-      </p:sp>
-      <p:sp>
-        <p:nvSpPr>
-          <p:cNvPr id="34" name="TextBox 33">
-            <a:extLst>
-              <a:ext uri="{FF2B5EF4-FFF2-40B4-BE49-F238E27FC236}">
-                <a16:creationId xmlns:a16="http://schemas.microsoft.com/office/drawing/2014/main" id="{4ADC2BBC-455C-3FF5-99E0-FAE84B8F4394}"/>
-              </a:ext>
-            </a:extLst>
-          </p:cNvPr>
-          <p:cNvSpPr txBox="1"/>
-          <p:nvPr/>
-        </p:nvSpPr>
-        <p:spPr>
-          <a:xfrm>
-            <a:off x="3686946" y="5836454"/>
-            <a:ext cx="1508863" cy="261610"/>
-          </a:xfrm>
-          <a:prstGeom prst="rect">
-            <a:avLst/>
-          </a:prstGeom>
-          <a:noFill/>
-        </p:spPr>
-        <p:txBody>
-          <a:bodyPr wrap="square" rtlCol="0">
-            <a:spAutoFit/>
-          </a:bodyPr>
-          <a:lstStyle/>
-          <a:p>
-            <a:r>
-              <a:rPr lang="en-US" sz="1100" b="1" dirty="0"/>
-              <a:t>[Slave, Slot-2] I/O: 6/</a:t>
-            </a:r>
-            <a:r>
-              <a:rPr lang="en-SG" sz="1100" b="1" dirty="0"/>
-              <a:t>6</a:t>
-            </a:r>
-            <a:endParaRPr lang="en-US" sz="1100" b="1" dirty="0"/>
-          </a:p>
-        </p:txBody>
-      </p:sp>
-      <p:sp>
-        <p:nvSpPr>
-          <p:cNvPr id="35" name="TextBox 34">
-            <a:extLst>
-              <a:ext uri="{FF2B5EF4-FFF2-40B4-BE49-F238E27FC236}">
-                <a16:creationId xmlns:a16="http://schemas.microsoft.com/office/drawing/2014/main" id="{F5E1CA3D-7F7F-7D20-7A4F-D2A4C7F4ED94}"/>
-              </a:ext>
-            </a:extLst>
-          </p:cNvPr>
-          <p:cNvSpPr txBox="1"/>
-          <p:nvPr/>
-        </p:nvSpPr>
-        <p:spPr>
-          <a:xfrm>
-            <a:off x="2896068" y="4877163"/>
-            <a:ext cx="636759" cy="276999"/>
-          </a:xfrm>
-          <a:prstGeom prst="rect">
-            <a:avLst/>
-          </a:prstGeom>
-          <a:noFill/>
-        </p:spPr>
-        <p:txBody>
-          <a:bodyPr wrap="square" rtlCol="0">
-            <a:spAutoFit/>
-          </a:bodyPr>
-          <a:lstStyle/>
-          <a:p>
-            <a:r>
-              <a:rPr lang="en-US" sz="1200" b="1" dirty="0">
-                <a:solidFill>
-                  <a:srgbClr val="FF0000"/>
-                </a:solidFill>
-              </a:rPr>
-              <a:t>PLC-03</a:t>
-            </a:r>
-          </a:p>
-        </p:txBody>
-      </p:sp>
-      <p:sp>
-        <p:nvSpPr>
-          <p:cNvPr id="36" name="TextBox 35">
-            <a:extLst>
-              <a:ext uri="{FF2B5EF4-FFF2-40B4-BE49-F238E27FC236}">
-                <a16:creationId xmlns:a16="http://schemas.microsoft.com/office/drawing/2014/main" id="{0648CB60-097D-3C8D-6000-86EED0E78D4B}"/>
-              </a:ext>
-            </a:extLst>
-          </p:cNvPr>
-          <p:cNvSpPr txBox="1"/>
-          <p:nvPr/>
-        </p:nvSpPr>
-        <p:spPr>
-          <a:xfrm>
-            <a:off x="2070248" y="5506298"/>
-            <a:ext cx="636759" cy="276999"/>
-          </a:xfrm>
-          <a:prstGeom prst="rect">
-            <a:avLst/>
-          </a:prstGeom>
-          <a:noFill/>
-        </p:spPr>
-        <p:txBody>
-          <a:bodyPr wrap="square" rtlCol="0">
-            <a:spAutoFit/>
-          </a:bodyPr>
-          <a:lstStyle/>
-          <a:p>
-            <a:r>
-              <a:rPr lang="en-US" sz="1200" b="1" dirty="0">
-                <a:solidFill>
-                  <a:srgbClr val="FF0000"/>
-                </a:solidFill>
-              </a:rPr>
-              <a:t>PLC-04</a:t>
-            </a:r>
-          </a:p>
-        </p:txBody>
-      </p:sp>
-      <p:sp>
-        <p:nvSpPr>
-          <p:cNvPr id="37" name="TextBox 36">
-            <a:extLst>
-              <a:ext uri="{FF2B5EF4-FFF2-40B4-BE49-F238E27FC236}">
-                <a16:creationId xmlns:a16="http://schemas.microsoft.com/office/drawing/2014/main" id="{A1572DB7-3D29-50CD-4AA5-A7F5ADDF8096}"/>
-              </a:ext>
-            </a:extLst>
-          </p:cNvPr>
-          <p:cNvSpPr txBox="1"/>
-          <p:nvPr/>
-        </p:nvSpPr>
-        <p:spPr>
-          <a:xfrm>
-            <a:off x="3591387" y="5501419"/>
-            <a:ext cx="636759" cy="276999"/>
-          </a:xfrm>
-          <a:prstGeom prst="rect">
-            <a:avLst/>
-          </a:prstGeom>
-          <a:noFill/>
-        </p:spPr>
-        <p:txBody>
-          <a:bodyPr wrap="square" rtlCol="0">
-            <a:spAutoFit/>
-          </a:bodyPr>
-          <a:lstStyle/>
-          <a:p>
-            <a:r>
-              <a:rPr lang="en-US" sz="1200" b="1" dirty="0">
-                <a:solidFill>
-                  <a:srgbClr val="FF0000"/>
-                </a:solidFill>
-              </a:rPr>
-              <a:t>PLC-05</a:t>
-            </a:r>
-          </a:p>
-        </p:txBody>
-      </p:sp>
-      <p:sp>
-        <p:nvSpPr>
-          <p:cNvPr id="38" name="TextBox 37">
-            <a:extLst>
-              <a:ext uri="{FF2B5EF4-FFF2-40B4-BE49-F238E27FC236}">
-                <a16:creationId xmlns:a16="http://schemas.microsoft.com/office/drawing/2014/main" id="{E4A5590B-747A-B28E-D235-F6E700AB6BA1}"/>
-              </a:ext>
-            </a:extLst>
-          </p:cNvPr>
-          <p:cNvSpPr txBox="1"/>
-          <p:nvPr/>
-        </p:nvSpPr>
-        <p:spPr>
-          <a:xfrm>
-            <a:off x="2080027" y="4610450"/>
-            <a:ext cx="1241289" cy="600164"/>
-          </a:xfrm>
-          <a:prstGeom prst="rect">
-            <a:avLst/>
-          </a:prstGeom>
-          <a:noFill/>
-        </p:spPr>
-        <p:txBody>
-          <a:bodyPr wrap="square" rtlCol="0">
-            <a:spAutoFit/>
-          </a:bodyPr>
-          <a:lstStyle/>
-          <a:p>
-            <a:r>
-              <a:rPr lang="en-US" sz="1100" b="1" dirty="0">
-                <a:solidFill>
-                  <a:srgbClr val="002060"/>
-                </a:solidFill>
-              </a:rPr>
-              <a:t>Station Signal control PLC network</a:t>
-            </a:r>
-            <a:endParaRPr lang="en-SG" sz="1100" b="1" dirty="0">
-              <a:solidFill>
-                <a:srgbClr val="002060"/>
-              </a:solidFill>
-            </a:endParaRPr>
-          </a:p>
-        </p:txBody>
-      </p:sp>
-      <p:cxnSp>
-        <p:nvCxnSpPr>
-          <p:cNvPr id="40" name="Straight Arrow Connector 39">
-            <a:extLst>
-              <a:ext uri="{FF2B5EF4-FFF2-40B4-BE49-F238E27FC236}">
-                <a16:creationId xmlns:a16="http://schemas.microsoft.com/office/drawing/2014/main" id="{4A6A1618-41D6-8E10-AB2F-B316565E351C}"/>
-              </a:ext>
-            </a:extLst>
-          </p:cNvPr>
-          <p:cNvCxnSpPr>
-            <a:cxnSpLocks/>
-          </p:cNvCxnSpPr>
-          <p:nvPr/>
-        </p:nvCxnSpPr>
-        <p:spPr>
-          <a:xfrm flipV="1">
-            <a:off x="3789228" y="4036444"/>
-            <a:ext cx="0" cy="531177"/>
-          </a:xfrm>
-          <a:prstGeom prst="straightConnector1">
-            <a:avLst/>
-          </a:prstGeom>
-          <a:ln>
-            <a:tailEnd type="triangle"/>
-          </a:ln>
-        </p:spPr>
-        <p:style>
-          <a:lnRef idx="1">
-            <a:schemeClr val="accent1"/>
-          </a:lnRef>
-          <a:fillRef idx="0">
-            <a:schemeClr val="accent1"/>
-          </a:fillRef>
-          <a:effectRef idx="0">
-            <a:schemeClr val="accent1"/>
-          </a:effectRef>
-          <a:fontRef idx="minor">
-            <a:schemeClr val="tx1"/>
-          </a:fontRef>
-        </p:style>
-      </p:cxnSp>
-      <p:sp>
-        <p:nvSpPr>
-          <p:cNvPr id="41" name="TextBox 40">
-            <a:extLst>
-              <a:ext uri="{FF2B5EF4-FFF2-40B4-BE49-F238E27FC236}">
-                <a16:creationId xmlns:a16="http://schemas.microsoft.com/office/drawing/2014/main" id="{6978EA6D-D35A-8B8C-FB8E-F828D458A504}"/>
-              </a:ext>
-            </a:extLst>
-          </p:cNvPr>
-          <p:cNvSpPr txBox="1"/>
-          <p:nvPr/>
-        </p:nvSpPr>
-        <p:spPr>
-          <a:xfrm>
-            <a:off x="3801392" y="4212998"/>
-            <a:ext cx="818082" cy="369332"/>
-          </a:xfrm>
-          <a:prstGeom prst="rect">
-            <a:avLst/>
-          </a:prstGeom>
-          <a:noFill/>
-        </p:spPr>
-        <p:txBody>
-          <a:bodyPr wrap="square" rtlCol="0">
-            <a:spAutoFit/>
-          </a:bodyPr>
-          <a:lstStyle/>
-          <a:p>
-            <a:r>
-              <a:rPr lang="en-US" sz="900" dirty="0"/>
-              <a:t>22 station</a:t>
-            </a:r>
-          </a:p>
-          <a:p>
-            <a:r>
-              <a:rPr lang="en-US" sz="900" dirty="0"/>
-              <a:t>Signal output  </a:t>
-            </a:r>
-            <a:endParaRPr lang="en-SG" sz="900" dirty="0"/>
-          </a:p>
-        </p:txBody>
-      </p:sp>
-      <p:cxnSp>
-        <p:nvCxnSpPr>
-          <p:cNvPr id="42" name="Straight Arrow Connector 41">
-            <a:extLst>
-              <a:ext uri="{FF2B5EF4-FFF2-40B4-BE49-F238E27FC236}">
-                <a16:creationId xmlns:a16="http://schemas.microsoft.com/office/drawing/2014/main" id="{4143464B-74C2-B3E3-EF3D-C3BDA059A9D4}"/>
-              </a:ext>
-            </a:extLst>
-          </p:cNvPr>
-          <p:cNvCxnSpPr>
-            <a:cxnSpLocks/>
-          </p:cNvCxnSpPr>
-          <p:nvPr/>
-        </p:nvCxnSpPr>
-        <p:spPr>
-          <a:xfrm>
-            <a:off x="3609962" y="4047085"/>
-            <a:ext cx="0" cy="535245"/>
-          </a:xfrm>
-          <a:prstGeom prst="straightConnector1">
-            <a:avLst/>
-          </a:prstGeom>
-          <a:ln>
-            <a:tailEnd type="triangle"/>
-          </a:ln>
-        </p:spPr>
-        <p:style>
-          <a:lnRef idx="1">
-            <a:schemeClr val="accent1"/>
-          </a:lnRef>
-          <a:fillRef idx="0">
-            <a:schemeClr val="accent1"/>
-          </a:fillRef>
-          <a:effectRef idx="0">
-            <a:schemeClr val="accent1"/>
-          </a:effectRef>
-          <a:fontRef idx="minor">
-            <a:schemeClr val="tx1"/>
-          </a:fontRef>
-        </p:style>
-      </p:cxnSp>
-      <p:sp>
-        <p:nvSpPr>
-          <p:cNvPr id="45" name="TextBox 44">
-            <a:extLst>
-              <a:ext uri="{FF2B5EF4-FFF2-40B4-BE49-F238E27FC236}">
-                <a16:creationId xmlns:a16="http://schemas.microsoft.com/office/drawing/2014/main" id="{3A8D3AEB-B6C6-BF23-EB8E-04D2EF729A72}"/>
-              </a:ext>
-            </a:extLst>
-          </p:cNvPr>
-          <p:cNvSpPr txBox="1"/>
-          <p:nvPr/>
-        </p:nvSpPr>
-        <p:spPr>
-          <a:xfrm>
-            <a:off x="2791736" y="4146888"/>
-            <a:ext cx="818082" cy="369332"/>
-          </a:xfrm>
-          <a:prstGeom prst="rect">
-            <a:avLst/>
-          </a:prstGeom>
-          <a:noFill/>
-        </p:spPr>
-        <p:txBody>
-          <a:bodyPr wrap="square" rtlCol="0">
-            <a:spAutoFit/>
-          </a:bodyPr>
-          <a:lstStyle/>
-          <a:p>
-            <a:r>
-              <a:rPr lang="en-US" sz="900" dirty="0"/>
-              <a:t>22 station</a:t>
-            </a:r>
-          </a:p>
-          <a:p>
-            <a:r>
-              <a:rPr lang="en-US" sz="900" dirty="0"/>
-              <a:t>Sensors input</a:t>
-            </a:r>
-            <a:endParaRPr lang="en-SG" sz="900" dirty="0"/>
-          </a:p>
-        </p:txBody>
-      </p:sp>
-      <p:pic>
-        <p:nvPicPr>
-          <p:cNvPr id="54" name="Picture 53">
-            <a:extLst>
-              <a:ext uri="{FF2B5EF4-FFF2-40B4-BE49-F238E27FC236}">
-                <a16:creationId xmlns:a16="http://schemas.microsoft.com/office/drawing/2014/main" id="{9509054D-B742-6926-1598-400CD7319724}"/>
               </a:ext>
             </a:extLst>
           </p:cNvPr>
@@ -16365,6 +15967,484 @@
         </p:blipFill>
         <p:spPr>
           <a:xfrm>
+            <a:off x="2278797" y="4706908"/>
+            <a:ext cx="2527544" cy="1198685"/>
+          </a:xfrm>
+          <a:prstGeom prst="rect">
+            <a:avLst/>
+          </a:prstGeom>
+        </p:spPr>
+      </p:pic>
+      <p:sp>
+        <p:nvSpPr>
+          <p:cNvPr id="32" name="TextBox 31">
+            <a:extLst>
+              <a:ext uri="{FF2B5EF4-FFF2-40B4-BE49-F238E27FC236}">
+                <a16:creationId xmlns:a16="http://schemas.microsoft.com/office/drawing/2014/main" id="{362ECBEF-9804-2CE8-E55A-AB299EC94262}"/>
+              </a:ext>
+            </a:extLst>
+          </p:cNvPr>
+          <p:cNvSpPr txBox="1"/>
+          <p:nvPr/>
+        </p:nvSpPr>
+        <p:spPr>
+          <a:xfrm>
+            <a:off x="3909767" y="4753231"/>
+            <a:ext cx="1191495" cy="430887"/>
+          </a:xfrm>
+          <a:prstGeom prst="rect">
+            <a:avLst/>
+          </a:prstGeom>
+          <a:noFill/>
+        </p:spPr>
+        <p:txBody>
+          <a:bodyPr wrap="square" rtlCol="0">
+            <a:spAutoFit/>
+          </a:bodyPr>
+          <a:lstStyle/>
+          <a:p>
+            <a:r>
+              <a:rPr lang="en-US" sz="1100" b="1" dirty="0"/>
+              <a:t>[Master, Slot-0]</a:t>
+            </a:r>
+          </a:p>
+          <a:p>
+            <a:r>
+              <a:rPr lang="en-US" sz="1100" b="1" dirty="0"/>
+              <a:t>I/O: 8/8</a:t>
+            </a:r>
+            <a:endParaRPr lang="en-SG" sz="1100" b="1" dirty="0"/>
+          </a:p>
+        </p:txBody>
+      </p:sp>
+      <p:sp>
+        <p:nvSpPr>
+          <p:cNvPr id="33" name="TextBox 32">
+            <a:extLst>
+              <a:ext uri="{FF2B5EF4-FFF2-40B4-BE49-F238E27FC236}">
+                <a16:creationId xmlns:a16="http://schemas.microsoft.com/office/drawing/2014/main" id="{79B34D95-B1E5-7344-46A2-7A0CDB3ED049}"/>
+              </a:ext>
+            </a:extLst>
+          </p:cNvPr>
+          <p:cNvSpPr txBox="1"/>
+          <p:nvPr/>
+        </p:nvSpPr>
+        <p:spPr>
+          <a:xfrm>
+            <a:off x="2152423" y="5836454"/>
+            <a:ext cx="1534524" cy="261610"/>
+          </a:xfrm>
+          <a:prstGeom prst="rect">
+            <a:avLst/>
+          </a:prstGeom>
+          <a:noFill/>
+        </p:spPr>
+        <p:txBody>
+          <a:bodyPr wrap="square" rtlCol="0">
+            <a:spAutoFit/>
+          </a:bodyPr>
+          <a:lstStyle/>
+          <a:p>
+            <a:r>
+              <a:rPr lang="en-US" sz="1100" b="1" dirty="0"/>
+              <a:t>[Slave, Slot-1] </a:t>
+            </a:r>
+            <a:r>
+              <a:rPr lang="en-SG" sz="1100" b="1" dirty="0"/>
+              <a:t>I/O: 8/8</a:t>
+            </a:r>
+          </a:p>
+        </p:txBody>
+      </p:sp>
+      <p:sp>
+        <p:nvSpPr>
+          <p:cNvPr id="34" name="TextBox 33">
+            <a:extLst>
+              <a:ext uri="{FF2B5EF4-FFF2-40B4-BE49-F238E27FC236}">
+                <a16:creationId xmlns:a16="http://schemas.microsoft.com/office/drawing/2014/main" id="{4ADC2BBC-455C-3FF5-99E0-FAE84B8F4394}"/>
+              </a:ext>
+            </a:extLst>
+          </p:cNvPr>
+          <p:cNvSpPr txBox="1"/>
+          <p:nvPr/>
+        </p:nvSpPr>
+        <p:spPr>
+          <a:xfrm>
+            <a:off x="3686946" y="5836454"/>
+            <a:ext cx="1508863" cy="261610"/>
+          </a:xfrm>
+          <a:prstGeom prst="rect">
+            <a:avLst/>
+          </a:prstGeom>
+          <a:noFill/>
+        </p:spPr>
+        <p:txBody>
+          <a:bodyPr wrap="square" rtlCol="0">
+            <a:spAutoFit/>
+          </a:bodyPr>
+          <a:lstStyle/>
+          <a:p>
+            <a:r>
+              <a:rPr lang="en-US" sz="1100" b="1" dirty="0"/>
+              <a:t>[Slave, Slot-2] I/O: 6/</a:t>
+            </a:r>
+            <a:r>
+              <a:rPr lang="en-SG" sz="1100" b="1" dirty="0"/>
+              <a:t>6</a:t>
+            </a:r>
+            <a:endParaRPr lang="en-US" sz="1100" b="1" dirty="0"/>
+          </a:p>
+        </p:txBody>
+      </p:sp>
+      <p:sp>
+        <p:nvSpPr>
+          <p:cNvPr id="35" name="TextBox 34">
+            <a:extLst>
+              <a:ext uri="{FF2B5EF4-FFF2-40B4-BE49-F238E27FC236}">
+                <a16:creationId xmlns:a16="http://schemas.microsoft.com/office/drawing/2014/main" id="{F5E1CA3D-7F7F-7D20-7A4F-D2A4C7F4ED94}"/>
+              </a:ext>
+            </a:extLst>
+          </p:cNvPr>
+          <p:cNvSpPr txBox="1"/>
+          <p:nvPr/>
+        </p:nvSpPr>
+        <p:spPr>
+          <a:xfrm>
+            <a:off x="2896068" y="4877163"/>
+            <a:ext cx="636759" cy="276999"/>
+          </a:xfrm>
+          <a:prstGeom prst="rect">
+            <a:avLst/>
+          </a:prstGeom>
+          <a:noFill/>
+        </p:spPr>
+        <p:txBody>
+          <a:bodyPr wrap="square" rtlCol="0">
+            <a:spAutoFit/>
+          </a:bodyPr>
+          <a:lstStyle/>
+          <a:p>
+            <a:r>
+              <a:rPr lang="en-US" sz="1200" b="1" dirty="0">
+                <a:solidFill>
+                  <a:srgbClr val="FF0000"/>
+                </a:solidFill>
+              </a:rPr>
+              <a:t>PLC-03</a:t>
+            </a:r>
+          </a:p>
+        </p:txBody>
+      </p:sp>
+      <p:sp>
+        <p:nvSpPr>
+          <p:cNvPr id="36" name="TextBox 35">
+            <a:extLst>
+              <a:ext uri="{FF2B5EF4-FFF2-40B4-BE49-F238E27FC236}">
+                <a16:creationId xmlns:a16="http://schemas.microsoft.com/office/drawing/2014/main" id="{0648CB60-097D-3C8D-6000-86EED0E78D4B}"/>
+              </a:ext>
+            </a:extLst>
+          </p:cNvPr>
+          <p:cNvSpPr txBox="1"/>
+          <p:nvPr/>
+        </p:nvSpPr>
+        <p:spPr>
+          <a:xfrm>
+            <a:off x="2070248" y="5506298"/>
+            <a:ext cx="636759" cy="276999"/>
+          </a:xfrm>
+          <a:prstGeom prst="rect">
+            <a:avLst/>
+          </a:prstGeom>
+          <a:noFill/>
+        </p:spPr>
+        <p:txBody>
+          <a:bodyPr wrap="square" rtlCol="0">
+            <a:spAutoFit/>
+          </a:bodyPr>
+          <a:lstStyle/>
+          <a:p>
+            <a:r>
+              <a:rPr lang="en-US" sz="1200" b="1" dirty="0">
+                <a:solidFill>
+                  <a:srgbClr val="FF0000"/>
+                </a:solidFill>
+              </a:rPr>
+              <a:t>PLC-04</a:t>
+            </a:r>
+          </a:p>
+        </p:txBody>
+      </p:sp>
+      <p:sp>
+        <p:nvSpPr>
+          <p:cNvPr id="37" name="TextBox 36">
+            <a:extLst>
+              <a:ext uri="{FF2B5EF4-FFF2-40B4-BE49-F238E27FC236}">
+                <a16:creationId xmlns:a16="http://schemas.microsoft.com/office/drawing/2014/main" id="{A1572DB7-3D29-50CD-4AA5-A7F5ADDF8096}"/>
+              </a:ext>
+            </a:extLst>
+          </p:cNvPr>
+          <p:cNvSpPr txBox="1"/>
+          <p:nvPr/>
+        </p:nvSpPr>
+        <p:spPr>
+          <a:xfrm>
+            <a:off x="3591387" y="5501419"/>
+            <a:ext cx="636759" cy="276999"/>
+          </a:xfrm>
+          <a:prstGeom prst="rect">
+            <a:avLst/>
+          </a:prstGeom>
+          <a:noFill/>
+        </p:spPr>
+        <p:txBody>
+          <a:bodyPr wrap="square" rtlCol="0">
+            <a:spAutoFit/>
+          </a:bodyPr>
+          <a:lstStyle/>
+          <a:p>
+            <a:r>
+              <a:rPr lang="en-US" sz="1200" b="1" dirty="0">
+                <a:solidFill>
+                  <a:srgbClr val="FF0000"/>
+                </a:solidFill>
+              </a:rPr>
+              <a:t>PLC-05</a:t>
+            </a:r>
+          </a:p>
+        </p:txBody>
+      </p:sp>
+      <p:sp>
+        <p:nvSpPr>
+          <p:cNvPr id="38" name="TextBox 37">
+            <a:extLst>
+              <a:ext uri="{FF2B5EF4-FFF2-40B4-BE49-F238E27FC236}">
+                <a16:creationId xmlns:a16="http://schemas.microsoft.com/office/drawing/2014/main" id="{E4A5590B-747A-B28E-D235-F6E700AB6BA1}"/>
+              </a:ext>
+            </a:extLst>
+          </p:cNvPr>
+          <p:cNvSpPr txBox="1"/>
+          <p:nvPr/>
+        </p:nvSpPr>
+        <p:spPr>
+          <a:xfrm>
+            <a:off x="2080027" y="4610450"/>
+            <a:ext cx="1241289" cy="600164"/>
+          </a:xfrm>
+          <a:prstGeom prst="rect">
+            <a:avLst/>
+          </a:prstGeom>
+          <a:noFill/>
+        </p:spPr>
+        <p:txBody>
+          <a:bodyPr wrap="square" rtlCol="0">
+            <a:spAutoFit/>
+          </a:bodyPr>
+          <a:lstStyle/>
+          <a:p>
+            <a:r>
+              <a:rPr lang="en-US" sz="1100" b="1" dirty="0">
+                <a:solidFill>
+                  <a:srgbClr val="002060"/>
+                </a:solidFill>
+              </a:rPr>
+              <a:t>Station Signal control PLC network</a:t>
+            </a:r>
+            <a:endParaRPr lang="en-SG" sz="1100" b="1" dirty="0">
+              <a:solidFill>
+                <a:srgbClr val="002060"/>
+              </a:solidFill>
+            </a:endParaRPr>
+          </a:p>
+        </p:txBody>
+      </p:sp>
+      <p:cxnSp>
+        <p:nvCxnSpPr>
+          <p:cNvPr id="40" name="Straight Arrow Connector 39">
+            <a:extLst>
+              <a:ext uri="{FF2B5EF4-FFF2-40B4-BE49-F238E27FC236}">
+                <a16:creationId xmlns:a16="http://schemas.microsoft.com/office/drawing/2014/main" id="{4A6A1618-41D6-8E10-AB2F-B316565E351C}"/>
+              </a:ext>
+            </a:extLst>
+          </p:cNvPr>
+          <p:cNvCxnSpPr>
+            <a:cxnSpLocks/>
+          </p:cNvCxnSpPr>
+          <p:nvPr/>
+        </p:nvCxnSpPr>
+        <p:spPr>
+          <a:xfrm flipV="1">
+            <a:off x="3789228" y="4036444"/>
+            <a:ext cx="0" cy="531177"/>
+          </a:xfrm>
+          <a:prstGeom prst="straightConnector1">
+            <a:avLst/>
+          </a:prstGeom>
+          <a:ln>
+            <a:tailEnd type="triangle"/>
+          </a:ln>
+        </p:spPr>
+        <p:style>
+          <a:lnRef idx="1">
+            <a:schemeClr val="accent1"/>
+          </a:lnRef>
+          <a:fillRef idx="0">
+            <a:schemeClr val="accent1"/>
+          </a:fillRef>
+          <a:effectRef idx="0">
+            <a:schemeClr val="accent1"/>
+          </a:effectRef>
+          <a:fontRef idx="minor">
+            <a:schemeClr val="tx1"/>
+          </a:fontRef>
+        </p:style>
+      </p:cxnSp>
+      <p:sp>
+        <p:nvSpPr>
+          <p:cNvPr id="41" name="TextBox 40">
+            <a:extLst>
+              <a:ext uri="{FF2B5EF4-FFF2-40B4-BE49-F238E27FC236}">
+                <a16:creationId xmlns:a16="http://schemas.microsoft.com/office/drawing/2014/main" id="{6978EA6D-D35A-8B8C-FB8E-F828D458A504}"/>
+              </a:ext>
+            </a:extLst>
+          </p:cNvPr>
+          <p:cNvSpPr txBox="1"/>
+          <p:nvPr/>
+        </p:nvSpPr>
+        <p:spPr>
+          <a:xfrm>
+            <a:off x="3801392" y="4212998"/>
+            <a:ext cx="818082" cy="369332"/>
+          </a:xfrm>
+          <a:prstGeom prst="rect">
+            <a:avLst/>
+          </a:prstGeom>
+          <a:noFill/>
+        </p:spPr>
+        <p:txBody>
+          <a:bodyPr wrap="square" rtlCol="0">
+            <a:spAutoFit/>
+          </a:bodyPr>
+          <a:lstStyle/>
+          <a:p>
+            <a:r>
+              <a:rPr lang="en-US" sz="900" dirty="0"/>
+              <a:t>22 station</a:t>
+            </a:r>
+          </a:p>
+          <a:p>
+            <a:r>
+              <a:rPr lang="en-US" sz="900" dirty="0"/>
+              <a:t>Signal output  </a:t>
+            </a:r>
+            <a:endParaRPr lang="en-SG" sz="900" dirty="0"/>
+          </a:p>
+        </p:txBody>
+      </p:sp>
+      <p:cxnSp>
+        <p:nvCxnSpPr>
+          <p:cNvPr id="42" name="Straight Arrow Connector 41">
+            <a:extLst>
+              <a:ext uri="{FF2B5EF4-FFF2-40B4-BE49-F238E27FC236}">
+                <a16:creationId xmlns:a16="http://schemas.microsoft.com/office/drawing/2014/main" id="{4143464B-74C2-B3E3-EF3D-C3BDA059A9D4}"/>
+              </a:ext>
+            </a:extLst>
+          </p:cNvPr>
+          <p:cNvCxnSpPr>
+            <a:cxnSpLocks/>
+          </p:cNvCxnSpPr>
+          <p:nvPr/>
+        </p:nvCxnSpPr>
+        <p:spPr>
+          <a:xfrm>
+            <a:off x="3609962" y="4047085"/>
+            <a:ext cx="0" cy="535245"/>
+          </a:xfrm>
+          <a:prstGeom prst="straightConnector1">
+            <a:avLst/>
+          </a:prstGeom>
+          <a:ln>
+            <a:tailEnd type="triangle"/>
+          </a:ln>
+        </p:spPr>
+        <p:style>
+          <a:lnRef idx="1">
+            <a:schemeClr val="accent1"/>
+          </a:lnRef>
+          <a:fillRef idx="0">
+            <a:schemeClr val="accent1"/>
+          </a:fillRef>
+          <a:effectRef idx="0">
+            <a:schemeClr val="accent1"/>
+          </a:effectRef>
+          <a:fontRef idx="minor">
+            <a:schemeClr val="tx1"/>
+          </a:fontRef>
+        </p:style>
+      </p:cxnSp>
+      <p:sp>
+        <p:nvSpPr>
+          <p:cNvPr id="45" name="TextBox 44">
+            <a:extLst>
+              <a:ext uri="{FF2B5EF4-FFF2-40B4-BE49-F238E27FC236}">
+                <a16:creationId xmlns:a16="http://schemas.microsoft.com/office/drawing/2014/main" id="{3A8D3AEB-B6C6-BF23-EB8E-04D2EF729A72}"/>
+              </a:ext>
+            </a:extLst>
+          </p:cNvPr>
+          <p:cNvSpPr txBox="1"/>
+          <p:nvPr/>
+        </p:nvSpPr>
+        <p:spPr>
+          <a:xfrm>
+            <a:off x="2791736" y="4146888"/>
+            <a:ext cx="818082" cy="369332"/>
+          </a:xfrm>
+          <a:prstGeom prst="rect">
+            <a:avLst/>
+          </a:prstGeom>
+          <a:noFill/>
+        </p:spPr>
+        <p:txBody>
+          <a:bodyPr wrap="square" rtlCol="0">
+            <a:spAutoFit/>
+          </a:bodyPr>
+          <a:lstStyle/>
+          <a:p>
+            <a:r>
+              <a:rPr lang="en-US" sz="900" dirty="0"/>
+              <a:t>22 station</a:t>
+            </a:r>
+          </a:p>
+          <a:p>
+            <a:r>
+              <a:rPr lang="en-US" sz="900" dirty="0"/>
+              <a:t>Sensors input</a:t>
+            </a:r>
+            <a:endParaRPr lang="en-SG" sz="900" dirty="0"/>
+          </a:p>
+        </p:txBody>
+      </p:sp>
+      <p:pic>
+        <p:nvPicPr>
+          <p:cNvPr id="54" name="Picture 53">
+            <a:extLst>
+              <a:ext uri="{FF2B5EF4-FFF2-40B4-BE49-F238E27FC236}">
+                <a16:creationId xmlns:a16="http://schemas.microsoft.com/office/drawing/2014/main" id="{9509054D-B742-6926-1598-400CD7319724}"/>
+              </a:ext>
+            </a:extLst>
+          </p:cNvPr>
+          <p:cNvPicPr>
+            <a:picLocks noChangeAspect="1"/>
+          </p:cNvPicPr>
+          <p:nvPr/>
+        </p:nvPicPr>
+        <p:blipFill>
+          <a:blip r:embed="rId6"/>
+          <a:stretch>
+            <a:fillRect/>
+          </a:stretch>
+        </p:blipFill>
+        <p:spPr>
+          <a:xfrm>
             <a:off x="326904" y="4830052"/>
             <a:ext cx="818082" cy="468901"/>
           </a:xfrm>
@@ -16388,7 +16468,7 @@
           <p:nvPr/>
         </p:nvPicPr>
         <p:blipFill>
-          <a:blip r:embed="rId5"/>
+          <a:blip r:embed="rId6"/>
           <a:stretch>
             <a:fillRect/>
           </a:stretch>
@@ -16864,88 +16944,6 @@
       </p:sp>
       <p:sp>
         <p:nvSpPr>
-          <p:cNvPr id="77" name="Rectangle 76">
-            <a:extLst>
-              <a:ext uri="{FF2B5EF4-FFF2-40B4-BE49-F238E27FC236}">
-                <a16:creationId xmlns:a16="http://schemas.microsoft.com/office/drawing/2014/main" id="{3D4EBB44-9B88-AB21-55D4-B9D1A8451A92}"/>
-              </a:ext>
-            </a:extLst>
-          </p:cNvPr>
-          <p:cNvSpPr/>
-          <p:nvPr/>
-        </p:nvSpPr>
-        <p:spPr>
-          <a:xfrm>
-            <a:off x="6637205" y="602451"/>
-            <a:ext cx="4872807" cy="2513875"/>
-          </a:xfrm>
-          <a:prstGeom prst="rect">
-            <a:avLst/>
-          </a:prstGeom>
-        </p:spPr>
-        <p:style>
-          <a:lnRef idx="2">
-            <a:schemeClr val="accent1">
-              <a:shade val="15000"/>
-            </a:schemeClr>
-          </a:lnRef>
-          <a:fillRef idx="1">
-            <a:schemeClr val="accent1"/>
-          </a:fillRef>
-          <a:effectRef idx="0">
-            <a:schemeClr val="accent1"/>
-          </a:effectRef>
-          <a:fontRef idx="minor">
-            <a:schemeClr val="lt1"/>
-          </a:fontRef>
-        </p:style>
-        <p:txBody>
-          <a:bodyPr rtlCol="0" anchor="ctr"/>
-          <a:lstStyle/>
-          <a:p>
-            <a:pPr algn="ctr"/>
-            <a:endParaRPr lang="en-SG"/>
-          </a:p>
-        </p:txBody>
-      </p:sp>
-      <p:pic>
-        <p:nvPicPr>
-          <p:cNvPr id="76" name="Picture 75" descr="A screen shot of a computer&#10;&#10;Description automatically generated with medium confidence">
-            <a:extLst>
-              <a:ext uri="{FF2B5EF4-FFF2-40B4-BE49-F238E27FC236}">
-                <a16:creationId xmlns:a16="http://schemas.microsoft.com/office/drawing/2014/main" id="{6C0B181F-2B32-8A97-E630-7F0901E494C1}"/>
-              </a:ext>
-            </a:extLst>
-          </p:cNvPr>
-          <p:cNvPicPr>
-            <a:picLocks noChangeAspect="1"/>
-          </p:cNvPicPr>
-          <p:nvPr/>
-        </p:nvPicPr>
-        <p:blipFill>
-          <a:blip r:embed="rId6">
-            <a:extLst>
-              <a:ext uri="{28A0092B-C50C-407E-A947-70E740481C1C}">
-                <a14:useLocalDpi xmlns:a14="http://schemas.microsoft.com/office/drawing/2010/main" val="0"/>
-              </a:ext>
-            </a:extLst>
-          </a:blip>
-          <a:stretch>
-            <a:fillRect/>
-          </a:stretch>
-        </p:blipFill>
-        <p:spPr>
-          <a:xfrm>
-            <a:off x="6349118" y="788870"/>
-            <a:ext cx="4603743" cy="2642126"/>
-          </a:xfrm>
-          <a:prstGeom prst="rect">
-            <a:avLst/>
-          </a:prstGeom>
-        </p:spPr>
-      </p:pic>
-      <p:sp>
-        <p:nvSpPr>
           <p:cNvPr id="78" name="TextBox 77">
             <a:extLst>
               <a:ext uri="{FF2B5EF4-FFF2-40B4-BE49-F238E27FC236}">
@@ -18017,7 +18015,7 @@
         </p:nvSpPr>
         <p:spPr>
           <a:xfrm>
-            <a:off x="10091512" y="2330853"/>
+            <a:off x="10405034" y="2859938"/>
             <a:ext cx="636759" cy="461665"/>
           </a:xfrm>
           <a:prstGeom prst="rect">
@@ -18696,7 +18694,7 @@
         </p:blipFill>
         <p:spPr>
           <a:xfrm>
-            <a:off x="9956853" y="4817567"/>
+            <a:off x="9547153" y="4963423"/>
             <a:ext cx="1940674" cy="1052153"/>
           </a:xfrm>
           <a:prstGeom prst="rect">

</xml_diff>

<commit_message>
Added the Attack Scenario 1: False command injection attack via phishing email and backdoor trojan.
</commit_message>
<xml_diff>
--- a/doc/designDoc.pptx
+++ b/doc/designDoc.pptx
@@ -27608,7 +27608,7 @@
         </p:nvSpPr>
         <p:spPr>
           <a:xfrm>
-            <a:off x="5076879" y="5981266"/>
+            <a:off x="5030038" y="5878953"/>
             <a:ext cx="956157" cy="430887"/>
           </a:xfrm>
           <a:prstGeom prst="rect">
@@ -28945,6 +28945,392 @@
               <a:t>Railway[Metro] IT/OT System Security Test Platform Network Diagram and Components View </a:t>
             </a:r>
             <a:endParaRPr lang="en-SG" sz="1600" b="1" dirty="0"/>
+          </a:p>
+        </p:txBody>
+      </p:sp>
+      <p:pic>
+        <p:nvPicPr>
+          <p:cNvPr id="2" name="Picture 1">
+            <a:extLst>
+              <a:ext uri="{FF2B5EF4-FFF2-40B4-BE49-F238E27FC236}">
+                <a16:creationId xmlns:a16="http://schemas.microsoft.com/office/drawing/2014/main" id="{72F09F5B-0F5D-59D0-4981-9A2D7EF016F7}"/>
+              </a:ext>
+            </a:extLst>
+          </p:cNvPr>
+          <p:cNvPicPr>
+            <a:picLocks noChangeAspect="1"/>
+          </p:cNvPicPr>
+          <p:nvPr/>
+        </p:nvPicPr>
+        <p:blipFill>
+          <a:blip r:embed="rId13"/>
+          <a:stretch>
+            <a:fillRect/>
+          </a:stretch>
+        </p:blipFill>
+        <p:spPr>
+          <a:xfrm>
+            <a:off x="6153786" y="5428885"/>
+            <a:ext cx="406276" cy="340647"/>
+          </a:xfrm>
+          <a:prstGeom prst="rect">
+            <a:avLst/>
+          </a:prstGeom>
+          <a:ln w="9525">
+            <a:solidFill>
+              <a:schemeClr val="tx1"/>
+            </a:solidFill>
+          </a:ln>
+        </p:spPr>
+      </p:pic>
+      <p:cxnSp>
+        <p:nvCxnSpPr>
+          <p:cNvPr id="3" name="Straight Connector 2">
+            <a:extLst>
+              <a:ext uri="{FF2B5EF4-FFF2-40B4-BE49-F238E27FC236}">
+                <a16:creationId xmlns:a16="http://schemas.microsoft.com/office/drawing/2014/main" id="{13FDD0D8-D7E1-5597-9195-F486A59AC28D}"/>
+              </a:ext>
+            </a:extLst>
+          </p:cNvPr>
+          <p:cNvCxnSpPr>
+            <a:cxnSpLocks/>
+          </p:cNvCxnSpPr>
+          <p:nvPr/>
+        </p:nvCxnSpPr>
+        <p:spPr>
+          <a:xfrm>
+            <a:off x="6346579" y="5126140"/>
+            <a:ext cx="0" cy="273377"/>
+          </a:xfrm>
+          <a:prstGeom prst="line">
+            <a:avLst/>
+          </a:prstGeom>
+          <a:ln w="19050">
+            <a:prstDash val="sysDash"/>
+          </a:ln>
+        </p:spPr>
+        <p:style>
+          <a:lnRef idx="1">
+            <a:schemeClr val="dk1"/>
+          </a:lnRef>
+          <a:fillRef idx="0">
+            <a:schemeClr val="dk1"/>
+          </a:fillRef>
+          <a:effectRef idx="0">
+            <a:schemeClr val="dk1"/>
+          </a:effectRef>
+          <a:fontRef idx="minor">
+            <a:schemeClr val="tx1"/>
+          </a:fontRef>
+        </p:style>
+      </p:cxnSp>
+      <p:sp>
+        <p:nvSpPr>
+          <p:cNvPr id="21" name="TextBox 20">
+            <a:extLst>
+              <a:ext uri="{FF2B5EF4-FFF2-40B4-BE49-F238E27FC236}">
+                <a16:creationId xmlns:a16="http://schemas.microsoft.com/office/drawing/2014/main" id="{1719E49A-63BE-57D0-8B62-08FCD69FCA93}"/>
+              </a:ext>
+            </a:extLst>
+          </p:cNvPr>
+          <p:cNvSpPr txBox="1"/>
+          <p:nvPr/>
+        </p:nvSpPr>
+        <p:spPr>
+          <a:xfrm>
+            <a:off x="6534276" y="5402720"/>
+            <a:ext cx="1546830" cy="430887"/>
+          </a:xfrm>
+          <a:prstGeom prst="rect">
+            <a:avLst/>
+          </a:prstGeom>
+          <a:noFill/>
+        </p:spPr>
+        <p:txBody>
+          <a:bodyPr wrap="square" rtlCol="0">
+            <a:spAutoFit/>
+          </a:bodyPr>
+          <a:lstStyle/>
+          <a:p>
+            <a:r>
+              <a:rPr lang="en-SG" sz="1100" dirty="0">
+                <a:solidFill>
+                  <a:schemeClr val="bg1"/>
+                </a:solidFill>
+              </a:rPr>
+              <a:t>Local HW-Engineering admin laptop </a:t>
+            </a:r>
+          </a:p>
+        </p:txBody>
+      </p:sp>
+      <p:pic>
+        <p:nvPicPr>
+          <p:cNvPr id="22" name="Picture 4">
+            <a:extLst>
+              <a:ext uri="{FF2B5EF4-FFF2-40B4-BE49-F238E27FC236}">
+                <a16:creationId xmlns:a16="http://schemas.microsoft.com/office/drawing/2014/main" id="{7D7C0EC2-BA9A-BA6B-3C66-3B60F9A9E217}"/>
+              </a:ext>
+            </a:extLst>
+          </p:cNvPr>
+          <p:cNvPicPr>
+            <a:picLocks noChangeAspect="1" noChangeArrowheads="1"/>
+          </p:cNvPicPr>
+          <p:nvPr/>
+        </p:nvPicPr>
+        <p:blipFill>
+          <a:blip r:embed="rId14">
+            <a:extLst>
+              <a:ext uri="{28A0092B-C50C-407E-A947-70E740481C1C}">
+                <a14:useLocalDpi xmlns:a14="http://schemas.microsoft.com/office/drawing/2010/main" val="0"/>
+              </a:ext>
+            </a:extLst>
+          </a:blip>
+          <a:srcRect/>
+          <a:stretch>
+            <a:fillRect/>
+          </a:stretch>
+        </p:blipFill>
+        <p:spPr bwMode="auto">
+          <a:xfrm>
+            <a:off x="6162737" y="5988638"/>
+            <a:ext cx="379932" cy="379932"/>
+          </a:xfrm>
+          <a:prstGeom prst="rect">
+            <a:avLst/>
+          </a:prstGeom>
+          <a:noFill/>
+          <a:extLst>
+            <a:ext uri="{909E8E84-426E-40DD-AFC4-6F175D3DCCD1}">
+              <a14:hiddenFill xmlns:a14="http://schemas.microsoft.com/office/drawing/2010/main">
+                <a:solidFill>
+                  <a:srgbClr val="FFFFFF"/>
+                </a:solidFill>
+              </a14:hiddenFill>
+            </a:ext>
+          </a:extLst>
+        </p:spPr>
+      </p:pic>
+      <p:cxnSp>
+        <p:nvCxnSpPr>
+          <p:cNvPr id="23" name="Straight Arrow Connector 22">
+            <a:extLst>
+              <a:ext uri="{FF2B5EF4-FFF2-40B4-BE49-F238E27FC236}">
+                <a16:creationId xmlns:a16="http://schemas.microsoft.com/office/drawing/2014/main" id="{CBBF6F78-E253-AB84-3A18-78479152FE31}"/>
+              </a:ext>
+            </a:extLst>
+          </p:cNvPr>
+          <p:cNvCxnSpPr>
+            <a:cxnSpLocks/>
+            <a:stCxn id="22" idx="0"/>
+            <a:endCxn id="2" idx="2"/>
+          </p:cNvCxnSpPr>
+          <p:nvPr/>
+        </p:nvCxnSpPr>
+        <p:spPr>
+          <a:xfrm flipV="1">
+            <a:off x="6352703" y="5769532"/>
+            <a:ext cx="4221" cy="219106"/>
+          </a:xfrm>
+          <a:prstGeom prst="straightConnector1">
+            <a:avLst/>
+          </a:prstGeom>
+          <a:ln w="19050">
+            <a:tailEnd type="triangle"/>
+          </a:ln>
+        </p:spPr>
+        <p:style>
+          <a:lnRef idx="1">
+            <a:schemeClr val="accent1"/>
+          </a:lnRef>
+          <a:fillRef idx="0">
+            <a:schemeClr val="accent1"/>
+          </a:fillRef>
+          <a:effectRef idx="0">
+            <a:schemeClr val="accent1"/>
+          </a:effectRef>
+          <a:fontRef idx="minor">
+            <a:schemeClr val="tx1"/>
+          </a:fontRef>
+        </p:style>
+      </p:cxnSp>
+      <p:sp>
+        <p:nvSpPr>
+          <p:cNvPr id="32" name="TextBox 31">
+            <a:extLst>
+              <a:ext uri="{FF2B5EF4-FFF2-40B4-BE49-F238E27FC236}">
+                <a16:creationId xmlns:a16="http://schemas.microsoft.com/office/drawing/2014/main" id="{28DF0431-FEE2-E7D6-3F3F-A71DE9C544CB}"/>
+              </a:ext>
+            </a:extLst>
+          </p:cNvPr>
+          <p:cNvSpPr txBox="1"/>
+          <p:nvPr/>
+        </p:nvSpPr>
+        <p:spPr>
+          <a:xfrm>
+            <a:off x="6514445" y="5937682"/>
+            <a:ext cx="956157" cy="430887"/>
+          </a:xfrm>
+          <a:prstGeom prst="rect">
+            <a:avLst/>
+          </a:prstGeom>
+          <a:noFill/>
+        </p:spPr>
+        <p:txBody>
+          <a:bodyPr wrap="square" rtlCol="0">
+            <a:spAutoFit/>
+          </a:bodyPr>
+          <a:lstStyle/>
+          <a:p>
+            <a:r>
+              <a:rPr lang="en-SG" sz="1100" b="1" dirty="0">
+                <a:solidFill>
+                  <a:srgbClr val="0070C0"/>
+                </a:solidFill>
+              </a:rPr>
+              <a:t>Field device admin</a:t>
+            </a:r>
+          </a:p>
+        </p:txBody>
+      </p:sp>
+      <p:sp>
+        <p:nvSpPr>
+          <p:cNvPr id="33" name="TextBox 32">
+            <a:extLst>
+              <a:ext uri="{FF2B5EF4-FFF2-40B4-BE49-F238E27FC236}">
+                <a16:creationId xmlns:a16="http://schemas.microsoft.com/office/drawing/2014/main" id="{8CAAF772-1F29-613F-1C20-6710842C4C5C}"/>
+              </a:ext>
+            </a:extLst>
+          </p:cNvPr>
+          <p:cNvSpPr txBox="1"/>
+          <p:nvPr/>
+        </p:nvSpPr>
+        <p:spPr>
+          <a:xfrm>
+            <a:off x="682453" y="2925135"/>
+            <a:ext cx="1257727" cy="246221"/>
+          </a:xfrm>
+          <a:prstGeom prst="rect">
+            <a:avLst/>
+          </a:prstGeom>
+          <a:noFill/>
+        </p:spPr>
+        <p:txBody>
+          <a:bodyPr wrap="square">
+            <a:spAutoFit/>
+          </a:bodyPr>
+          <a:lstStyle/>
+          <a:p>
+            <a:r>
+              <a:rPr lang="en-US" sz="1000" b="1" dirty="0">
+                <a:solidFill>
+                  <a:schemeClr val="tx1">
+                    <a:lumMod val="75000"/>
+                    <a:lumOff val="25000"/>
+                  </a:schemeClr>
+                </a:solidFill>
+              </a:rPr>
+              <a:t>Ethernet TCP/IP </a:t>
+            </a:r>
+            <a:endParaRPr lang="en-SG" sz="1000" dirty="0">
+              <a:solidFill>
+                <a:schemeClr val="tx1">
+                  <a:lumMod val="75000"/>
+                  <a:lumOff val="25000"/>
+                </a:schemeClr>
+              </a:solidFill>
+            </a:endParaRPr>
+          </a:p>
+        </p:txBody>
+      </p:sp>
+      <p:sp>
+        <p:nvSpPr>
+          <p:cNvPr id="34" name="TextBox 33">
+            <a:extLst>
+              <a:ext uri="{FF2B5EF4-FFF2-40B4-BE49-F238E27FC236}">
+                <a16:creationId xmlns:a16="http://schemas.microsoft.com/office/drawing/2014/main" id="{2FFB22B5-84C1-EA0C-A9BC-E6A6A0305257}"/>
+              </a:ext>
+            </a:extLst>
+          </p:cNvPr>
+          <p:cNvSpPr txBox="1"/>
+          <p:nvPr/>
+        </p:nvSpPr>
+        <p:spPr>
+          <a:xfrm>
+            <a:off x="3285700" y="2925117"/>
+            <a:ext cx="1975162" cy="246221"/>
+          </a:xfrm>
+          <a:prstGeom prst="rect">
+            <a:avLst/>
+          </a:prstGeom>
+          <a:noFill/>
+        </p:spPr>
+        <p:txBody>
+          <a:bodyPr wrap="square">
+            <a:spAutoFit/>
+          </a:bodyPr>
+          <a:lstStyle/>
+          <a:p>
+            <a:r>
+              <a:rPr lang="en-US" sz="1000" b="1" dirty="0">
+                <a:solidFill>
+                  <a:schemeClr val="tx1">
+                    <a:lumMod val="95000"/>
+                    <a:lumOff val="5000"/>
+                  </a:schemeClr>
+                </a:solidFill>
+              </a:rPr>
+              <a:t>Ethernet TCP/IP and Modbus TCP </a:t>
+            </a:r>
+            <a:endParaRPr lang="en-SG" sz="1000" dirty="0">
+              <a:solidFill>
+                <a:schemeClr val="tx1">
+                  <a:lumMod val="95000"/>
+                  <a:lumOff val="5000"/>
+                </a:schemeClr>
+              </a:solidFill>
+            </a:endParaRPr>
+          </a:p>
+        </p:txBody>
+      </p:sp>
+      <p:sp>
+        <p:nvSpPr>
+          <p:cNvPr id="35" name="TextBox 34">
+            <a:extLst>
+              <a:ext uri="{FF2B5EF4-FFF2-40B4-BE49-F238E27FC236}">
+                <a16:creationId xmlns:a16="http://schemas.microsoft.com/office/drawing/2014/main" id="{12D4CDA3-B905-1A5D-2A53-68C055D8CEFE}"/>
+              </a:ext>
+            </a:extLst>
+          </p:cNvPr>
+          <p:cNvSpPr txBox="1"/>
+          <p:nvPr/>
+        </p:nvSpPr>
+        <p:spPr>
+          <a:xfrm>
+            <a:off x="5961743" y="4049020"/>
+            <a:ext cx="1257727" cy="246221"/>
+          </a:xfrm>
+          <a:prstGeom prst="rect">
+            <a:avLst/>
+          </a:prstGeom>
+          <a:noFill/>
+        </p:spPr>
+        <p:txBody>
+          <a:bodyPr wrap="square">
+            <a:spAutoFit/>
+          </a:bodyPr>
+          <a:lstStyle/>
+          <a:p>
+            <a:r>
+              <a:rPr lang="en-SG" sz="1000" b="1" dirty="0">
+                <a:solidFill>
+                  <a:schemeClr val="tx1">
+                    <a:lumMod val="95000"/>
+                    <a:lumOff val="5000"/>
+                  </a:schemeClr>
+                </a:solidFill>
+              </a:rPr>
+              <a:t>Modbus TCP</a:t>
+            </a:r>
           </a:p>
         </p:txBody>
       </p:sp>

</xml_diff>

<commit_message>
Added the linked in post.
</commit_message>
<xml_diff>
--- a/doc/designDoc.pptx
+++ b/doc/designDoc.pptx
@@ -223,7 +223,7 @@
           <a:p>
             <a:fld id="{C0790970-3005-464C-B0F1-2C170134C482}" type="datetimeFigureOut">
               <a:rPr lang="en-SG" smtClean="0"/>
-              <a:t>7/10/2023</a:t>
+              <a:t>20/12/2023</a:t>
             </a:fld>
             <a:endParaRPr lang="en-SG"/>
           </a:p>
@@ -1060,7 +1060,7 @@
           <a:p>
             <a:fld id="{F949A3E6-ADCC-4214-836D-B18BFC6F3D6C}" type="datetimeFigureOut">
               <a:rPr lang="en-SG" smtClean="0"/>
-              <a:t>7/10/2023</a:t>
+              <a:t>20/12/2023</a:t>
             </a:fld>
             <a:endParaRPr lang="en-SG"/>
           </a:p>
@@ -1260,7 +1260,7 @@
           <a:p>
             <a:fld id="{F949A3E6-ADCC-4214-836D-B18BFC6F3D6C}" type="datetimeFigureOut">
               <a:rPr lang="en-SG" smtClean="0"/>
-              <a:t>7/10/2023</a:t>
+              <a:t>20/12/2023</a:t>
             </a:fld>
             <a:endParaRPr lang="en-SG"/>
           </a:p>
@@ -1470,7 +1470,7 @@
           <a:p>
             <a:fld id="{F949A3E6-ADCC-4214-836D-B18BFC6F3D6C}" type="datetimeFigureOut">
               <a:rPr lang="en-SG" smtClean="0"/>
-              <a:t>7/10/2023</a:t>
+              <a:t>20/12/2023</a:t>
             </a:fld>
             <a:endParaRPr lang="en-SG"/>
           </a:p>
@@ -1670,7 +1670,7 @@
           <a:p>
             <a:fld id="{F949A3E6-ADCC-4214-836D-B18BFC6F3D6C}" type="datetimeFigureOut">
               <a:rPr lang="en-SG" smtClean="0"/>
-              <a:t>7/10/2023</a:t>
+              <a:t>20/12/2023</a:t>
             </a:fld>
             <a:endParaRPr lang="en-SG"/>
           </a:p>
@@ -1946,7 +1946,7 @@
           <a:p>
             <a:fld id="{F949A3E6-ADCC-4214-836D-B18BFC6F3D6C}" type="datetimeFigureOut">
               <a:rPr lang="en-SG" smtClean="0"/>
-              <a:t>7/10/2023</a:t>
+              <a:t>20/12/2023</a:t>
             </a:fld>
             <a:endParaRPr lang="en-SG"/>
           </a:p>
@@ -2214,7 +2214,7 @@
           <a:p>
             <a:fld id="{F949A3E6-ADCC-4214-836D-B18BFC6F3D6C}" type="datetimeFigureOut">
               <a:rPr lang="en-SG" smtClean="0"/>
-              <a:t>7/10/2023</a:t>
+              <a:t>20/12/2023</a:t>
             </a:fld>
             <a:endParaRPr lang="en-SG"/>
           </a:p>
@@ -2629,7 +2629,7 @@
           <a:p>
             <a:fld id="{F949A3E6-ADCC-4214-836D-B18BFC6F3D6C}" type="datetimeFigureOut">
               <a:rPr lang="en-SG" smtClean="0"/>
-              <a:t>7/10/2023</a:t>
+              <a:t>20/12/2023</a:t>
             </a:fld>
             <a:endParaRPr lang="en-SG"/>
           </a:p>
@@ -2771,7 +2771,7 @@
           <a:p>
             <a:fld id="{F949A3E6-ADCC-4214-836D-B18BFC6F3D6C}" type="datetimeFigureOut">
               <a:rPr lang="en-SG" smtClean="0"/>
-              <a:t>7/10/2023</a:t>
+              <a:t>20/12/2023</a:t>
             </a:fld>
             <a:endParaRPr lang="en-SG"/>
           </a:p>
@@ -2884,7 +2884,7 @@
           <a:p>
             <a:fld id="{F949A3E6-ADCC-4214-836D-B18BFC6F3D6C}" type="datetimeFigureOut">
               <a:rPr lang="en-SG" smtClean="0"/>
-              <a:t>7/10/2023</a:t>
+              <a:t>20/12/2023</a:t>
             </a:fld>
             <a:endParaRPr lang="en-SG"/>
           </a:p>
@@ -3197,7 +3197,7 @@
           <a:p>
             <a:fld id="{F949A3E6-ADCC-4214-836D-B18BFC6F3D6C}" type="datetimeFigureOut">
               <a:rPr lang="en-SG" smtClean="0"/>
-              <a:t>7/10/2023</a:t>
+              <a:t>20/12/2023</a:t>
             </a:fld>
             <a:endParaRPr lang="en-SG"/>
           </a:p>
@@ -3486,7 +3486,7 @@
           <a:p>
             <a:fld id="{F949A3E6-ADCC-4214-836D-B18BFC6F3D6C}" type="datetimeFigureOut">
               <a:rPr lang="en-SG" smtClean="0"/>
-              <a:t>7/10/2023</a:t>
+              <a:t>20/12/2023</a:t>
             </a:fld>
             <a:endParaRPr lang="en-SG"/>
           </a:p>
@@ -3729,7 +3729,7 @@
           <a:p>
             <a:fld id="{F949A3E6-ADCC-4214-836D-B18BFC6F3D6C}" type="datetimeFigureOut">
               <a:rPr lang="en-SG" smtClean="0"/>
-              <a:t>7/10/2023</a:t>
+              <a:t>20/12/2023</a:t>
             </a:fld>
             <a:endParaRPr lang="en-SG"/>
           </a:p>

</xml_diff>